<commit_message>
ChromSyn v1.5.0 : Added more complex plotting of gaps based on SynBad ratings and qcmode=T/F. Added maxregions=INT setting and regdata collapse to dynamically sets the min region length.
# v1.4.0 : Added plotting of repeats with a -2 shape as inverted triangles near centre. Fixed minor list argument parsing bug.
# v1.5.0 : Added more complex plotting of gaps based on SynBad ratings and qcmode=T/F. Added maxregions=INT setting and regdata collapse to dynamically sets the min region length.
</commit_message>
<xml_diff>
--- a/chromsyn_key.pptx
+++ b/chromsyn_key.pptx
@@ -104,15 +104,745 @@
       </a:defRPr>
     </a:lvl9pPr>
   </p:defaultTextStyle>
+  <p:extLst>
+    <p:ext uri="{EFAFB233-063F-42B5-8137-9DF3F51BA10A}">
+      <p15:sldGuideLst xmlns:p15="http://schemas.microsoft.com/office/powerpoint/2012/main"/>
+    </p:ext>
+  </p:extLst>
 </p:presentation>
 </file>
 
 <file path=ppt/revisionInfo.xml><?xml version="1.0" encoding="utf-8"?>
 <p1510:revInfo xmlns:a="http://schemas.openxmlformats.org/drawingml/2006/main" xmlns:r="http://schemas.openxmlformats.org/officeDocument/2006/relationships" xmlns:p1510="http://schemas.microsoft.com/office/powerpoint/2015/10/main">
   <p1510:revLst>
-    <p1510:client id="{CFA6676C-6A95-4841-9EE3-A349085D3E34}" v="2" dt="2024-04-30T04:06:37.001"/>
+    <p1510:client id="{8811C6CF-0419-8B48-A759-88B4EBFFCA77}" v="3" dt="2024-08-15T04:28:40.054"/>
   </p1510:revLst>
 </p1510:revInfo>
+</file>
+
+<file path=ppt/changesInfos/changesInfo1.xml><?xml version="1.0" encoding="utf-8"?>
+<pc:chgInfo xmlns:a="http://schemas.openxmlformats.org/drawingml/2006/main" xmlns:r="http://schemas.openxmlformats.org/officeDocument/2006/relationships" xmlns:ac="http://schemas.microsoft.com/office/drawing/2013/main/command" xmlns:pc="http://schemas.microsoft.com/office/powerpoint/2013/main/command">
+  <pc:docChgLst>
+    <pc:chgData name="Rich Edwards" userId="00f4226a-1697-4716-8928-b43d7726cc59" providerId="ADAL" clId="{8811C6CF-0419-8B48-A759-88B4EBFFCA77}"/>
+    <pc:docChg chg="undo custSel modSld">
+      <pc:chgData name="Rich Edwards" userId="00f4226a-1697-4716-8928-b43d7726cc59" providerId="ADAL" clId="{8811C6CF-0419-8B48-A759-88B4EBFFCA77}" dt="2024-08-15T04:29:39.779" v="17" actId="164"/>
+      <pc:docMkLst>
+        <pc:docMk/>
+      </pc:docMkLst>
+      <pc:sldChg chg="addSp delSp modSp mod">
+        <pc:chgData name="Rich Edwards" userId="00f4226a-1697-4716-8928-b43d7726cc59" providerId="ADAL" clId="{8811C6CF-0419-8B48-A759-88B4EBFFCA77}" dt="2024-08-15T04:29:39.779" v="17" actId="164"/>
+        <pc:sldMkLst>
+          <pc:docMk/>
+          <pc:sldMk cId="1681145084" sldId="256"/>
+        </pc:sldMkLst>
+        <pc:spChg chg="mod">
+          <ac:chgData name="Rich Edwards" userId="00f4226a-1697-4716-8928-b43d7726cc59" providerId="ADAL" clId="{8811C6CF-0419-8B48-A759-88B4EBFFCA77}" dt="2024-08-15T04:28:18.865" v="4" actId="1582"/>
+          <ac:spMkLst>
+            <pc:docMk/>
+            <pc:sldMk cId="1681145084" sldId="256"/>
+            <ac:spMk id="3" creationId="{A7945DFF-BBFC-D16D-DCBE-51BB27275C3C}"/>
+          </ac:spMkLst>
+        </pc:spChg>
+        <pc:spChg chg="mod">
+          <ac:chgData name="Rich Edwards" userId="00f4226a-1697-4716-8928-b43d7726cc59" providerId="ADAL" clId="{8811C6CF-0419-8B48-A759-88B4EBFFCA77}" dt="2024-08-15T04:27:54.039" v="2" actId="255"/>
+          <ac:spMkLst>
+            <pc:docMk/>
+            <pc:sldMk cId="1681145084" sldId="256"/>
+            <ac:spMk id="12" creationId="{C4BC2816-A6D4-3852-F31B-01D94E3322B8}"/>
+          </ac:spMkLst>
+        </pc:spChg>
+        <pc:spChg chg="mod">
+          <ac:chgData name="Rich Edwards" userId="00f4226a-1697-4716-8928-b43d7726cc59" providerId="ADAL" clId="{8811C6CF-0419-8B48-A759-88B4EBFFCA77}" dt="2024-08-15T04:27:54.039" v="2" actId="255"/>
+          <ac:spMkLst>
+            <pc:docMk/>
+            <pc:sldMk cId="1681145084" sldId="256"/>
+            <ac:spMk id="13" creationId="{5A89660F-FFF0-F4AC-1829-3ED212E100F0}"/>
+          </ac:spMkLst>
+        </pc:spChg>
+        <pc:spChg chg="mod">
+          <ac:chgData name="Rich Edwards" userId="00f4226a-1697-4716-8928-b43d7726cc59" providerId="ADAL" clId="{8811C6CF-0419-8B48-A759-88B4EBFFCA77}" dt="2024-08-15T04:27:54.039" v="2" actId="255"/>
+          <ac:spMkLst>
+            <pc:docMk/>
+            <pc:sldMk cId="1681145084" sldId="256"/>
+            <ac:spMk id="24" creationId="{04FD1FAC-A75F-3A7E-E6A2-FFF8BCF12A10}"/>
+          </ac:spMkLst>
+        </pc:spChg>
+        <pc:spChg chg="mod">
+          <ac:chgData name="Rich Edwards" userId="00f4226a-1697-4716-8928-b43d7726cc59" providerId="ADAL" clId="{8811C6CF-0419-8B48-A759-88B4EBFFCA77}" dt="2024-08-15T04:27:54.039" v="2" actId="255"/>
+          <ac:spMkLst>
+            <pc:docMk/>
+            <pc:sldMk cId="1681145084" sldId="256"/>
+            <ac:spMk id="34" creationId="{845B5015-2F8A-54DE-E5BA-A450E817546A}"/>
+          </ac:spMkLst>
+        </pc:spChg>
+        <pc:spChg chg="mod">
+          <ac:chgData name="Rich Edwards" userId="00f4226a-1697-4716-8928-b43d7726cc59" providerId="ADAL" clId="{8811C6CF-0419-8B48-A759-88B4EBFFCA77}" dt="2024-08-15T04:27:54.039" v="2" actId="255"/>
+          <ac:spMkLst>
+            <pc:docMk/>
+            <pc:sldMk cId="1681145084" sldId="256"/>
+            <ac:spMk id="38" creationId="{F5090EE3-AD35-9C73-97FC-D5E21B380B5D}"/>
+          </ac:spMkLst>
+        </pc:spChg>
+        <pc:spChg chg="mod">
+          <ac:chgData name="Rich Edwards" userId="00f4226a-1697-4716-8928-b43d7726cc59" providerId="ADAL" clId="{8811C6CF-0419-8B48-A759-88B4EBFFCA77}" dt="2024-08-15T04:27:54.039" v="2" actId="255"/>
+          <ac:spMkLst>
+            <pc:docMk/>
+            <pc:sldMk cId="1681145084" sldId="256"/>
+            <ac:spMk id="51" creationId="{3CCD1F7B-4C1C-704A-9FE2-E9C20DF61A8F}"/>
+          </ac:spMkLst>
+        </pc:spChg>
+        <pc:spChg chg="mod">
+          <ac:chgData name="Rich Edwards" userId="00f4226a-1697-4716-8928-b43d7726cc59" providerId="ADAL" clId="{8811C6CF-0419-8B48-A759-88B4EBFFCA77}" dt="2024-08-15T04:27:54.039" v="2" actId="255"/>
+          <ac:spMkLst>
+            <pc:docMk/>
+            <pc:sldMk cId="1681145084" sldId="256"/>
+            <ac:spMk id="56" creationId="{DF8A44B8-70FB-3017-8DBC-F8AAC010A0FE}"/>
+          </ac:spMkLst>
+        </pc:spChg>
+        <pc:spChg chg="mod">
+          <ac:chgData name="Rich Edwards" userId="00f4226a-1697-4716-8928-b43d7726cc59" providerId="ADAL" clId="{8811C6CF-0419-8B48-A759-88B4EBFFCA77}" dt="2024-08-15T04:27:54.039" v="2" actId="255"/>
+          <ac:spMkLst>
+            <pc:docMk/>
+            <pc:sldMk cId="1681145084" sldId="256"/>
+            <ac:spMk id="58" creationId="{9F35DF7E-AF4F-91C2-D9D4-7EBCDEE59723}"/>
+          </ac:spMkLst>
+        </pc:spChg>
+        <pc:spChg chg="mod">
+          <ac:chgData name="Rich Edwards" userId="00f4226a-1697-4716-8928-b43d7726cc59" providerId="ADAL" clId="{8811C6CF-0419-8B48-A759-88B4EBFFCA77}" dt="2024-08-15T04:27:54.039" v="2" actId="255"/>
+          <ac:spMkLst>
+            <pc:docMk/>
+            <pc:sldMk cId="1681145084" sldId="256"/>
+            <ac:spMk id="59" creationId="{09137423-222B-EDB6-39F7-8BB431B7CA82}"/>
+          </ac:spMkLst>
+        </pc:spChg>
+        <pc:spChg chg="mod">
+          <ac:chgData name="Rich Edwards" userId="00f4226a-1697-4716-8928-b43d7726cc59" providerId="ADAL" clId="{8811C6CF-0419-8B48-A759-88B4EBFFCA77}" dt="2024-08-15T04:27:54.039" v="2" actId="255"/>
+          <ac:spMkLst>
+            <pc:docMk/>
+            <pc:sldMk cId="1681145084" sldId="256"/>
+            <ac:spMk id="60" creationId="{54DCD9CC-47C2-25FA-D40C-91BBD0110F47}"/>
+          </ac:spMkLst>
+        </pc:spChg>
+        <pc:spChg chg="mod">
+          <ac:chgData name="Rich Edwards" userId="00f4226a-1697-4716-8928-b43d7726cc59" providerId="ADAL" clId="{8811C6CF-0419-8B48-A759-88B4EBFFCA77}" dt="2024-08-15T04:27:54.039" v="2" actId="255"/>
+          <ac:spMkLst>
+            <pc:docMk/>
+            <pc:sldMk cId="1681145084" sldId="256"/>
+            <ac:spMk id="62" creationId="{FFD8949A-5FDF-8528-7F57-4BF67885DAF4}"/>
+          </ac:spMkLst>
+        </pc:spChg>
+        <pc:spChg chg="mod">
+          <ac:chgData name="Rich Edwards" userId="00f4226a-1697-4716-8928-b43d7726cc59" providerId="ADAL" clId="{8811C6CF-0419-8B48-A759-88B4EBFFCA77}" dt="2024-08-15T04:27:54.039" v="2" actId="255"/>
+          <ac:spMkLst>
+            <pc:docMk/>
+            <pc:sldMk cId="1681145084" sldId="256"/>
+            <ac:spMk id="64" creationId="{A8F92D9C-E2E1-A771-7AED-FBEB1B4076A9}"/>
+          </ac:spMkLst>
+        </pc:spChg>
+        <pc:spChg chg="mod">
+          <ac:chgData name="Rich Edwards" userId="00f4226a-1697-4716-8928-b43d7726cc59" providerId="ADAL" clId="{8811C6CF-0419-8B48-A759-88B4EBFFCA77}" dt="2024-08-15T04:27:54.039" v="2" actId="255"/>
+          <ac:spMkLst>
+            <pc:docMk/>
+            <pc:sldMk cId="1681145084" sldId="256"/>
+            <ac:spMk id="68" creationId="{E46A0C46-DE91-9F52-4375-5299B4910590}"/>
+          </ac:spMkLst>
+        </pc:spChg>
+        <pc:spChg chg="mod">
+          <ac:chgData name="Rich Edwards" userId="00f4226a-1697-4716-8928-b43d7726cc59" providerId="ADAL" clId="{8811C6CF-0419-8B48-A759-88B4EBFFCA77}" dt="2024-08-15T04:27:54.039" v="2" actId="255"/>
+          <ac:spMkLst>
+            <pc:docMk/>
+            <pc:sldMk cId="1681145084" sldId="256"/>
+            <ac:spMk id="98" creationId="{F63532A2-3D20-671E-7FDB-0B347B521D1D}"/>
+          </ac:spMkLst>
+        </pc:spChg>
+        <pc:spChg chg="mod">
+          <ac:chgData name="Rich Edwards" userId="00f4226a-1697-4716-8928-b43d7726cc59" providerId="ADAL" clId="{8811C6CF-0419-8B48-A759-88B4EBFFCA77}" dt="2024-08-15T04:27:54.039" v="2" actId="255"/>
+          <ac:spMkLst>
+            <pc:docMk/>
+            <pc:sldMk cId="1681145084" sldId="256"/>
+            <ac:spMk id="99" creationId="{96B09FD4-7862-EB7F-D229-05ECC032491E}"/>
+          </ac:spMkLst>
+        </pc:spChg>
+        <pc:spChg chg="mod">
+          <ac:chgData name="Rich Edwards" userId="00f4226a-1697-4716-8928-b43d7726cc59" providerId="ADAL" clId="{8811C6CF-0419-8B48-A759-88B4EBFFCA77}" dt="2024-08-15T04:27:54.039" v="2" actId="255"/>
+          <ac:spMkLst>
+            <pc:docMk/>
+            <pc:sldMk cId="1681145084" sldId="256"/>
+            <ac:spMk id="100" creationId="{E3E7CA45-122B-5B76-BEA7-4AA6E4D1072C}"/>
+          </ac:spMkLst>
+        </pc:spChg>
+        <pc:spChg chg="mod">
+          <ac:chgData name="Rich Edwards" userId="00f4226a-1697-4716-8928-b43d7726cc59" providerId="ADAL" clId="{8811C6CF-0419-8B48-A759-88B4EBFFCA77}" dt="2024-08-15T04:27:54.039" v="2" actId="255"/>
+          <ac:spMkLst>
+            <pc:docMk/>
+            <pc:sldMk cId="1681145084" sldId="256"/>
+            <ac:spMk id="101" creationId="{BE5D3E0A-ABC4-A333-B6A0-208E3F4D6597}"/>
+          </ac:spMkLst>
+        </pc:spChg>
+        <pc:spChg chg="mod">
+          <ac:chgData name="Rich Edwards" userId="00f4226a-1697-4716-8928-b43d7726cc59" providerId="ADAL" clId="{8811C6CF-0419-8B48-A759-88B4EBFFCA77}" dt="2024-08-15T04:27:54.039" v="2" actId="255"/>
+          <ac:spMkLst>
+            <pc:docMk/>
+            <pc:sldMk cId="1681145084" sldId="256"/>
+            <ac:spMk id="102" creationId="{A4B43929-4250-4E0B-30B9-AA84143B1C9F}"/>
+          </ac:spMkLst>
+        </pc:spChg>
+        <pc:spChg chg="mod">
+          <ac:chgData name="Rich Edwards" userId="00f4226a-1697-4716-8928-b43d7726cc59" providerId="ADAL" clId="{8811C6CF-0419-8B48-A759-88B4EBFFCA77}" dt="2024-08-15T04:27:54.039" v="2" actId="255"/>
+          <ac:spMkLst>
+            <pc:docMk/>
+            <pc:sldMk cId="1681145084" sldId="256"/>
+            <ac:spMk id="103" creationId="{BED63854-BCC9-BEFD-0251-27FDDCE976BF}"/>
+          </ac:spMkLst>
+        </pc:spChg>
+        <pc:spChg chg="mod topLvl">
+          <ac:chgData name="Rich Edwards" userId="00f4226a-1697-4716-8928-b43d7726cc59" providerId="ADAL" clId="{8811C6CF-0419-8B48-A759-88B4EBFFCA77}" dt="2024-08-15T04:29:28.868" v="15" actId="14100"/>
+          <ac:spMkLst>
+            <pc:docMk/>
+            <pc:sldMk cId="1681145084" sldId="256"/>
+            <ac:spMk id="105" creationId="{71A70E85-9571-85D2-B3B0-6165B8D9B78F}"/>
+          </ac:spMkLst>
+        </pc:spChg>
+        <pc:spChg chg="mod">
+          <ac:chgData name="Rich Edwards" userId="00f4226a-1697-4716-8928-b43d7726cc59" providerId="ADAL" clId="{8811C6CF-0419-8B48-A759-88B4EBFFCA77}" dt="2024-08-15T04:28:32.233" v="6" actId="571"/>
+          <ac:spMkLst>
+            <pc:docMk/>
+            <pc:sldMk cId="1681145084" sldId="256"/>
+            <ac:spMk id="114" creationId="{AAC798CD-525F-5663-B122-36A6255E5774}"/>
+          </ac:spMkLst>
+        </pc:spChg>
+        <pc:spChg chg="mod">
+          <ac:chgData name="Rich Edwards" userId="00f4226a-1697-4716-8928-b43d7726cc59" providerId="ADAL" clId="{8811C6CF-0419-8B48-A759-88B4EBFFCA77}" dt="2024-08-15T04:28:32.233" v="6" actId="571"/>
+          <ac:spMkLst>
+            <pc:docMk/>
+            <pc:sldMk cId="1681145084" sldId="256"/>
+            <ac:spMk id="115" creationId="{F68EFDFF-FE6C-0BCD-455C-45B593BCE6A9}"/>
+          </ac:spMkLst>
+        </pc:spChg>
+        <pc:spChg chg="mod">
+          <ac:chgData name="Rich Edwards" userId="00f4226a-1697-4716-8928-b43d7726cc59" providerId="ADAL" clId="{8811C6CF-0419-8B48-A759-88B4EBFFCA77}" dt="2024-08-15T04:28:32.233" v="6" actId="571"/>
+          <ac:spMkLst>
+            <pc:docMk/>
+            <pc:sldMk cId="1681145084" sldId="256"/>
+            <ac:spMk id="116" creationId="{4D2F3897-B460-7F31-021F-CCAEE62166D4}"/>
+          </ac:spMkLst>
+        </pc:spChg>
+        <pc:spChg chg="mod">
+          <ac:chgData name="Rich Edwards" userId="00f4226a-1697-4716-8928-b43d7726cc59" providerId="ADAL" clId="{8811C6CF-0419-8B48-A759-88B4EBFFCA77}" dt="2024-08-15T04:28:32.233" v="6" actId="571"/>
+          <ac:spMkLst>
+            <pc:docMk/>
+            <pc:sldMk cId="1681145084" sldId="256"/>
+            <ac:spMk id="117" creationId="{9947B655-0B3E-E906-B3A6-340D4FB8FC11}"/>
+          </ac:spMkLst>
+        </pc:spChg>
+        <pc:spChg chg="mod">
+          <ac:chgData name="Rich Edwards" userId="00f4226a-1697-4716-8928-b43d7726cc59" providerId="ADAL" clId="{8811C6CF-0419-8B48-A759-88B4EBFFCA77}" dt="2024-08-15T04:28:32.233" v="6" actId="571"/>
+          <ac:spMkLst>
+            <pc:docMk/>
+            <pc:sldMk cId="1681145084" sldId="256"/>
+            <ac:spMk id="118" creationId="{5CF89BF8-5BCE-4B38-FDC3-CB4FCE4F320E}"/>
+          </ac:spMkLst>
+        </pc:spChg>
+        <pc:spChg chg="mod">
+          <ac:chgData name="Rich Edwards" userId="00f4226a-1697-4716-8928-b43d7726cc59" providerId="ADAL" clId="{8811C6CF-0419-8B48-A759-88B4EBFFCA77}" dt="2024-08-15T04:28:32.233" v="6" actId="571"/>
+          <ac:spMkLst>
+            <pc:docMk/>
+            <pc:sldMk cId="1681145084" sldId="256"/>
+            <ac:spMk id="119" creationId="{E20C9FC4-D624-26C0-88CC-9F94EFEC8228}"/>
+          </ac:spMkLst>
+        </pc:spChg>
+        <pc:spChg chg="mod">
+          <ac:chgData name="Rich Edwards" userId="00f4226a-1697-4716-8928-b43d7726cc59" providerId="ADAL" clId="{8811C6CF-0419-8B48-A759-88B4EBFFCA77}" dt="2024-08-15T04:28:32.233" v="6" actId="571"/>
+          <ac:spMkLst>
+            <pc:docMk/>
+            <pc:sldMk cId="1681145084" sldId="256"/>
+            <ac:spMk id="120" creationId="{2E8EE305-3D02-FE04-2375-DE4F46F4A5A1}"/>
+          </ac:spMkLst>
+        </pc:spChg>
+        <pc:spChg chg="mod">
+          <ac:chgData name="Rich Edwards" userId="00f4226a-1697-4716-8928-b43d7726cc59" providerId="ADAL" clId="{8811C6CF-0419-8B48-A759-88B4EBFFCA77}" dt="2024-08-15T04:28:32.233" v="6" actId="571"/>
+          <ac:spMkLst>
+            <pc:docMk/>
+            <pc:sldMk cId="1681145084" sldId="256"/>
+            <ac:spMk id="121" creationId="{01B5E8DA-4DBF-5AB3-DF3D-226536B429FE}"/>
+          </ac:spMkLst>
+        </pc:spChg>
+        <pc:spChg chg="mod">
+          <ac:chgData name="Rich Edwards" userId="00f4226a-1697-4716-8928-b43d7726cc59" providerId="ADAL" clId="{8811C6CF-0419-8B48-A759-88B4EBFFCA77}" dt="2024-08-15T04:28:32.233" v="6" actId="571"/>
+          <ac:spMkLst>
+            <pc:docMk/>
+            <pc:sldMk cId="1681145084" sldId="256"/>
+            <ac:spMk id="122" creationId="{4C970739-7011-C9DD-FE82-220C9590BA26}"/>
+          </ac:spMkLst>
+        </pc:spChg>
+        <pc:spChg chg="mod">
+          <ac:chgData name="Rich Edwards" userId="00f4226a-1697-4716-8928-b43d7726cc59" providerId="ADAL" clId="{8811C6CF-0419-8B48-A759-88B4EBFFCA77}" dt="2024-08-15T04:28:32.233" v="6" actId="571"/>
+          <ac:spMkLst>
+            <pc:docMk/>
+            <pc:sldMk cId="1681145084" sldId="256"/>
+            <ac:spMk id="123" creationId="{CAE0C146-5BF3-0013-FC41-569FEFF2EB2F}"/>
+          </ac:spMkLst>
+        </pc:spChg>
+        <pc:spChg chg="mod">
+          <ac:chgData name="Rich Edwards" userId="00f4226a-1697-4716-8928-b43d7726cc59" providerId="ADAL" clId="{8811C6CF-0419-8B48-A759-88B4EBFFCA77}" dt="2024-08-15T04:28:32.233" v="6" actId="571"/>
+          <ac:spMkLst>
+            <pc:docMk/>
+            <pc:sldMk cId="1681145084" sldId="256"/>
+            <ac:spMk id="124" creationId="{68ECE522-C9BC-028B-A90F-D539A2768D76}"/>
+          </ac:spMkLst>
+        </pc:spChg>
+        <pc:spChg chg="mod">
+          <ac:chgData name="Rich Edwards" userId="00f4226a-1697-4716-8928-b43d7726cc59" providerId="ADAL" clId="{8811C6CF-0419-8B48-A759-88B4EBFFCA77}" dt="2024-08-15T04:28:32.233" v="6" actId="571"/>
+          <ac:spMkLst>
+            <pc:docMk/>
+            <pc:sldMk cId="1681145084" sldId="256"/>
+            <ac:spMk id="125" creationId="{492949D5-576B-D3A9-F1FF-FE2A2109A068}"/>
+          </ac:spMkLst>
+        </pc:spChg>
+        <pc:spChg chg="mod">
+          <ac:chgData name="Rich Edwards" userId="00f4226a-1697-4716-8928-b43d7726cc59" providerId="ADAL" clId="{8811C6CF-0419-8B48-A759-88B4EBFFCA77}" dt="2024-08-15T04:28:32.233" v="6" actId="571"/>
+          <ac:spMkLst>
+            <pc:docMk/>
+            <pc:sldMk cId="1681145084" sldId="256"/>
+            <ac:spMk id="126" creationId="{18207E3A-A025-15CA-7505-D9FCC126FCA5}"/>
+          </ac:spMkLst>
+        </pc:spChg>
+        <pc:spChg chg="mod">
+          <ac:chgData name="Rich Edwards" userId="00f4226a-1697-4716-8928-b43d7726cc59" providerId="ADAL" clId="{8811C6CF-0419-8B48-A759-88B4EBFFCA77}" dt="2024-08-15T04:28:32.233" v="6" actId="571"/>
+          <ac:spMkLst>
+            <pc:docMk/>
+            <pc:sldMk cId="1681145084" sldId="256"/>
+            <ac:spMk id="127" creationId="{B25BA60D-FE3B-AD62-6300-3E1404342F29}"/>
+          </ac:spMkLst>
+        </pc:spChg>
+        <pc:spChg chg="mod">
+          <ac:chgData name="Rich Edwards" userId="00f4226a-1697-4716-8928-b43d7726cc59" providerId="ADAL" clId="{8811C6CF-0419-8B48-A759-88B4EBFFCA77}" dt="2024-08-15T04:28:32.233" v="6" actId="571"/>
+          <ac:spMkLst>
+            <pc:docMk/>
+            <pc:sldMk cId="1681145084" sldId="256"/>
+            <ac:spMk id="128" creationId="{06525AE9-8AD7-5B47-B55E-A127E4311F0B}"/>
+          </ac:spMkLst>
+        </pc:spChg>
+        <pc:spChg chg="mod">
+          <ac:chgData name="Rich Edwards" userId="00f4226a-1697-4716-8928-b43d7726cc59" providerId="ADAL" clId="{8811C6CF-0419-8B48-A759-88B4EBFFCA77}" dt="2024-08-15T04:28:32.233" v="6" actId="571"/>
+          <ac:spMkLst>
+            <pc:docMk/>
+            <pc:sldMk cId="1681145084" sldId="256"/>
+            <ac:spMk id="129" creationId="{278D2773-F098-48DA-4964-44829D049453}"/>
+          </ac:spMkLst>
+        </pc:spChg>
+        <pc:spChg chg="mod">
+          <ac:chgData name="Rich Edwards" userId="00f4226a-1697-4716-8928-b43d7726cc59" providerId="ADAL" clId="{8811C6CF-0419-8B48-A759-88B4EBFFCA77}" dt="2024-08-15T04:28:32.233" v="6" actId="571"/>
+          <ac:spMkLst>
+            <pc:docMk/>
+            <pc:sldMk cId="1681145084" sldId="256"/>
+            <ac:spMk id="130" creationId="{6119CCCB-E3E1-D11C-AADB-9912C8332AE4}"/>
+          </ac:spMkLst>
+        </pc:spChg>
+        <pc:spChg chg="mod">
+          <ac:chgData name="Rich Edwards" userId="00f4226a-1697-4716-8928-b43d7726cc59" providerId="ADAL" clId="{8811C6CF-0419-8B48-A759-88B4EBFFCA77}" dt="2024-08-15T04:28:32.233" v="6" actId="571"/>
+          <ac:spMkLst>
+            <pc:docMk/>
+            <pc:sldMk cId="1681145084" sldId="256"/>
+            <ac:spMk id="131" creationId="{C06B0A81-21E3-54B3-A794-6666A748DCE3}"/>
+          </ac:spMkLst>
+        </pc:spChg>
+        <pc:spChg chg="mod">
+          <ac:chgData name="Rich Edwards" userId="00f4226a-1697-4716-8928-b43d7726cc59" providerId="ADAL" clId="{8811C6CF-0419-8B48-A759-88B4EBFFCA77}" dt="2024-08-15T04:28:32.233" v="6" actId="571"/>
+          <ac:spMkLst>
+            <pc:docMk/>
+            <pc:sldMk cId="1681145084" sldId="256"/>
+            <ac:spMk id="132" creationId="{8A31358D-B2F6-AD0E-64DD-115FB993D034}"/>
+          </ac:spMkLst>
+        </pc:spChg>
+        <pc:spChg chg="del mod topLvl">
+          <ac:chgData name="Rich Edwards" userId="00f4226a-1697-4716-8928-b43d7726cc59" providerId="ADAL" clId="{8811C6CF-0419-8B48-A759-88B4EBFFCA77}" dt="2024-08-15T04:29:14.242" v="13" actId="478"/>
+          <ac:spMkLst>
+            <pc:docMk/>
+            <pc:sldMk cId="1681145084" sldId="256"/>
+            <ac:spMk id="134" creationId="{31FCEEBD-0FAF-5AF7-73F1-2CFC86CB7E54}"/>
+          </ac:spMkLst>
+        </pc:spChg>
+        <pc:spChg chg="mod">
+          <ac:chgData name="Rich Edwards" userId="00f4226a-1697-4716-8928-b43d7726cc59" providerId="ADAL" clId="{8811C6CF-0419-8B48-A759-88B4EBFFCA77}" dt="2024-08-15T04:28:40.054" v="7" actId="571"/>
+          <ac:spMkLst>
+            <pc:docMk/>
+            <pc:sldMk cId="1681145084" sldId="256"/>
+            <ac:spMk id="143" creationId="{E3975311-BD64-3FDD-977D-DB10934B7690}"/>
+          </ac:spMkLst>
+        </pc:spChg>
+        <pc:spChg chg="mod">
+          <ac:chgData name="Rich Edwards" userId="00f4226a-1697-4716-8928-b43d7726cc59" providerId="ADAL" clId="{8811C6CF-0419-8B48-A759-88B4EBFFCA77}" dt="2024-08-15T04:28:40.054" v="7" actId="571"/>
+          <ac:spMkLst>
+            <pc:docMk/>
+            <pc:sldMk cId="1681145084" sldId="256"/>
+            <ac:spMk id="144" creationId="{23FD25BB-EAD4-40FC-5927-294717A6DD46}"/>
+          </ac:spMkLst>
+        </pc:spChg>
+        <pc:spChg chg="mod">
+          <ac:chgData name="Rich Edwards" userId="00f4226a-1697-4716-8928-b43d7726cc59" providerId="ADAL" clId="{8811C6CF-0419-8B48-A759-88B4EBFFCA77}" dt="2024-08-15T04:28:40.054" v="7" actId="571"/>
+          <ac:spMkLst>
+            <pc:docMk/>
+            <pc:sldMk cId="1681145084" sldId="256"/>
+            <ac:spMk id="145" creationId="{A5441298-572D-2389-D31A-CE24E1A3C592}"/>
+          </ac:spMkLst>
+        </pc:spChg>
+        <pc:spChg chg="mod">
+          <ac:chgData name="Rich Edwards" userId="00f4226a-1697-4716-8928-b43d7726cc59" providerId="ADAL" clId="{8811C6CF-0419-8B48-A759-88B4EBFFCA77}" dt="2024-08-15T04:28:40.054" v="7" actId="571"/>
+          <ac:spMkLst>
+            <pc:docMk/>
+            <pc:sldMk cId="1681145084" sldId="256"/>
+            <ac:spMk id="146" creationId="{9644F19E-ED8E-8056-28BB-DE41496C3DCF}"/>
+          </ac:spMkLst>
+        </pc:spChg>
+        <pc:spChg chg="mod">
+          <ac:chgData name="Rich Edwards" userId="00f4226a-1697-4716-8928-b43d7726cc59" providerId="ADAL" clId="{8811C6CF-0419-8B48-A759-88B4EBFFCA77}" dt="2024-08-15T04:28:40.054" v="7" actId="571"/>
+          <ac:spMkLst>
+            <pc:docMk/>
+            <pc:sldMk cId="1681145084" sldId="256"/>
+            <ac:spMk id="147" creationId="{B6CBA031-C634-6892-655E-8D07D446ED6B}"/>
+          </ac:spMkLst>
+        </pc:spChg>
+        <pc:spChg chg="mod">
+          <ac:chgData name="Rich Edwards" userId="00f4226a-1697-4716-8928-b43d7726cc59" providerId="ADAL" clId="{8811C6CF-0419-8B48-A759-88B4EBFFCA77}" dt="2024-08-15T04:28:40.054" v="7" actId="571"/>
+          <ac:spMkLst>
+            <pc:docMk/>
+            <pc:sldMk cId="1681145084" sldId="256"/>
+            <ac:spMk id="148" creationId="{05114174-CCFE-CF0C-2A70-721EC4FE4E05}"/>
+          </ac:spMkLst>
+        </pc:spChg>
+        <pc:spChg chg="mod">
+          <ac:chgData name="Rich Edwards" userId="00f4226a-1697-4716-8928-b43d7726cc59" providerId="ADAL" clId="{8811C6CF-0419-8B48-A759-88B4EBFFCA77}" dt="2024-08-15T04:28:40.054" v="7" actId="571"/>
+          <ac:spMkLst>
+            <pc:docMk/>
+            <pc:sldMk cId="1681145084" sldId="256"/>
+            <ac:spMk id="149" creationId="{1771D492-7B0C-909C-3A8E-1FB4FA5B732A}"/>
+          </ac:spMkLst>
+        </pc:spChg>
+        <pc:spChg chg="mod">
+          <ac:chgData name="Rich Edwards" userId="00f4226a-1697-4716-8928-b43d7726cc59" providerId="ADAL" clId="{8811C6CF-0419-8B48-A759-88B4EBFFCA77}" dt="2024-08-15T04:28:40.054" v="7" actId="571"/>
+          <ac:spMkLst>
+            <pc:docMk/>
+            <pc:sldMk cId="1681145084" sldId="256"/>
+            <ac:spMk id="150" creationId="{E37E467F-6B06-B74C-B5DE-AFB7C9E8C09E}"/>
+          </ac:spMkLst>
+        </pc:spChg>
+        <pc:spChg chg="mod">
+          <ac:chgData name="Rich Edwards" userId="00f4226a-1697-4716-8928-b43d7726cc59" providerId="ADAL" clId="{8811C6CF-0419-8B48-A759-88B4EBFFCA77}" dt="2024-08-15T04:28:40.054" v="7" actId="571"/>
+          <ac:spMkLst>
+            <pc:docMk/>
+            <pc:sldMk cId="1681145084" sldId="256"/>
+            <ac:spMk id="151" creationId="{A8FB36AC-F98B-6855-CF29-85094DB174E1}"/>
+          </ac:spMkLst>
+        </pc:spChg>
+        <pc:spChg chg="mod">
+          <ac:chgData name="Rich Edwards" userId="00f4226a-1697-4716-8928-b43d7726cc59" providerId="ADAL" clId="{8811C6CF-0419-8B48-A759-88B4EBFFCA77}" dt="2024-08-15T04:28:40.054" v="7" actId="571"/>
+          <ac:spMkLst>
+            <pc:docMk/>
+            <pc:sldMk cId="1681145084" sldId="256"/>
+            <ac:spMk id="152" creationId="{A1FF0F59-F08F-76C2-1BC6-A8050A18E9A4}"/>
+          </ac:spMkLst>
+        </pc:spChg>
+        <pc:spChg chg="mod">
+          <ac:chgData name="Rich Edwards" userId="00f4226a-1697-4716-8928-b43d7726cc59" providerId="ADAL" clId="{8811C6CF-0419-8B48-A759-88B4EBFFCA77}" dt="2024-08-15T04:28:40.054" v="7" actId="571"/>
+          <ac:spMkLst>
+            <pc:docMk/>
+            <pc:sldMk cId="1681145084" sldId="256"/>
+            <ac:spMk id="153" creationId="{ED6AE2D9-C3AC-305F-BB61-36937E833C6B}"/>
+          </ac:spMkLst>
+        </pc:spChg>
+        <pc:spChg chg="mod">
+          <ac:chgData name="Rich Edwards" userId="00f4226a-1697-4716-8928-b43d7726cc59" providerId="ADAL" clId="{8811C6CF-0419-8B48-A759-88B4EBFFCA77}" dt="2024-08-15T04:28:40.054" v="7" actId="571"/>
+          <ac:spMkLst>
+            <pc:docMk/>
+            <pc:sldMk cId="1681145084" sldId="256"/>
+            <ac:spMk id="154" creationId="{2ED1D442-5800-1F90-FD16-D6813195925B}"/>
+          </ac:spMkLst>
+        </pc:spChg>
+        <pc:spChg chg="mod">
+          <ac:chgData name="Rich Edwards" userId="00f4226a-1697-4716-8928-b43d7726cc59" providerId="ADAL" clId="{8811C6CF-0419-8B48-A759-88B4EBFFCA77}" dt="2024-08-15T04:28:40.054" v="7" actId="571"/>
+          <ac:spMkLst>
+            <pc:docMk/>
+            <pc:sldMk cId="1681145084" sldId="256"/>
+            <ac:spMk id="155" creationId="{D545898F-4829-6CD5-67BF-A8E17BE3924F}"/>
+          </ac:spMkLst>
+        </pc:spChg>
+        <pc:spChg chg="mod">
+          <ac:chgData name="Rich Edwards" userId="00f4226a-1697-4716-8928-b43d7726cc59" providerId="ADAL" clId="{8811C6CF-0419-8B48-A759-88B4EBFFCA77}" dt="2024-08-15T04:28:40.054" v="7" actId="571"/>
+          <ac:spMkLst>
+            <pc:docMk/>
+            <pc:sldMk cId="1681145084" sldId="256"/>
+            <ac:spMk id="156" creationId="{3BB8E048-A970-0DD3-EAB6-11EAE6D4C0CF}"/>
+          </ac:spMkLst>
+        </pc:spChg>
+        <pc:spChg chg="mod">
+          <ac:chgData name="Rich Edwards" userId="00f4226a-1697-4716-8928-b43d7726cc59" providerId="ADAL" clId="{8811C6CF-0419-8B48-A759-88B4EBFFCA77}" dt="2024-08-15T04:28:40.054" v="7" actId="571"/>
+          <ac:spMkLst>
+            <pc:docMk/>
+            <pc:sldMk cId="1681145084" sldId="256"/>
+            <ac:spMk id="157" creationId="{1800E475-FF0B-E787-AD9F-5110F473FFF2}"/>
+          </ac:spMkLst>
+        </pc:spChg>
+        <pc:spChg chg="mod">
+          <ac:chgData name="Rich Edwards" userId="00f4226a-1697-4716-8928-b43d7726cc59" providerId="ADAL" clId="{8811C6CF-0419-8B48-A759-88B4EBFFCA77}" dt="2024-08-15T04:28:40.054" v="7" actId="571"/>
+          <ac:spMkLst>
+            <pc:docMk/>
+            <pc:sldMk cId="1681145084" sldId="256"/>
+            <ac:spMk id="158" creationId="{CF129758-8A24-F80A-F337-FB4EA09A8D74}"/>
+          </ac:spMkLst>
+        </pc:spChg>
+        <pc:spChg chg="mod">
+          <ac:chgData name="Rich Edwards" userId="00f4226a-1697-4716-8928-b43d7726cc59" providerId="ADAL" clId="{8811C6CF-0419-8B48-A759-88B4EBFFCA77}" dt="2024-08-15T04:28:40.054" v="7" actId="571"/>
+          <ac:spMkLst>
+            <pc:docMk/>
+            <pc:sldMk cId="1681145084" sldId="256"/>
+            <ac:spMk id="159" creationId="{7339E414-DD6D-CD1E-3A6C-EEB6B7AEE1B4}"/>
+          </ac:spMkLst>
+        </pc:spChg>
+        <pc:spChg chg="mod">
+          <ac:chgData name="Rich Edwards" userId="00f4226a-1697-4716-8928-b43d7726cc59" providerId="ADAL" clId="{8811C6CF-0419-8B48-A759-88B4EBFFCA77}" dt="2024-08-15T04:28:40.054" v="7" actId="571"/>
+          <ac:spMkLst>
+            <pc:docMk/>
+            <pc:sldMk cId="1681145084" sldId="256"/>
+            <ac:spMk id="160" creationId="{279849D2-D976-7A48-7CED-66C8B190CB27}"/>
+          </ac:spMkLst>
+        </pc:spChg>
+        <pc:spChg chg="mod">
+          <ac:chgData name="Rich Edwards" userId="00f4226a-1697-4716-8928-b43d7726cc59" providerId="ADAL" clId="{8811C6CF-0419-8B48-A759-88B4EBFFCA77}" dt="2024-08-15T04:28:40.054" v="7" actId="571"/>
+          <ac:spMkLst>
+            <pc:docMk/>
+            <pc:sldMk cId="1681145084" sldId="256"/>
+            <ac:spMk id="161" creationId="{EE642D83-2934-8E02-6932-564C5A774714}"/>
+          </ac:spMkLst>
+        </pc:spChg>
+        <pc:grpChg chg="add mod">
+          <ac:chgData name="Rich Edwards" userId="00f4226a-1697-4716-8928-b43d7726cc59" providerId="ADAL" clId="{8811C6CF-0419-8B48-A759-88B4EBFFCA77}" dt="2024-08-15T04:28:29.884" v="5" actId="14100"/>
+          <ac:grpSpMkLst>
+            <pc:docMk/>
+            <pc:sldMk cId="1681145084" sldId="256"/>
+            <ac:grpSpMk id="2" creationId="{92C89A18-AAB7-C71A-11A1-00E78FEE58FC}"/>
+          </ac:grpSpMkLst>
+        </pc:grpChg>
+        <pc:grpChg chg="mod">
+          <ac:chgData name="Rich Edwards" userId="00f4226a-1697-4716-8928-b43d7726cc59" providerId="ADAL" clId="{8811C6CF-0419-8B48-A759-88B4EBFFCA77}" dt="2024-08-15T04:27:34.318" v="0" actId="571"/>
+          <ac:grpSpMkLst>
+            <pc:docMk/>
+            <pc:sldMk cId="1681145084" sldId="256"/>
+            <ac:grpSpMk id="4" creationId="{58AFE4F2-F708-11FE-236E-7A2558E62102}"/>
+          </ac:grpSpMkLst>
+        </pc:grpChg>
+        <pc:grpChg chg="mod">
+          <ac:chgData name="Rich Edwards" userId="00f4226a-1697-4716-8928-b43d7726cc59" providerId="ADAL" clId="{8811C6CF-0419-8B48-A759-88B4EBFFCA77}" dt="2024-08-15T04:27:34.318" v="0" actId="571"/>
+          <ac:grpSpMkLst>
+            <pc:docMk/>
+            <pc:sldMk cId="1681145084" sldId="256"/>
+            <ac:grpSpMk id="5" creationId="{95BA1810-1DAB-9852-7CD3-88FE5B7F7F72}"/>
+          </ac:grpSpMkLst>
+        </pc:grpChg>
+        <pc:grpChg chg="mod">
+          <ac:chgData name="Rich Edwards" userId="00f4226a-1697-4716-8928-b43d7726cc59" providerId="ADAL" clId="{8811C6CF-0419-8B48-A759-88B4EBFFCA77}" dt="2024-08-15T04:27:34.318" v="0" actId="571"/>
+          <ac:grpSpMkLst>
+            <pc:docMk/>
+            <pc:sldMk cId="1681145084" sldId="256"/>
+            <ac:grpSpMk id="6" creationId="{4531B675-FAF8-D7EA-460E-618FF942EEA0}"/>
+          </ac:grpSpMkLst>
+        </pc:grpChg>
+        <pc:grpChg chg="mod">
+          <ac:chgData name="Rich Edwards" userId="00f4226a-1697-4716-8928-b43d7726cc59" providerId="ADAL" clId="{8811C6CF-0419-8B48-A759-88B4EBFFCA77}" dt="2024-08-15T04:27:34.318" v="0" actId="571"/>
+          <ac:grpSpMkLst>
+            <pc:docMk/>
+            <pc:sldMk cId="1681145084" sldId="256"/>
+            <ac:grpSpMk id="7" creationId="{0D42A7B9-E6E2-C112-2958-B4DE8BEAB233}"/>
+          </ac:grpSpMkLst>
+        </pc:grpChg>
+        <pc:grpChg chg="mod">
+          <ac:chgData name="Rich Edwards" userId="00f4226a-1697-4716-8928-b43d7726cc59" providerId="ADAL" clId="{8811C6CF-0419-8B48-A759-88B4EBFFCA77}" dt="2024-08-15T04:27:34.318" v="0" actId="571"/>
+          <ac:grpSpMkLst>
+            <pc:docMk/>
+            <pc:sldMk cId="1681145084" sldId="256"/>
+            <ac:grpSpMk id="8" creationId="{B3DE2DBD-0BA2-9B7C-FC2B-7A8BF2AF426C}"/>
+          </ac:grpSpMkLst>
+        </pc:grpChg>
+        <pc:grpChg chg="mod">
+          <ac:chgData name="Rich Edwards" userId="00f4226a-1697-4716-8928-b43d7726cc59" providerId="ADAL" clId="{8811C6CF-0419-8B48-A759-88B4EBFFCA77}" dt="2024-08-15T04:27:34.318" v="0" actId="571"/>
+          <ac:grpSpMkLst>
+            <pc:docMk/>
+            <pc:sldMk cId="1681145084" sldId="256"/>
+            <ac:grpSpMk id="9" creationId="{9B4E11E6-7248-53C3-50B4-62C3EAFE5EAC}"/>
+          </ac:grpSpMkLst>
+        </pc:grpChg>
+        <pc:grpChg chg="mod">
+          <ac:chgData name="Rich Edwards" userId="00f4226a-1697-4716-8928-b43d7726cc59" providerId="ADAL" clId="{8811C6CF-0419-8B48-A759-88B4EBFFCA77}" dt="2024-08-15T04:27:34.318" v="0" actId="571"/>
+          <ac:grpSpMkLst>
+            <pc:docMk/>
+            <pc:sldMk cId="1681145084" sldId="256"/>
+            <ac:grpSpMk id="10" creationId="{D9F6D53D-3B43-EF6C-8239-A800F07938EB}"/>
+          </ac:grpSpMkLst>
+        </pc:grpChg>
+        <pc:grpChg chg="mod">
+          <ac:chgData name="Rich Edwards" userId="00f4226a-1697-4716-8928-b43d7726cc59" providerId="ADAL" clId="{8811C6CF-0419-8B48-A759-88B4EBFFCA77}" dt="2024-08-15T04:27:34.318" v="0" actId="571"/>
+          <ac:grpSpMkLst>
+            <pc:docMk/>
+            <pc:sldMk cId="1681145084" sldId="256"/>
+            <ac:grpSpMk id="11" creationId="{98A46392-D060-D512-5C1F-137651A9ABAE}"/>
+          </ac:grpSpMkLst>
+        </pc:grpChg>
+        <pc:grpChg chg="add del mod">
+          <ac:chgData name="Rich Edwards" userId="00f4226a-1697-4716-8928-b43d7726cc59" providerId="ADAL" clId="{8811C6CF-0419-8B48-A759-88B4EBFFCA77}" dt="2024-08-15T04:28:43.896" v="8" actId="165"/>
+          <ac:grpSpMkLst>
+            <pc:docMk/>
+            <pc:sldMk cId="1681145084" sldId="256"/>
+            <ac:grpSpMk id="104" creationId="{7F0B0E8C-F4B6-D5F9-692E-624895CA71BE}"/>
+          </ac:grpSpMkLst>
+        </pc:grpChg>
+        <pc:grpChg chg="mod topLvl">
+          <ac:chgData name="Rich Edwards" userId="00f4226a-1697-4716-8928-b43d7726cc59" providerId="ADAL" clId="{8811C6CF-0419-8B48-A759-88B4EBFFCA77}" dt="2024-08-15T04:28:43.896" v="8" actId="165"/>
+          <ac:grpSpMkLst>
+            <pc:docMk/>
+            <pc:sldMk cId="1681145084" sldId="256"/>
+            <ac:grpSpMk id="106" creationId="{4C3B949F-EB40-5FE6-7C6C-8B0156DA1B80}"/>
+          </ac:grpSpMkLst>
+        </pc:grpChg>
+        <pc:grpChg chg="mod topLvl">
+          <ac:chgData name="Rich Edwards" userId="00f4226a-1697-4716-8928-b43d7726cc59" providerId="ADAL" clId="{8811C6CF-0419-8B48-A759-88B4EBFFCA77}" dt="2024-08-15T04:28:43.896" v="8" actId="165"/>
+          <ac:grpSpMkLst>
+            <pc:docMk/>
+            <pc:sldMk cId="1681145084" sldId="256"/>
+            <ac:grpSpMk id="107" creationId="{CF1FAFB2-74DA-ED04-7691-EDB9B62D3126}"/>
+          </ac:grpSpMkLst>
+        </pc:grpChg>
+        <pc:grpChg chg="mod topLvl">
+          <ac:chgData name="Rich Edwards" userId="00f4226a-1697-4716-8928-b43d7726cc59" providerId="ADAL" clId="{8811C6CF-0419-8B48-A759-88B4EBFFCA77}" dt="2024-08-15T04:28:43.896" v="8" actId="165"/>
+          <ac:grpSpMkLst>
+            <pc:docMk/>
+            <pc:sldMk cId="1681145084" sldId="256"/>
+            <ac:grpSpMk id="108" creationId="{5C4C36F4-2AD2-715D-BBF2-5F91880CB2B6}"/>
+          </ac:grpSpMkLst>
+        </pc:grpChg>
+        <pc:grpChg chg="mod topLvl">
+          <ac:chgData name="Rich Edwards" userId="00f4226a-1697-4716-8928-b43d7726cc59" providerId="ADAL" clId="{8811C6CF-0419-8B48-A759-88B4EBFFCA77}" dt="2024-08-15T04:28:43.896" v="8" actId="165"/>
+          <ac:grpSpMkLst>
+            <pc:docMk/>
+            <pc:sldMk cId="1681145084" sldId="256"/>
+            <ac:grpSpMk id="109" creationId="{EF1ED84C-EF85-6B72-7204-5F6950955D26}"/>
+          </ac:grpSpMkLst>
+        </pc:grpChg>
+        <pc:grpChg chg="del mod topLvl">
+          <ac:chgData name="Rich Edwards" userId="00f4226a-1697-4716-8928-b43d7726cc59" providerId="ADAL" clId="{8811C6CF-0419-8B48-A759-88B4EBFFCA77}" dt="2024-08-15T04:29:31.356" v="16" actId="478"/>
+          <ac:grpSpMkLst>
+            <pc:docMk/>
+            <pc:sldMk cId="1681145084" sldId="256"/>
+            <ac:grpSpMk id="110" creationId="{734F6DD6-DE7F-BC4C-7776-7B7E83EE2EA1}"/>
+          </ac:grpSpMkLst>
+        </pc:grpChg>
+        <pc:grpChg chg="del mod topLvl">
+          <ac:chgData name="Rich Edwards" userId="00f4226a-1697-4716-8928-b43d7726cc59" providerId="ADAL" clId="{8811C6CF-0419-8B48-A759-88B4EBFFCA77}" dt="2024-08-15T04:29:31.356" v="16" actId="478"/>
+          <ac:grpSpMkLst>
+            <pc:docMk/>
+            <pc:sldMk cId="1681145084" sldId="256"/>
+            <ac:grpSpMk id="111" creationId="{91D75AE8-AC43-E301-9541-D786A9A83A2A}"/>
+          </ac:grpSpMkLst>
+        </pc:grpChg>
+        <pc:grpChg chg="del mod topLvl">
+          <ac:chgData name="Rich Edwards" userId="00f4226a-1697-4716-8928-b43d7726cc59" providerId="ADAL" clId="{8811C6CF-0419-8B48-A759-88B4EBFFCA77}" dt="2024-08-15T04:29:31.356" v="16" actId="478"/>
+          <ac:grpSpMkLst>
+            <pc:docMk/>
+            <pc:sldMk cId="1681145084" sldId="256"/>
+            <ac:grpSpMk id="112" creationId="{8EA60073-F01F-5352-FC50-2D0CF9B21C88}"/>
+          </ac:grpSpMkLst>
+        </pc:grpChg>
+        <pc:grpChg chg="del mod topLvl">
+          <ac:chgData name="Rich Edwards" userId="00f4226a-1697-4716-8928-b43d7726cc59" providerId="ADAL" clId="{8811C6CF-0419-8B48-A759-88B4EBFFCA77}" dt="2024-08-15T04:29:31.356" v="16" actId="478"/>
+          <ac:grpSpMkLst>
+            <pc:docMk/>
+            <pc:sldMk cId="1681145084" sldId="256"/>
+            <ac:grpSpMk id="113" creationId="{B752D5DD-ED85-E89D-F36C-D2E9786BE803}"/>
+          </ac:grpSpMkLst>
+        </pc:grpChg>
+        <pc:grpChg chg="add del mod">
+          <ac:chgData name="Rich Edwards" userId="00f4226a-1697-4716-8928-b43d7726cc59" providerId="ADAL" clId="{8811C6CF-0419-8B48-A759-88B4EBFFCA77}" dt="2024-08-15T04:28:43.896" v="8" actId="165"/>
+          <ac:grpSpMkLst>
+            <pc:docMk/>
+            <pc:sldMk cId="1681145084" sldId="256"/>
+            <ac:grpSpMk id="133" creationId="{38FEFCB3-671C-A8D7-704E-E2BFF3BA4EEE}"/>
+          </ac:grpSpMkLst>
+        </pc:grpChg>
+        <pc:grpChg chg="del mod topLvl">
+          <ac:chgData name="Rich Edwards" userId="00f4226a-1697-4716-8928-b43d7726cc59" providerId="ADAL" clId="{8811C6CF-0419-8B48-A759-88B4EBFFCA77}" dt="2024-08-15T04:28:55.695" v="9" actId="478"/>
+          <ac:grpSpMkLst>
+            <pc:docMk/>
+            <pc:sldMk cId="1681145084" sldId="256"/>
+            <ac:grpSpMk id="135" creationId="{D8DD0311-C17A-2B33-6409-909C2A9E8560}"/>
+          </ac:grpSpMkLst>
+        </pc:grpChg>
+        <pc:grpChg chg="del mod topLvl">
+          <ac:chgData name="Rich Edwards" userId="00f4226a-1697-4716-8928-b43d7726cc59" providerId="ADAL" clId="{8811C6CF-0419-8B48-A759-88B4EBFFCA77}" dt="2024-08-15T04:28:55.695" v="9" actId="478"/>
+          <ac:grpSpMkLst>
+            <pc:docMk/>
+            <pc:sldMk cId="1681145084" sldId="256"/>
+            <ac:grpSpMk id="136" creationId="{83344AB1-5505-E54A-935F-540F8270CA4D}"/>
+          </ac:grpSpMkLst>
+        </pc:grpChg>
+        <pc:grpChg chg="del mod topLvl">
+          <ac:chgData name="Rich Edwards" userId="00f4226a-1697-4716-8928-b43d7726cc59" providerId="ADAL" clId="{8811C6CF-0419-8B48-A759-88B4EBFFCA77}" dt="2024-08-15T04:28:55.695" v="9" actId="478"/>
+          <ac:grpSpMkLst>
+            <pc:docMk/>
+            <pc:sldMk cId="1681145084" sldId="256"/>
+            <ac:grpSpMk id="137" creationId="{17DC612B-A038-B0DE-3CFD-D005A63454F6}"/>
+          </ac:grpSpMkLst>
+        </pc:grpChg>
+        <pc:grpChg chg="del mod topLvl">
+          <ac:chgData name="Rich Edwards" userId="00f4226a-1697-4716-8928-b43d7726cc59" providerId="ADAL" clId="{8811C6CF-0419-8B48-A759-88B4EBFFCA77}" dt="2024-08-15T04:28:55.695" v="9" actId="478"/>
+          <ac:grpSpMkLst>
+            <pc:docMk/>
+            <pc:sldMk cId="1681145084" sldId="256"/>
+            <ac:grpSpMk id="138" creationId="{97333D73-F5EC-9276-2501-8C3BEAC4BFCE}"/>
+          </ac:grpSpMkLst>
+        </pc:grpChg>
+        <pc:grpChg chg="mod topLvl">
+          <ac:chgData name="Rich Edwards" userId="00f4226a-1697-4716-8928-b43d7726cc59" providerId="ADAL" clId="{8811C6CF-0419-8B48-A759-88B4EBFFCA77}" dt="2024-08-15T04:29:21.300" v="14" actId="1076"/>
+          <ac:grpSpMkLst>
+            <pc:docMk/>
+            <pc:sldMk cId="1681145084" sldId="256"/>
+            <ac:grpSpMk id="139" creationId="{045FC6BD-922A-D3C2-EDF2-06FC7B6D8736}"/>
+          </ac:grpSpMkLst>
+        </pc:grpChg>
+        <pc:grpChg chg="mod topLvl">
+          <ac:chgData name="Rich Edwards" userId="00f4226a-1697-4716-8928-b43d7726cc59" providerId="ADAL" clId="{8811C6CF-0419-8B48-A759-88B4EBFFCA77}" dt="2024-08-15T04:29:21.300" v="14" actId="1076"/>
+          <ac:grpSpMkLst>
+            <pc:docMk/>
+            <pc:sldMk cId="1681145084" sldId="256"/>
+            <ac:grpSpMk id="140" creationId="{896BD373-F119-EF05-9216-2C4B7814D7A0}"/>
+          </ac:grpSpMkLst>
+        </pc:grpChg>
+        <pc:grpChg chg="mod topLvl">
+          <ac:chgData name="Rich Edwards" userId="00f4226a-1697-4716-8928-b43d7726cc59" providerId="ADAL" clId="{8811C6CF-0419-8B48-A759-88B4EBFFCA77}" dt="2024-08-15T04:29:21.300" v="14" actId="1076"/>
+          <ac:grpSpMkLst>
+            <pc:docMk/>
+            <pc:sldMk cId="1681145084" sldId="256"/>
+            <ac:grpSpMk id="141" creationId="{F0BE1911-631C-26A6-EC37-49A175F4F052}"/>
+          </ac:grpSpMkLst>
+        </pc:grpChg>
+        <pc:grpChg chg="mod topLvl">
+          <ac:chgData name="Rich Edwards" userId="00f4226a-1697-4716-8928-b43d7726cc59" providerId="ADAL" clId="{8811C6CF-0419-8B48-A759-88B4EBFFCA77}" dt="2024-08-15T04:29:21.300" v="14" actId="1076"/>
+          <ac:grpSpMkLst>
+            <pc:docMk/>
+            <pc:sldMk cId="1681145084" sldId="256"/>
+            <ac:grpSpMk id="142" creationId="{76E4828A-590C-3C2B-AAE6-67EE0F2823F4}"/>
+          </ac:grpSpMkLst>
+        </pc:grpChg>
+        <pc:grpChg chg="add">
+          <ac:chgData name="Rich Edwards" userId="00f4226a-1697-4716-8928-b43d7726cc59" providerId="ADAL" clId="{8811C6CF-0419-8B48-A759-88B4EBFFCA77}" dt="2024-08-15T04:29:39.779" v="17" actId="164"/>
+          <ac:grpSpMkLst>
+            <pc:docMk/>
+            <pc:sldMk cId="1681145084" sldId="256"/>
+            <ac:grpSpMk id="162" creationId="{0BD4FE16-BA15-39CE-7837-40AAB1BFAFD3}"/>
+          </ac:grpSpMkLst>
+        </pc:grpChg>
+      </pc:sldChg>
+    </pc:docChg>
+  </pc:docChgLst>
+</pc:chgInfo>
 </file>
 
 <file path=ppt/slideLayouts/slideLayout1.xml><?xml version="1.0" encoding="utf-8"?>
@@ -264,7 +994,7 @@
           <a:p>
             <a:fld id="{AD1FA78F-BF5D-AF4E-806D-83B291B0B8BA}" type="datetimeFigureOut">
               <a:rPr lang="en-AU" smtClean="0"/>
-              <a:t>30/4/2024</a:t>
+              <a:t>15/8/2024</a:t>
             </a:fld>
             <a:endParaRPr lang="en-AU"/>
           </a:p>
@@ -464,7 +1194,7 @@
           <a:p>
             <a:fld id="{AD1FA78F-BF5D-AF4E-806D-83B291B0B8BA}" type="datetimeFigureOut">
               <a:rPr lang="en-AU" smtClean="0"/>
-              <a:t>30/4/2024</a:t>
+              <a:t>15/8/2024</a:t>
             </a:fld>
             <a:endParaRPr lang="en-AU"/>
           </a:p>
@@ -674,7 +1404,7 @@
           <a:p>
             <a:fld id="{AD1FA78F-BF5D-AF4E-806D-83B291B0B8BA}" type="datetimeFigureOut">
               <a:rPr lang="en-AU" smtClean="0"/>
-              <a:t>30/4/2024</a:t>
+              <a:t>15/8/2024</a:t>
             </a:fld>
             <a:endParaRPr lang="en-AU"/>
           </a:p>
@@ -874,7 +1604,7 @@
           <a:p>
             <a:fld id="{AD1FA78F-BF5D-AF4E-806D-83B291B0B8BA}" type="datetimeFigureOut">
               <a:rPr lang="en-AU" smtClean="0"/>
-              <a:t>30/4/2024</a:t>
+              <a:t>15/8/2024</a:t>
             </a:fld>
             <a:endParaRPr lang="en-AU"/>
           </a:p>
@@ -1150,7 +1880,7 @@
           <a:p>
             <a:fld id="{AD1FA78F-BF5D-AF4E-806D-83B291B0B8BA}" type="datetimeFigureOut">
               <a:rPr lang="en-AU" smtClean="0"/>
-              <a:t>30/4/2024</a:t>
+              <a:t>15/8/2024</a:t>
             </a:fld>
             <a:endParaRPr lang="en-AU"/>
           </a:p>
@@ -1418,7 +2148,7 @@
           <a:p>
             <a:fld id="{AD1FA78F-BF5D-AF4E-806D-83B291B0B8BA}" type="datetimeFigureOut">
               <a:rPr lang="en-AU" smtClean="0"/>
-              <a:t>30/4/2024</a:t>
+              <a:t>15/8/2024</a:t>
             </a:fld>
             <a:endParaRPr lang="en-AU"/>
           </a:p>
@@ -1833,7 +2563,7 @@
           <a:p>
             <a:fld id="{AD1FA78F-BF5D-AF4E-806D-83B291B0B8BA}" type="datetimeFigureOut">
               <a:rPr lang="en-AU" smtClean="0"/>
-              <a:t>30/4/2024</a:t>
+              <a:t>15/8/2024</a:t>
             </a:fld>
             <a:endParaRPr lang="en-AU"/>
           </a:p>
@@ -1975,7 +2705,7 @@
           <a:p>
             <a:fld id="{AD1FA78F-BF5D-AF4E-806D-83B291B0B8BA}" type="datetimeFigureOut">
               <a:rPr lang="en-AU" smtClean="0"/>
-              <a:t>30/4/2024</a:t>
+              <a:t>15/8/2024</a:t>
             </a:fld>
             <a:endParaRPr lang="en-AU"/>
           </a:p>
@@ -2088,7 +2818,7 @@
           <a:p>
             <a:fld id="{AD1FA78F-BF5D-AF4E-806D-83B291B0B8BA}" type="datetimeFigureOut">
               <a:rPr lang="en-AU" smtClean="0"/>
-              <a:t>30/4/2024</a:t>
+              <a:t>15/8/2024</a:t>
             </a:fld>
             <a:endParaRPr lang="en-AU"/>
           </a:p>
@@ -2401,7 +3131,7 @@
           <a:p>
             <a:fld id="{AD1FA78F-BF5D-AF4E-806D-83B291B0B8BA}" type="datetimeFigureOut">
               <a:rPr lang="en-AU" smtClean="0"/>
-              <a:t>30/4/2024</a:t>
+              <a:t>15/8/2024</a:t>
             </a:fld>
             <a:endParaRPr lang="en-AU"/>
           </a:p>
@@ -2690,7 +3420,7 @@
           <a:p>
             <a:fld id="{AD1FA78F-BF5D-AF4E-806D-83B291B0B8BA}" type="datetimeFigureOut">
               <a:rPr lang="en-AU" smtClean="0"/>
-              <a:t>30/4/2024</a:t>
+              <a:t>15/8/2024</a:t>
             </a:fld>
             <a:endParaRPr lang="en-AU"/>
           </a:p>
@@ -2933,7 +3663,7 @@
           <a:p>
             <a:fld id="{AD1FA78F-BF5D-AF4E-806D-83B291B0B8BA}" type="datetimeFigureOut">
               <a:rPr lang="en-AU" smtClean="0"/>
-              <a:t>30/4/2024</a:t>
+              <a:t>15/8/2024</a:t>
             </a:fld>
             <a:endParaRPr lang="en-AU"/>
           </a:p>
@@ -7930,6 +8660,3186 @@
           </p:sp>
         </p:grpSp>
       </p:grpSp>
+      <p:grpSp>
+        <p:nvGrpSpPr>
+          <p:cNvPr id="2" name="Group 1">
+            <a:extLst>
+              <a:ext uri="{FF2B5EF4-FFF2-40B4-BE49-F238E27FC236}">
+                <a16:creationId xmlns:a16="http://schemas.microsoft.com/office/drawing/2014/main" id="{92C89A18-AAB7-C71A-11A1-00E78FEE58FC}"/>
+              </a:ext>
+            </a:extLst>
+          </p:cNvPr>
+          <p:cNvGrpSpPr/>
+          <p:nvPr/>
+        </p:nvGrpSpPr>
+        <p:grpSpPr>
+          <a:xfrm>
+            <a:off x="116394" y="4467494"/>
+            <a:ext cx="8996291" cy="317448"/>
+            <a:chOff x="116394" y="3797351"/>
+            <a:chExt cx="12075606" cy="400000"/>
+          </a:xfrm>
+        </p:grpSpPr>
+        <p:sp>
+          <p:nvSpPr>
+            <p:cNvPr id="3" name="Rectangle 2">
+              <a:extLst>
+                <a:ext uri="{FF2B5EF4-FFF2-40B4-BE49-F238E27FC236}">
+                  <a16:creationId xmlns:a16="http://schemas.microsoft.com/office/drawing/2014/main" id="{A7945DFF-BBFC-D16D-DCBE-51BB27275C3C}"/>
+                </a:ext>
+              </a:extLst>
+            </p:cNvPr>
+            <p:cNvSpPr/>
+            <p:nvPr/>
+          </p:nvSpPr>
+          <p:spPr bwMode="auto">
+            <a:xfrm>
+              <a:off x="116394" y="3797351"/>
+              <a:ext cx="12075606" cy="400000"/>
+            </a:xfrm>
+            <a:prstGeom prst="rect">
+              <a:avLst/>
+            </a:prstGeom>
+            <a:solidFill>
+              <a:srgbClr val="FFFFFF"/>
+            </a:solidFill>
+            <a:ln w="19050" cap="flat" cmpd="sng" algn="ctr">
+              <a:solidFill>
+                <a:srgbClr val="323D43"/>
+              </a:solidFill>
+              <a:prstDash val="solid"/>
+              <a:round/>
+              <a:headEnd type="none" w="med" len="med"/>
+              <a:tailEnd type="none" w="med" len="med"/>
+            </a:ln>
+            <a:effectLst/>
+          </p:spPr>
+          <p:txBody>
+            <a:bodyPr vert="horz" wrap="none" lIns="0" tIns="45720" rIns="91440" bIns="45720" numCol="1" rtlCol="0" anchor="ctr" anchorCtr="0" compatLnSpc="1">
+              <a:prstTxWarp prst="textNoShape">
+                <a:avLst/>
+              </a:prstTxWarp>
+            </a:bodyPr>
+            <a:lstStyle/>
+            <a:p>
+              <a:pPr marL="342900" marR="0" lvl="0" indent="-342900" algn="ctr" defTabSz="914400" eaLnBrk="1" fontAlgn="base" latinLnBrk="0" hangingPunct="1">
+                <a:lnSpc>
+                  <a:spcPct val="100000"/>
+                </a:lnSpc>
+                <a:spcBef>
+                  <a:spcPct val="40000"/>
+                </a:spcBef>
+                <a:spcAft>
+                  <a:spcPct val="20000"/>
+                </a:spcAft>
+                <a:buClr>
+                  <a:srgbClr val="0D01FF"/>
+                </a:buClr>
+                <a:buSzTx/>
+                <a:buFont typeface="Wingdings" pitchFamily="2" charset="2"/>
+                <a:buChar char="§"/>
+                <a:tabLst/>
+                <a:defRPr/>
+              </a:pPr>
+              <a:endParaRPr kumimoji="0" lang="en-US" sz="1000" b="0" i="0" u="none" strike="noStrike" kern="0" cap="none" spc="0" normalizeH="0" baseline="0" noProof="0" dirty="0">
+                <a:ln>
+                  <a:noFill/>
+                </a:ln>
+                <a:solidFill>
+                  <a:srgbClr val="323D43"/>
+                </a:solidFill>
+                <a:effectLst/>
+                <a:uLnTx/>
+                <a:uFillTx/>
+                <a:latin typeface="Georgia" pitchFamily="18" charset="0"/>
+                <a:ea typeface="ＭＳ Ｐゴシック" pitchFamily="34" charset="-128"/>
+              </a:endParaRPr>
+            </a:p>
+          </p:txBody>
+        </p:sp>
+        <p:grpSp>
+          <p:nvGrpSpPr>
+            <p:cNvPr id="4" name="Group 3">
+              <a:extLst>
+                <a:ext uri="{FF2B5EF4-FFF2-40B4-BE49-F238E27FC236}">
+                  <a16:creationId xmlns:a16="http://schemas.microsoft.com/office/drawing/2014/main" id="{58AFE4F2-F708-11FE-236E-7A2558E62102}"/>
+                </a:ext>
+              </a:extLst>
+            </p:cNvPr>
+            <p:cNvGrpSpPr/>
+            <p:nvPr/>
+          </p:nvGrpSpPr>
+          <p:grpSpPr>
+            <a:xfrm>
+              <a:off x="1242032" y="3886822"/>
+              <a:ext cx="1415381" cy="153888"/>
+              <a:chOff x="313564" y="4112938"/>
+              <a:chExt cx="1415381" cy="153888"/>
+            </a:xfrm>
+          </p:grpSpPr>
+          <p:sp>
+            <p:nvSpPr>
+              <p:cNvPr id="101" name="Oval 100">
+                <a:extLst>
+                  <a:ext uri="{FF2B5EF4-FFF2-40B4-BE49-F238E27FC236}">
+                    <a16:creationId xmlns:a16="http://schemas.microsoft.com/office/drawing/2014/main" id="{BE5D3E0A-ABC4-A333-B6A0-208E3F4D6597}"/>
+                  </a:ext>
+                </a:extLst>
+              </p:cNvPr>
+              <p:cNvSpPr/>
+              <p:nvPr/>
+            </p:nvSpPr>
+            <p:spPr bwMode="auto">
+              <a:xfrm>
+                <a:off x="452617" y="4147020"/>
+                <a:ext cx="85725" cy="85725"/>
+              </a:xfrm>
+              <a:prstGeom prst="ellipse">
+                <a:avLst/>
+              </a:prstGeom>
+              <a:solidFill>
+                <a:srgbClr val="000000"/>
+              </a:solidFill>
+              <a:ln w="12700" cap="flat" cmpd="sng" algn="ctr">
+                <a:solidFill>
+                  <a:srgbClr val="323D43"/>
+                </a:solidFill>
+                <a:prstDash val="solid"/>
+                <a:round/>
+                <a:headEnd type="none" w="med" len="med"/>
+                <a:tailEnd type="none" w="med" len="med"/>
+              </a:ln>
+              <a:effectLst/>
+            </p:spPr>
+            <p:txBody>
+              <a:bodyPr vert="horz" wrap="none" lIns="0" tIns="45720" rIns="91440" bIns="45720" numCol="1" rtlCol="0" anchor="ctr" anchorCtr="0" compatLnSpc="1">
+                <a:prstTxWarp prst="textNoShape">
+                  <a:avLst/>
+                </a:prstTxWarp>
+              </a:bodyPr>
+              <a:lstStyle/>
+              <a:p>
+                <a:pPr marL="342900" marR="0" lvl="0" indent="-342900" algn="ctr" defTabSz="914400" eaLnBrk="1" fontAlgn="base" latinLnBrk="0" hangingPunct="1">
+                  <a:lnSpc>
+                    <a:spcPct val="100000"/>
+                  </a:lnSpc>
+                  <a:spcBef>
+                    <a:spcPct val="40000"/>
+                  </a:spcBef>
+                  <a:spcAft>
+                    <a:spcPct val="20000"/>
+                  </a:spcAft>
+                  <a:buClr>
+                    <a:srgbClr val="0D01FF"/>
+                  </a:buClr>
+                  <a:buSzTx/>
+                  <a:buFont typeface="Wingdings" pitchFamily="2" charset="2"/>
+                  <a:buChar char="§"/>
+                  <a:tabLst/>
+                  <a:defRPr/>
+                </a:pPr>
+                <a:endParaRPr kumimoji="0" lang="en-US" sz="1000" b="0" i="0" u="none" strike="noStrike" kern="0" cap="none" spc="0" normalizeH="0" baseline="0" noProof="0">
+                  <a:ln>
+                    <a:noFill/>
+                  </a:ln>
+                  <a:solidFill>
+                    <a:srgbClr val="323D43"/>
+                  </a:solidFill>
+                  <a:effectLst/>
+                  <a:uLnTx/>
+                  <a:uFillTx/>
+                  <a:latin typeface="Georgia" pitchFamily="18" charset="0"/>
+                  <a:ea typeface="ＭＳ Ｐゴシック" pitchFamily="34" charset="-128"/>
+                </a:endParaRPr>
+              </a:p>
+            </p:txBody>
+          </p:sp>
+          <p:sp>
+            <p:nvSpPr>
+              <p:cNvPr id="102" name="Oval 101">
+                <a:extLst>
+                  <a:ext uri="{FF2B5EF4-FFF2-40B4-BE49-F238E27FC236}">
+                    <a16:creationId xmlns:a16="http://schemas.microsoft.com/office/drawing/2014/main" id="{A4B43929-4250-4E0B-30B9-AA84143B1C9F}"/>
+                  </a:ext>
+                </a:extLst>
+              </p:cNvPr>
+              <p:cNvSpPr/>
+              <p:nvPr/>
+            </p:nvSpPr>
+            <p:spPr bwMode="auto">
+              <a:xfrm>
+                <a:off x="313564" y="4149673"/>
+                <a:ext cx="85725" cy="85725"/>
+              </a:xfrm>
+              <a:prstGeom prst="ellipse">
+                <a:avLst/>
+              </a:prstGeom>
+              <a:solidFill>
+                <a:srgbClr val="0D01FF"/>
+              </a:solidFill>
+              <a:ln w="12700" cap="flat" cmpd="sng" algn="ctr">
+                <a:solidFill>
+                  <a:srgbClr val="0D01FF"/>
+                </a:solidFill>
+                <a:prstDash val="solid"/>
+                <a:round/>
+                <a:headEnd type="none" w="med" len="med"/>
+                <a:tailEnd type="none" w="med" len="med"/>
+              </a:ln>
+              <a:effectLst/>
+            </p:spPr>
+            <p:txBody>
+              <a:bodyPr vert="horz" wrap="none" lIns="0" tIns="45720" rIns="91440" bIns="45720" numCol="1" rtlCol="0" anchor="ctr" anchorCtr="0" compatLnSpc="1">
+                <a:prstTxWarp prst="textNoShape">
+                  <a:avLst/>
+                </a:prstTxWarp>
+              </a:bodyPr>
+              <a:lstStyle/>
+              <a:p>
+                <a:pPr marL="342900" marR="0" lvl="0" indent="-342900" algn="ctr" defTabSz="914400" eaLnBrk="1" fontAlgn="base" latinLnBrk="0" hangingPunct="1">
+                  <a:lnSpc>
+                    <a:spcPct val="100000"/>
+                  </a:lnSpc>
+                  <a:spcBef>
+                    <a:spcPct val="40000"/>
+                  </a:spcBef>
+                  <a:spcAft>
+                    <a:spcPct val="20000"/>
+                  </a:spcAft>
+                  <a:buClr>
+                    <a:srgbClr val="0D01FF"/>
+                  </a:buClr>
+                  <a:buSzTx/>
+                  <a:buFont typeface="Wingdings" pitchFamily="2" charset="2"/>
+                  <a:buChar char="§"/>
+                  <a:tabLst/>
+                  <a:defRPr/>
+                </a:pPr>
+                <a:endParaRPr kumimoji="0" lang="en-US" sz="1000" b="0" i="0" u="none" strike="noStrike" kern="0" cap="none" spc="0" normalizeH="0" baseline="0" noProof="0">
+                  <a:ln>
+                    <a:noFill/>
+                  </a:ln>
+                  <a:solidFill>
+                    <a:srgbClr val="323D43"/>
+                  </a:solidFill>
+                  <a:effectLst/>
+                  <a:uLnTx/>
+                  <a:uFillTx/>
+                  <a:latin typeface="Georgia" pitchFamily="18" charset="0"/>
+                  <a:ea typeface="ＭＳ Ｐゴシック" pitchFamily="34" charset="-128"/>
+                </a:endParaRPr>
+              </a:p>
+            </p:txBody>
+          </p:sp>
+          <p:sp>
+            <p:nvSpPr>
+              <p:cNvPr id="103" name="Rectangle 102">
+                <a:extLst>
+                  <a:ext uri="{FF2B5EF4-FFF2-40B4-BE49-F238E27FC236}">
+                    <a16:creationId xmlns:a16="http://schemas.microsoft.com/office/drawing/2014/main" id="{BED63854-BCC9-BEFD-0251-27FDDCE976BF}"/>
+                  </a:ext>
+                </a:extLst>
+              </p:cNvPr>
+              <p:cNvSpPr>
+                <a:spLocks noChangeArrowheads="1"/>
+              </p:cNvSpPr>
+              <p:nvPr/>
+            </p:nvSpPr>
+            <p:spPr bwMode="auto">
+              <a:xfrm>
+                <a:off x="603637" y="4112938"/>
+                <a:ext cx="1125308" cy="153888"/>
+              </a:xfrm>
+              <a:prstGeom prst="rect">
+                <a:avLst/>
+              </a:prstGeom>
+              <a:noFill/>
+              <a:ln w="12700" algn="ctr">
+                <a:noFill/>
+                <a:miter lim="800000"/>
+                <a:headEnd/>
+                <a:tailEnd/>
+              </a:ln>
+            </p:spPr>
+            <p:txBody>
+              <a:bodyPr wrap="none" lIns="0" tIns="0" rIns="0" bIns="0" anchor="ctr">
+                <a:spAutoFit/>
+              </a:bodyPr>
+              <a:lstStyle/>
+              <a:p>
+                <a:pPr marL="0" marR="0" lvl="0" indent="0" defTabSz="914400" eaLnBrk="1" fontAlgn="base" latinLnBrk="0" hangingPunct="1">
+                  <a:lnSpc>
+                    <a:spcPct val="100000"/>
+                  </a:lnSpc>
+                  <a:spcBef>
+                    <a:spcPct val="0"/>
+                  </a:spcBef>
+                  <a:spcAft>
+                    <a:spcPct val="0"/>
+                  </a:spcAft>
+                  <a:buClrTx/>
+                  <a:buSzTx/>
+                  <a:buFontTx/>
+                  <a:buNone/>
+                  <a:tabLst/>
+                  <a:defRPr/>
+                </a:pPr>
+                <a:r>
+                  <a:rPr kumimoji="0" lang="en-GB" sz="1000" b="0" i="0" u="none" strike="noStrike" kern="0" cap="none" spc="0" normalizeH="0" baseline="0" noProof="0" dirty="0">
+                    <a:ln>
+                      <a:noFill/>
+                    </a:ln>
+                    <a:solidFill>
+                      <a:srgbClr val="000000"/>
+                    </a:solidFill>
+                    <a:effectLst/>
+                    <a:uLnTx/>
+                    <a:uFillTx/>
+                    <a:latin typeface="Tahoma" pitchFamily="34" charset="0"/>
+                    <a:ea typeface="ＭＳ Ｐゴシック" pitchFamily="34" charset="-128"/>
+                  </a:rPr>
+                  <a:t>Telomere prediction</a:t>
+                </a:r>
+              </a:p>
+            </p:txBody>
+          </p:sp>
+        </p:grpSp>
+        <p:grpSp>
+          <p:nvGrpSpPr>
+            <p:cNvPr id="5" name="Group 4">
+              <a:extLst>
+                <a:ext uri="{FF2B5EF4-FFF2-40B4-BE49-F238E27FC236}">
+                  <a16:creationId xmlns:a16="http://schemas.microsoft.com/office/drawing/2014/main" id="{95BA1810-1DAB-9852-7CD3-88FE5B7F7F72}"/>
+                </a:ext>
+              </a:extLst>
+            </p:cNvPr>
+            <p:cNvGrpSpPr/>
+            <p:nvPr/>
+          </p:nvGrpSpPr>
+          <p:grpSpPr>
+            <a:xfrm>
+              <a:off x="3182701" y="3886822"/>
+              <a:ext cx="1358291" cy="153888"/>
+              <a:chOff x="279283" y="4341538"/>
+              <a:chExt cx="1358291" cy="153888"/>
+            </a:xfrm>
+          </p:grpSpPr>
+          <p:sp>
+            <p:nvSpPr>
+              <p:cNvPr id="98" name="Triangle 97">
+                <a:extLst>
+                  <a:ext uri="{FF2B5EF4-FFF2-40B4-BE49-F238E27FC236}">
+                    <a16:creationId xmlns:a16="http://schemas.microsoft.com/office/drawing/2014/main" id="{F63532A2-3D20-671E-7FDB-0B347B521D1D}"/>
+                  </a:ext>
+                </a:extLst>
+              </p:cNvPr>
+              <p:cNvSpPr/>
+              <p:nvPr/>
+            </p:nvSpPr>
+            <p:spPr bwMode="auto">
+              <a:xfrm>
+                <a:off x="279283" y="4372123"/>
+                <a:ext cx="119093" cy="102666"/>
+              </a:xfrm>
+              <a:prstGeom prst="triangle">
+                <a:avLst/>
+              </a:prstGeom>
+              <a:solidFill>
+                <a:srgbClr val="FFE313"/>
+              </a:solidFill>
+              <a:ln w="12700" cap="flat" cmpd="sng" algn="ctr">
+                <a:solidFill>
+                  <a:srgbClr val="323D43"/>
+                </a:solidFill>
+                <a:prstDash val="solid"/>
+                <a:round/>
+                <a:headEnd type="none" w="med" len="med"/>
+                <a:tailEnd type="none" w="med" len="med"/>
+              </a:ln>
+              <a:effectLst/>
+            </p:spPr>
+            <p:txBody>
+              <a:bodyPr vert="horz" wrap="none" lIns="0" tIns="45720" rIns="91440" bIns="45720" numCol="1" rtlCol="0" anchor="ctr" anchorCtr="0" compatLnSpc="1">
+                <a:prstTxWarp prst="textNoShape">
+                  <a:avLst/>
+                </a:prstTxWarp>
+              </a:bodyPr>
+              <a:lstStyle/>
+              <a:p>
+                <a:pPr marL="342900" marR="0" lvl="0" indent="-342900" algn="ctr" defTabSz="914400" eaLnBrk="1" fontAlgn="base" latinLnBrk="0" hangingPunct="1">
+                  <a:lnSpc>
+                    <a:spcPct val="100000"/>
+                  </a:lnSpc>
+                  <a:spcBef>
+                    <a:spcPct val="40000"/>
+                  </a:spcBef>
+                  <a:spcAft>
+                    <a:spcPct val="20000"/>
+                  </a:spcAft>
+                  <a:buClr>
+                    <a:srgbClr val="0D01FF"/>
+                  </a:buClr>
+                  <a:buSzTx/>
+                  <a:buFont typeface="Wingdings" pitchFamily="2" charset="2"/>
+                  <a:buChar char="§"/>
+                  <a:tabLst/>
+                  <a:defRPr/>
+                </a:pPr>
+                <a:endParaRPr kumimoji="0" lang="en-US" sz="1000" b="0" i="0" u="none" strike="noStrike" kern="0" cap="none" spc="0" normalizeH="0" baseline="0" noProof="0">
+                  <a:ln>
+                    <a:noFill/>
+                  </a:ln>
+                  <a:solidFill>
+                    <a:srgbClr val="323D43"/>
+                  </a:solidFill>
+                  <a:effectLst/>
+                  <a:uLnTx/>
+                  <a:uFillTx/>
+                  <a:latin typeface="Georgia" pitchFamily="18" charset="0"/>
+                  <a:ea typeface="ＭＳ Ｐゴシック" pitchFamily="34" charset="-128"/>
+                </a:endParaRPr>
+              </a:p>
+            </p:txBody>
+          </p:sp>
+          <p:sp>
+            <p:nvSpPr>
+              <p:cNvPr id="99" name="Triangle 98">
+                <a:extLst>
+                  <a:ext uri="{FF2B5EF4-FFF2-40B4-BE49-F238E27FC236}">
+                    <a16:creationId xmlns:a16="http://schemas.microsoft.com/office/drawing/2014/main" id="{96B09FD4-7862-EB7F-D229-05ECC032491E}"/>
+                  </a:ext>
+                </a:extLst>
+              </p:cNvPr>
+              <p:cNvSpPr/>
+              <p:nvPr/>
+            </p:nvSpPr>
+            <p:spPr bwMode="auto">
+              <a:xfrm flipV="1">
+                <a:off x="420202" y="4372123"/>
+                <a:ext cx="119093" cy="102666"/>
+              </a:xfrm>
+              <a:prstGeom prst="triangle">
+                <a:avLst/>
+              </a:prstGeom>
+              <a:solidFill>
+                <a:srgbClr val="FFE313"/>
+              </a:solidFill>
+              <a:ln w="12700" cap="flat" cmpd="sng" algn="ctr">
+                <a:solidFill>
+                  <a:srgbClr val="323D43"/>
+                </a:solidFill>
+                <a:prstDash val="solid"/>
+                <a:round/>
+                <a:headEnd type="none" w="med" len="med"/>
+                <a:tailEnd type="none" w="med" len="med"/>
+              </a:ln>
+              <a:effectLst/>
+            </p:spPr>
+            <p:txBody>
+              <a:bodyPr vert="horz" wrap="none" lIns="0" tIns="45720" rIns="91440" bIns="45720" numCol="1" rtlCol="0" anchor="ctr" anchorCtr="0" compatLnSpc="1">
+                <a:prstTxWarp prst="textNoShape">
+                  <a:avLst/>
+                </a:prstTxWarp>
+              </a:bodyPr>
+              <a:lstStyle/>
+              <a:p>
+                <a:pPr marL="342900" marR="0" lvl="0" indent="-342900" algn="ctr" defTabSz="914400" eaLnBrk="1" fontAlgn="base" latinLnBrk="0" hangingPunct="1">
+                  <a:lnSpc>
+                    <a:spcPct val="100000"/>
+                  </a:lnSpc>
+                  <a:spcBef>
+                    <a:spcPct val="40000"/>
+                  </a:spcBef>
+                  <a:spcAft>
+                    <a:spcPct val="20000"/>
+                  </a:spcAft>
+                  <a:buClr>
+                    <a:srgbClr val="0D01FF"/>
+                  </a:buClr>
+                  <a:buSzTx/>
+                  <a:buFont typeface="Wingdings" pitchFamily="2" charset="2"/>
+                  <a:buChar char="§"/>
+                  <a:tabLst/>
+                  <a:defRPr/>
+                </a:pPr>
+                <a:endParaRPr kumimoji="0" lang="en-US" sz="1000" b="0" i="0" u="none" strike="noStrike" kern="0" cap="none" spc="0" normalizeH="0" baseline="0" noProof="0">
+                  <a:ln>
+                    <a:noFill/>
+                  </a:ln>
+                  <a:solidFill>
+                    <a:srgbClr val="323D43"/>
+                  </a:solidFill>
+                  <a:effectLst/>
+                  <a:uLnTx/>
+                  <a:uFillTx/>
+                  <a:latin typeface="Georgia" pitchFamily="18" charset="0"/>
+                  <a:ea typeface="ＭＳ Ｐゴシック" pitchFamily="34" charset="-128"/>
+                </a:endParaRPr>
+              </a:p>
+            </p:txBody>
+          </p:sp>
+          <p:sp>
+            <p:nvSpPr>
+              <p:cNvPr id="100" name="Rectangle 99">
+                <a:extLst>
+                  <a:ext uri="{FF2B5EF4-FFF2-40B4-BE49-F238E27FC236}">
+                    <a16:creationId xmlns:a16="http://schemas.microsoft.com/office/drawing/2014/main" id="{E3E7CA45-122B-5B76-BEA7-4AA6E4D1072C}"/>
+                  </a:ext>
+                </a:extLst>
+              </p:cNvPr>
+              <p:cNvSpPr>
+                <a:spLocks noChangeArrowheads="1"/>
+              </p:cNvSpPr>
+              <p:nvPr/>
+            </p:nvSpPr>
+            <p:spPr bwMode="auto">
+              <a:xfrm>
+                <a:off x="603637" y="4341538"/>
+                <a:ext cx="1033937" cy="153888"/>
+              </a:xfrm>
+              <a:prstGeom prst="rect">
+                <a:avLst/>
+              </a:prstGeom>
+              <a:noFill/>
+              <a:ln w="12700" algn="ctr">
+                <a:noFill/>
+                <a:miter lim="800000"/>
+                <a:headEnd/>
+                <a:tailEnd/>
+              </a:ln>
+            </p:spPr>
+            <p:txBody>
+              <a:bodyPr wrap="none" lIns="0" tIns="0" rIns="0" bIns="0" anchor="ctr">
+                <a:spAutoFit/>
+              </a:bodyPr>
+              <a:lstStyle/>
+              <a:p>
+                <a:pPr marL="0" marR="0" lvl="0" indent="0" defTabSz="914400" eaLnBrk="1" fontAlgn="base" latinLnBrk="0" hangingPunct="1">
+                  <a:lnSpc>
+                    <a:spcPct val="100000"/>
+                  </a:lnSpc>
+                  <a:spcBef>
+                    <a:spcPct val="0"/>
+                  </a:spcBef>
+                  <a:spcAft>
+                    <a:spcPct val="0"/>
+                  </a:spcAft>
+                  <a:buClrTx/>
+                  <a:buSzTx/>
+                  <a:buFontTx/>
+                  <a:buNone/>
+                  <a:tabLst/>
+                  <a:defRPr/>
+                </a:pPr>
+                <a:r>
+                  <a:rPr kumimoji="0" lang="en-GB" sz="1000" b="0" i="0" u="none" strike="noStrike" kern="0" cap="none" spc="0" normalizeH="0" baseline="0" noProof="0" dirty="0">
+                    <a:ln>
+                      <a:noFill/>
+                    </a:ln>
+                    <a:solidFill>
+                      <a:srgbClr val="000000"/>
+                    </a:solidFill>
+                    <a:effectLst/>
+                    <a:uLnTx/>
+                    <a:uFillTx/>
+                    <a:latin typeface="Tahoma" pitchFamily="34" charset="0"/>
+                    <a:ea typeface="ＭＳ Ｐゴシック" pitchFamily="34" charset="-128"/>
+                  </a:rPr>
+                  <a:t>Duplicated BUSCO</a:t>
+                </a:r>
+              </a:p>
+            </p:txBody>
+          </p:sp>
+        </p:grpSp>
+        <p:grpSp>
+          <p:nvGrpSpPr>
+            <p:cNvPr id="6" name="Group 5">
+              <a:extLst>
+                <a:ext uri="{FF2B5EF4-FFF2-40B4-BE49-F238E27FC236}">
+                  <a16:creationId xmlns:a16="http://schemas.microsoft.com/office/drawing/2014/main" id="{4531B675-FAF8-D7EA-460E-618FF942EEA0}"/>
+                </a:ext>
+              </a:extLst>
+            </p:cNvPr>
+            <p:cNvGrpSpPr/>
+            <p:nvPr/>
+          </p:nvGrpSpPr>
+          <p:grpSpPr>
+            <a:xfrm>
+              <a:off x="5046530" y="3880244"/>
+              <a:ext cx="974567" cy="167044"/>
+              <a:chOff x="408129" y="4556982"/>
+              <a:chExt cx="974567" cy="167044"/>
+            </a:xfrm>
+          </p:grpSpPr>
+          <p:sp>
+            <p:nvSpPr>
+              <p:cNvPr id="64" name="Rectangle 63">
+                <a:extLst>
+                  <a:ext uri="{FF2B5EF4-FFF2-40B4-BE49-F238E27FC236}">
+                    <a16:creationId xmlns:a16="http://schemas.microsoft.com/office/drawing/2014/main" id="{A8F92D9C-E2E1-A771-7AED-FBEB1B4076A9}"/>
+                  </a:ext>
+                </a:extLst>
+              </p:cNvPr>
+              <p:cNvSpPr>
+                <a:spLocks noChangeArrowheads="1"/>
+              </p:cNvSpPr>
+              <p:nvPr/>
+            </p:nvSpPr>
+            <p:spPr bwMode="auto">
+              <a:xfrm>
+                <a:off x="603637" y="4570138"/>
+                <a:ext cx="779059" cy="153888"/>
+              </a:xfrm>
+              <a:prstGeom prst="rect">
+                <a:avLst/>
+              </a:prstGeom>
+              <a:noFill/>
+              <a:ln w="12700" algn="ctr">
+                <a:noFill/>
+                <a:miter lim="800000"/>
+                <a:headEnd/>
+                <a:tailEnd/>
+              </a:ln>
+            </p:spPr>
+            <p:txBody>
+              <a:bodyPr wrap="none" lIns="0" tIns="0" rIns="0" bIns="0" anchor="ctr">
+                <a:spAutoFit/>
+              </a:bodyPr>
+              <a:lstStyle/>
+              <a:p>
+                <a:pPr marL="0" marR="0" lvl="0" indent="0" defTabSz="914400" eaLnBrk="1" fontAlgn="base" latinLnBrk="0" hangingPunct="1">
+                  <a:lnSpc>
+                    <a:spcPct val="100000"/>
+                  </a:lnSpc>
+                  <a:spcBef>
+                    <a:spcPct val="0"/>
+                  </a:spcBef>
+                  <a:spcAft>
+                    <a:spcPct val="0"/>
+                  </a:spcAft>
+                  <a:buClrTx/>
+                  <a:buSzTx/>
+                  <a:buFontTx/>
+                  <a:buNone/>
+                  <a:tabLst/>
+                  <a:defRPr/>
+                </a:pPr>
+                <a:r>
+                  <a:rPr kumimoji="0" lang="en-GB" sz="1000" b="0" i="0" u="none" strike="noStrike" kern="0" cap="none" spc="0" normalizeH="0" baseline="0" noProof="0" dirty="0">
+                    <a:ln>
+                      <a:noFill/>
+                    </a:ln>
+                    <a:solidFill>
+                      <a:srgbClr val="000000"/>
+                    </a:solidFill>
+                    <a:effectLst/>
+                    <a:uLnTx/>
+                    <a:uFillTx/>
+                    <a:latin typeface="Tahoma" pitchFamily="34" charset="0"/>
+                    <a:ea typeface="ＭＳ Ｐゴシック" pitchFamily="34" charset="-128"/>
+                  </a:rPr>
+                  <a:t>Assembly gap</a:t>
+                </a:r>
+              </a:p>
+            </p:txBody>
+          </p:sp>
+          <p:sp>
+            <p:nvSpPr>
+              <p:cNvPr id="68" name="Rectangle 67">
+                <a:extLst>
+                  <a:ext uri="{FF2B5EF4-FFF2-40B4-BE49-F238E27FC236}">
+                    <a16:creationId xmlns:a16="http://schemas.microsoft.com/office/drawing/2014/main" id="{E46A0C46-DE91-9F52-4375-5299B4910590}"/>
+                  </a:ext>
+                </a:extLst>
+              </p:cNvPr>
+              <p:cNvSpPr>
+                <a:spLocks noChangeArrowheads="1"/>
+              </p:cNvSpPr>
+              <p:nvPr/>
+            </p:nvSpPr>
+            <p:spPr bwMode="auto">
+              <a:xfrm>
+                <a:off x="408129" y="4556982"/>
+                <a:ext cx="92974" cy="153888"/>
+              </a:xfrm>
+              <a:prstGeom prst="rect">
+                <a:avLst/>
+              </a:prstGeom>
+              <a:noFill/>
+              <a:ln w="12700" algn="ctr">
+                <a:noFill/>
+                <a:miter lim="800000"/>
+                <a:headEnd/>
+                <a:tailEnd/>
+              </a:ln>
+            </p:spPr>
+            <p:txBody>
+              <a:bodyPr wrap="none" lIns="0" tIns="0" rIns="0" bIns="0" anchor="ctr">
+                <a:spAutoFit/>
+              </a:bodyPr>
+              <a:lstStyle/>
+              <a:p>
+                <a:pPr marL="0" marR="0" lvl="0" indent="0" defTabSz="914400" eaLnBrk="1" fontAlgn="base" latinLnBrk="0" hangingPunct="1">
+                  <a:lnSpc>
+                    <a:spcPct val="100000"/>
+                  </a:lnSpc>
+                  <a:spcBef>
+                    <a:spcPct val="0"/>
+                  </a:spcBef>
+                  <a:spcAft>
+                    <a:spcPct val="0"/>
+                  </a:spcAft>
+                  <a:buClrTx/>
+                  <a:buSzTx/>
+                  <a:buFontTx/>
+                  <a:buNone/>
+                  <a:tabLst/>
+                  <a:defRPr/>
+                </a:pPr>
+                <a:r>
+                  <a:rPr kumimoji="0" lang="en-GB" sz="1000" b="0" i="0" u="none" strike="noStrike" kern="0" cap="none" spc="0" normalizeH="0" baseline="0" noProof="0" dirty="0">
+                    <a:ln>
+                      <a:noFill/>
+                    </a:ln>
+                    <a:solidFill>
+                      <a:srgbClr val="B93022">
+                        <a:lumMod val="75000"/>
+                      </a:srgbClr>
+                    </a:solidFill>
+                    <a:effectLst/>
+                    <a:uLnTx/>
+                    <a:uFillTx/>
+                    <a:latin typeface="Tahoma" pitchFamily="34" charset="0"/>
+                    <a:ea typeface="ＭＳ Ｐゴシック" pitchFamily="34" charset="-128"/>
+                  </a:rPr>
+                  <a:t>+</a:t>
+                </a:r>
+              </a:p>
+            </p:txBody>
+          </p:sp>
+        </p:grpSp>
+        <p:grpSp>
+          <p:nvGrpSpPr>
+            <p:cNvPr id="7" name="Group 6">
+              <a:extLst>
+                <a:ext uri="{FF2B5EF4-FFF2-40B4-BE49-F238E27FC236}">
+                  <a16:creationId xmlns:a16="http://schemas.microsoft.com/office/drawing/2014/main" id="{0D42A7B9-E6E2-C112-2958-B4DE8BEAB233}"/>
+                </a:ext>
+              </a:extLst>
+            </p:cNvPr>
+            <p:cNvGrpSpPr/>
+            <p:nvPr/>
+          </p:nvGrpSpPr>
+          <p:grpSpPr>
+            <a:xfrm>
+              <a:off x="225181" y="3886822"/>
+              <a:ext cx="748750" cy="168001"/>
+              <a:chOff x="310140" y="3884338"/>
+              <a:chExt cx="748750" cy="168001"/>
+            </a:xfrm>
+          </p:grpSpPr>
+          <p:sp>
+            <p:nvSpPr>
+              <p:cNvPr id="59" name="Rectangle 58">
+                <a:extLst>
+                  <a:ext uri="{FF2B5EF4-FFF2-40B4-BE49-F238E27FC236}">
+                    <a16:creationId xmlns:a16="http://schemas.microsoft.com/office/drawing/2014/main" id="{09137423-222B-EDB6-39F7-8BB431B7CA82}"/>
+                  </a:ext>
+                </a:extLst>
+              </p:cNvPr>
+              <p:cNvSpPr>
+                <a:spLocks noChangeArrowheads="1"/>
+              </p:cNvSpPr>
+              <p:nvPr/>
+            </p:nvSpPr>
+            <p:spPr bwMode="auto">
+              <a:xfrm>
+                <a:off x="603637" y="3884338"/>
+                <a:ext cx="455253" cy="153888"/>
+              </a:xfrm>
+              <a:prstGeom prst="rect">
+                <a:avLst/>
+              </a:prstGeom>
+              <a:noFill/>
+              <a:ln w="12700" algn="ctr">
+                <a:noFill/>
+                <a:miter lim="800000"/>
+                <a:headEnd/>
+                <a:tailEnd/>
+              </a:ln>
+            </p:spPr>
+            <p:txBody>
+              <a:bodyPr wrap="none" lIns="0" tIns="0" rIns="0" bIns="0" anchor="ctr">
+                <a:spAutoFit/>
+              </a:bodyPr>
+              <a:lstStyle/>
+              <a:p>
+                <a:pPr marL="0" marR="0" lvl="0" indent="0" defTabSz="914400" eaLnBrk="1" fontAlgn="base" latinLnBrk="0" hangingPunct="1">
+                  <a:lnSpc>
+                    <a:spcPct val="100000"/>
+                  </a:lnSpc>
+                  <a:spcBef>
+                    <a:spcPct val="0"/>
+                  </a:spcBef>
+                  <a:spcAft>
+                    <a:spcPct val="0"/>
+                  </a:spcAft>
+                  <a:buClrTx/>
+                  <a:buSzTx/>
+                  <a:buFontTx/>
+                  <a:buNone/>
+                  <a:tabLst/>
+                  <a:defRPr/>
+                </a:pPr>
+                <a:r>
+                  <a:rPr kumimoji="0" lang="en-GB" sz="1000" b="0" i="0" u="none" strike="noStrike" kern="0" cap="none" spc="0" normalizeH="0" baseline="0" noProof="0" dirty="0">
+                    <a:ln>
+                      <a:noFill/>
+                    </a:ln>
+                    <a:solidFill>
+                      <a:srgbClr val="000000"/>
+                    </a:solidFill>
+                    <a:effectLst/>
+                    <a:uLnTx/>
+                    <a:uFillTx/>
+                    <a:latin typeface="Tahoma" pitchFamily="34" charset="0"/>
+                    <a:ea typeface="ＭＳ Ｐゴシック" pitchFamily="34" charset="-128"/>
+                  </a:rPr>
+                  <a:t>Synteny</a:t>
+                </a:r>
+              </a:p>
+            </p:txBody>
+          </p:sp>
+          <p:sp>
+            <p:nvSpPr>
+              <p:cNvPr id="60" name="Rectangle 59">
+                <a:extLst>
+                  <a:ext uri="{FF2B5EF4-FFF2-40B4-BE49-F238E27FC236}">
+                    <a16:creationId xmlns:a16="http://schemas.microsoft.com/office/drawing/2014/main" id="{54DCD9CC-47C2-25FA-D40C-91BBD0110F47}"/>
+                  </a:ext>
+                </a:extLst>
+              </p:cNvPr>
+              <p:cNvSpPr/>
+              <p:nvPr/>
+            </p:nvSpPr>
+            <p:spPr>
+              <a:xfrm>
+                <a:off x="310140" y="3886529"/>
+                <a:ext cx="85725" cy="165810"/>
+              </a:xfrm>
+              <a:prstGeom prst="rect">
+                <a:avLst/>
+              </a:prstGeom>
+              <a:solidFill>
+                <a:srgbClr val="C8DBE9"/>
+              </a:solidFill>
+              <a:ln>
+                <a:noFill/>
+              </a:ln>
+            </p:spPr>
+            <p:style>
+              <a:lnRef idx="2">
+                <a:schemeClr val="accent1">
+                  <a:shade val="15000"/>
+                </a:schemeClr>
+              </a:lnRef>
+              <a:fillRef idx="1">
+                <a:schemeClr val="accent1"/>
+              </a:fillRef>
+              <a:effectRef idx="0">
+                <a:schemeClr val="accent1"/>
+              </a:effectRef>
+              <a:fontRef idx="minor">
+                <a:schemeClr val="lt1"/>
+              </a:fontRef>
+            </p:style>
+            <p:txBody>
+              <a:bodyPr rtlCol="0" anchor="ctr"/>
+              <a:lstStyle/>
+              <a:p>
+                <a:pPr algn="ctr"/>
+                <a:endParaRPr lang="en-AU" sz="1000"/>
+              </a:p>
+            </p:txBody>
+          </p:sp>
+          <p:sp>
+            <p:nvSpPr>
+              <p:cNvPr id="62" name="Rectangle 61">
+                <a:extLst>
+                  <a:ext uri="{FF2B5EF4-FFF2-40B4-BE49-F238E27FC236}">
+                    <a16:creationId xmlns:a16="http://schemas.microsoft.com/office/drawing/2014/main" id="{FFD8949A-5FDF-8528-7F57-4BF67885DAF4}"/>
+                  </a:ext>
+                </a:extLst>
+              </p:cNvPr>
+              <p:cNvSpPr/>
+              <p:nvPr/>
+            </p:nvSpPr>
+            <p:spPr>
+              <a:xfrm>
+                <a:off x="449193" y="3886529"/>
+                <a:ext cx="85725" cy="165810"/>
+              </a:xfrm>
+              <a:prstGeom prst="rect">
+                <a:avLst/>
+              </a:prstGeom>
+              <a:solidFill>
+                <a:srgbClr val="F1CECF"/>
+              </a:solidFill>
+              <a:ln>
+                <a:noFill/>
+              </a:ln>
+            </p:spPr>
+            <p:style>
+              <a:lnRef idx="2">
+                <a:schemeClr val="accent1">
+                  <a:shade val="15000"/>
+                </a:schemeClr>
+              </a:lnRef>
+              <a:fillRef idx="1">
+                <a:schemeClr val="accent1"/>
+              </a:fillRef>
+              <a:effectRef idx="0">
+                <a:schemeClr val="accent1"/>
+              </a:effectRef>
+              <a:fontRef idx="minor">
+                <a:schemeClr val="lt1"/>
+              </a:fontRef>
+            </p:style>
+            <p:txBody>
+              <a:bodyPr rtlCol="0" anchor="ctr"/>
+              <a:lstStyle/>
+              <a:p>
+                <a:pPr algn="ctr"/>
+                <a:endParaRPr lang="en-AU" sz="1000"/>
+              </a:p>
+            </p:txBody>
+          </p:sp>
+        </p:grpSp>
+        <p:grpSp>
+          <p:nvGrpSpPr>
+            <p:cNvPr id="8" name="Group 7">
+              <a:extLst>
+                <a:ext uri="{FF2B5EF4-FFF2-40B4-BE49-F238E27FC236}">
+                  <a16:creationId xmlns:a16="http://schemas.microsoft.com/office/drawing/2014/main" id="{B3DE2DBD-0BA2-9B7C-FC2B-7A8BF2AF426C}"/>
+                </a:ext>
+              </a:extLst>
+            </p:cNvPr>
+            <p:cNvGrpSpPr/>
+            <p:nvPr/>
+          </p:nvGrpSpPr>
+          <p:grpSpPr>
+            <a:xfrm>
+              <a:off x="9409330" y="3886822"/>
+              <a:ext cx="1023997" cy="153888"/>
+              <a:chOff x="2446326" y="4341538"/>
+              <a:chExt cx="1023997" cy="153888"/>
+            </a:xfrm>
+          </p:grpSpPr>
+          <p:sp>
+            <p:nvSpPr>
+              <p:cNvPr id="56" name="Triangle 55">
+                <a:extLst>
+                  <a:ext uri="{FF2B5EF4-FFF2-40B4-BE49-F238E27FC236}">
+                    <a16:creationId xmlns:a16="http://schemas.microsoft.com/office/drawing/2014/main" id="{DF8A44B8-70FB-3017-8DBC-F8AAC010A0FE}"/>
+                  </a:ext>
+                </a:extLst>
+              </p:cNvPr>
+              <p:cNvSpPr/>
+              <p:nvPr/>
+            </p:nvSpPr>
+            <p:spPr bwMode="auto">
+              <a:xfrm flipV="1">
+                <a:off x="2446326" y="4372123"/>
+                <a:ext cx="119093" cy="102666"/>
+              </a:xfrm>
+              <a:prstGeom prst="triangle">
+                <a:avLst/>
+              </a:prstGeom>
+              <a:solidFill>
+                <a:srgbClr val="318B57"/>
+              </a:solidFill>
+              <a:ln w="12700" cap="flat" cmpd="sng" algn="ctr">
+                <a:solidFill>
+                  <a:srgbClr val="323D43"/>
+                </a:solidFill>
+                <a:prstDash val="solid"/>
+                <a:round/>
+                <a:headEnd type="none" w="med" len="med"/>
+                <a:tailEnd type="none" w="med" len="med"/>
+              </a:ln>
+              <a:effectLst/>
+            </p:spPr>
+            <p:txBody>
+              <a:bodyPr vert="horz" wrap="none" lIns="0" tIns="45720" rIns="91440" bIns="45720" numCol="1" rtlCol="0" anchor="ctr" anchorCtr="0" compatLnSpc="1">
+                <a:prstTxWarp prst="textNoShape">
+                  <a:avLst/>
+                </a:prstTxWarp>
+              </a:bodyPr>
+              <a:lstStyle/>
+              <a:p>
+                <a:pPr marL="342900" marR="0" lvl="0" indent="-342900" algn="ctr" defTabSz="914400" eaLnBrk="1" fontAlgn="base" latinLnBrk="0" hangingPunct="1">
+                  <a:lnSpc>
+                    <a:spcPct val="100000"/>
+                  </a:lnSpc>
+                  <a:spcBef>
+                    <a:spcPct val="40000"/>
+                  </a:spcBef>
+                  <a:spcAft>
+                    <a:spcPct val="20000"/>
+                  </a:spcAft>
+                  <a:buClr>
+                    <a:srgbClr val="0D01FF"/>
+                  </a:buClr>
+                  <a:buSzTx/>
+                  <a:buFont typeface="Wingdings" pitchFamily="2" charset="2"/>
+                  <a:buChar char="§"/>
+                  <a:tabLst/>
+                  <a:defRPr/>
+                </a:pPr>
+                <a:endParaRPr kumimoji="0" lang="en-US" sz="1000" b="0" i="0" u="none" strike="noStrike" kern="0" cap="none" spc="0" normalizeH="0" baseline="0" noProof="0">
+                  <a:ln>
+                    <a:noFill/>
+                  </a:ln>
+                  <a:solidFill>
+                    <a:srgbClr val="323D43"/>
+                  </a:solidFill>
+                  <a:effectLst/>
+                  <a:uLnTx/>
+                  <a:uFillTx/>
+                  <a:latin typeface="Georgia" pitchFamily="18" charset="0"/>
+                  <a:ea typeface="ＭＳ Ｐゴシック" pitchFamily="34" charset="-128"/>
+                </a:endParaRPr>
+              </a:p>
+            </p:txBody>
+          </p:sp>
+          <p:sp>
+            <p:nvSpPr>
+              <p:cNvPr id="58" name="Rectangle 57">
+                <a:extLst>
+                  <a:ext uri="{FF2B5EF4-FFF2-40B4-BE49-F238E27FC236}">
+                    <a16:creationId xmlns:a16="http://schemas.microsoft.com/office/drawing/2014/main" id="{9F35DF7E-AF4F-91C2-D9D4-7EBCDEE59723}"/>
+                  </a:ext>
+                </a:extLst>
+              </p:cNvPr>
+              <p:cNvSpPr>
+                <a:spLocks noChangeArrowheads="1"/>
+              </p:cNvSpPr>
+              <p:nvPr/>
+            </p:nvSpPr>
+            <p:spPr bwMode="auto">
+              <a:xfrm>
+                <a:off x="2611113" y="4341538"/>
+                <a:ext cx="859210" cy="153888"/>
+              </a:xfrm>
+              <a:prstGeom prst="rect">
+                <a:avLst/>
+              </a:prstGeom>
+              <a:noFill/>
+              <a:ln w="12700" algn="ctr">
+                <a:noFill/>
+                <a:miter lim="800000"/>
+                <a:headEnd/>
+                <a:tailEnd/>
+              </a:ln>
+            </p:spPr>
+            <p:txBody>
+              <a:bodyPr wrap="none" lIns="0" tIns="0" rIns="0" bIns="0" anchor="ctr">
+                <a:spAutoFit/>
+              </a:bodyPr>
+              <a:lstStyle/>
+              <a:p>
+                <a:pPr marL="0" marR="0" lvl="0" indent="0" defTabSz="914400" eaLnBrk="1" fontAlgn="base" latinLnBrk="0" hangingPunct="1">
+                  <a:lnSpc>
+                    <a:spcPct val="100000"/>
+                  </a:lnSpc>
+                  <a:spcBef>
+                    <a:spcPct val="0"/>
+                  </a:spcBef>
+                  <a:spcAft>
+                    <a:spcPct val="0"/>
+                  </a:spcAft>
+                  <a:buClrTx/>
+                  <a:buSzTx/>
+                  <a:buFontTx/>
+                  <a:buNone/>
+                  <a:tabLst/>
+                  <a:defRPr/>
+                </a:pPr>
+                <a:r>
+                  <a:rPr kumimoji="0" lang="en-GB" sz="1000" b="0" i="0" u="none" strike="noStrike" kern="0" cap="none" spc="0" normalizeH="0" baseline="0" noProof="0" dirty="0">
+                    <a:ln>
+                      <a:noFill/>
+                    </a:ln>
+                    <a:solidFill>
+                      <a:srgbClr val="000000"/>
+                    </a:solidFill>
+                    <a:effectLst/>
+                    <a:uLnTx/>
+                    <a:uFillTx/>
+                    <a:latin typeface="Tahoma" pitchFamily="34" charset="0"/>
+                    <a:ea typeface="ＭＳ Ｐゴシック" pitchFamily="34" charset="-128"/>
+                  </a:rPr>
+                  <a:t>28S rRNA gene</a:t>
+                </a:r>
+              </a:p>
+            </p:txBody>
+          </p:sp>
+        </p:grpSp>
+        <p:grpSp>
+          <p:nvGrpSpPr>
+            <p:cNvPr id="9" name="Group 8">
+              <a:extLst>
+                <a:ext uri="{FF2B5EF4-FFF2-40B4-BE49-F238E27FC236}">
+                  <a16:creationId xmlns:a16="http://schemas.microsoft.com/office/drawing/2014/main" id="{9B4E11E6-7248-53C3-50B4-62C3EAFE5EAC}"/>
+                </a:ext>
+              </a:extLst>
+            </p:cNvPr>
+            <p:cNvGrpSpPr/>
+            <p:nvPr/>
+          </p:nvGrpSpPr>
+          <p:grpSpPr>
+            <a:xfrm>
+              <a:off x="10864931" y="3886822"/>
+              <a:ext cx="938012" cy="153888"/>
+              <a:chOff x="2461778" y="4570138"/>
+              <a:chExt cx="938012" cy="153888"/>
+            </a:xfrm>
+          </p:grpSpPr>
+          <p:sp>
+            <p:nvSpPr>
+              <p:cNvPr id="38" name="Rectangle 37">
+                <a:extLst>
+                  <a:ext uri="{FF2B5EF4-FFF2-40B4-BE49-F238E27FC236}">
+                    <a16:creationId xmlns:a16="http://schemas.microsoft.com/office/drawing/2014/main" id="{F5090EE3-AD35-9C73-97FC-D5E21B380B5D}"/>
+                  </a:ext>
+                </a:extLst>
+              </p:cNvPr>
+              <p:cNvSpPr>
+                <a:spLocks noChangeArrowheads="1"/>
+              </p:cNvSpPr>
+              <p:nvPr/>
+            </p:nvSpPr>
+            <p:spPr bwMode="auto">
+              <a:xfrm>
+                <a:off x="2611113" y="4570138"/>
+                <a:ext cx="788677" cy="153888"/>
+              </a:xfrm>
+              <a:prstGeom prst="rect">
+                <a:avLst/>
+              </a:prstGeom>
+              <a:noFill/>
+              <a:ln w="12700" algn="ctr">
+                <a:noFill/>
+                <a:miter lim="800000"/>
+                <a:headEnd/>
+                <a:tailEnd/>
+              </a:ln>
+            </p:spPr>
+            <p:txBody>
+              <a:bodyPr wrap="none" lIns="0" tIns="0" rIns="0" bIns="0" anchor="ctr">
+                <a:spAutoFit/>
+              </a:bodyPr>
+              <a:lstStyle/>
+              <a:p>
+                <a:pPr marL="0" marR="0" lvl="0" indent="0" defTabSz="914400" eaLnBrk="1" fontAlgn="base" latinLnBrk="0" hangingPunct="1">
+                  <a:lnSpc>
+                    <a:spcPct val="100000"/>
+                  </a:lnSpc>
+                  <a:spcBef>
+                    <a:spcPct val="0"/>
+                  </a:spcBef>
+                  <a:spcAft>
+                    <a:spcPct val="0"/>
+                  </a:spcAft>
+                  <a:buClrTx/>
+                  <a:buSzTx/>
+                  <a:buFontTx/>
+                  <a:buNone/>
+                  <a:tabLst/>
+                  <a:defRPr/>
+                </a:pPr>
+                <a:r>
+                  <a:rPr kumimoji="0" lang="en-GB" sz="1000" b="0" i="0" u="none" strike="noStrike" kern="0" cap="none" spc="0" normalizeH="0" baseline="0" noProof="0" dirty="0">
+                    <a:ln>
+                      <a:noFill/>
+                    </a:ln>
+                    <a:solidFill>
+                      <a:srgbClr val="000000"/>
+                    </a:solidFill>
+                    <a:effectLst/>
+                    <a:uLnTx/>
+                    <a:uFillTx/>
+                    <a:latin typeface="Tahoma" pitchFamily="34" charset="0"/>
+                    <a:ea typeface="ＭＳ Ｐゴシック" pitchFamily="34" charset="-128"/>
+                  </a:rPr>
+                  <a:t>5S rRNA gene</a:t>
+                </a:r>
+              </a:p>
+            </p:txBody>
+          </p:sp>
+          <p:sp>
+            <p:nvSpPr>
+              <p:cNvPr id="51" name="Diamond 50">
+                <a:extLst>
+                  <a:ext uri="{FF2B5EF4-FFF2-40B4-BE49-F238E27FC236}">
+                    <a16:creationId xmlns:a16="http://schemas.microsoft.com/office/drawing/2014/main" id="{3CCD1F7B-4C1C-704A-9FE2-E9C20DF61A8F}"/>
+                  </a:ext>
+                </a:extLst>
+              </p:cNvPr>
+              <p:cNvSpPr/>
+              <p:nvPr/>
+            </p:nvSpPr>
+            <p:spPr>
+              <a:xfrm>
+                <a:off x="2461778" y="4593857"/>
+                <a:ext cx="102666" cy="102666"/>
+              </a:xfrm>
+              <a:prstGeom prst="diamond">
+                <a:avLst/>
+              </a:prstGeom>
+              <a:solidFill>
+                <a:schemeClr val="bg1"/>
+              </a:solidFill>
+              <a:ln w="12700">
+                <a:solidFill>
+                  <a:schemeClr val="tx1"/>
+                </a:solidFill>
+              </a:ln>
+            </p:spPr>
+            <p:style>
+              <a:lnRef idx="2">
+                <a:schemeClr val="accent1">
+                  <a:shade val="15000"/>
+                </a:schemeClr>
+              </a:lnRef>
+              <a:fillRef idx="1">
+                <a:schemeClr val="accent1"/>
+              </a:fillRef>
+              <a:effectRef idx="0">
+                <a:schemeClr val="accent1"/>
+              </a:effectRef>
+              <a:fontRef idx="minor">
+                <a:schemeClr val="lt1"/>
+              </a:fontRef>
+            </p:style>
+            <p:txBody>
+              <a:bodyPr rtlCol="0" anchor="ctr"/>
+              <a:lstStyle/>
+              <a:p>
+                <a:pPr algn="ctr"/>
+                <a:endParaRPr lang="en-AU" sz="1000"/>
+              </a:p>
+            </p:txBody>
+          </p:sp>
+        </p:grpSp>
+        <p:grpSp>
+          <p:nvGrpSpPr>
+            <p:cNvPr id="10" name="Group 9">
+              <a:extLst>
+                <a:ext uri="{FF2B5EF4-FFF2-40B4-BE49-F238E27FC236}">
+                  <a16:creationId xmlns:a16="http://schemas.microsoft.com/office/drawing/2014/main" id="{D9F6D53D-3B43-EF6C-8239-A800F07938EB}"/>
+                </a:ext>
+              </a:extLst>
+            </p:cNvPr>
+            <p:cNvGrpSpPr/>
+            <p:nvPr/>
+          </p:nvGrpSpPr>
+          <p:grpSpPr>
+            <a:xfrm>
+              <a:off x="6427057" y="3886822"/>
+              <a:ext cx="1029114" cy="153888"/>
+              <a:chOff x="2441209" y="3884338"/>
+              <a:chExt cx="1029114" cy="153888"/>
+            </a:xfrm>
+          </p:grpSpPr>
+          <p:sp>
+            <p:nvSpPr>
+              <p:cNvPr id="24" name="Rectangle 23">
+                <a:extLst>
+                  <a:ext uri="{FF2B5EF4-FFF2-40B4-BE49-F238E27FC236}">
+                    <a16:creationId xmlns:a16="http://schemas.microsoft.com/office/drawing/2014/main" id="{04FD1FAC-A75F-3A7E-E6A2-FFF8BCF12A10}"/>
+                  </a:ext>
+                </a:extLst>
+              </p:cNvPr>
+              <p:cNvSpPr>
+                <a:spLocks noChangeArrowheads="1"/>
+              </p:cNvSpPr>
+              <p:nvPr/>
+            </p:nvSpPr>
+            <p:spPr bwMode="auto">
+              <a:xfrm>
+                <a:off x="2611113" y="3884338"/>
+                <a:ext cx="859210" cy="153888"/>
+              </a:xfrm>
+              <a:prstGeom prst="rect">
+                <a:avLst/>
+              </a:prstGeom>
+              <a:noFill/>
+              <a:ln w="12700" algn="ctr">
+                <a:noFill/>
+                <a:miter lim="800000"/>
+                <a:headEnd/>
+                <a:tailEnd/>
+              </a:ln>
+            </p:spPr>
+            <p:txBody>
+              <a:bodyPr wrap="none" lIns="0" tIns="0" rIns="0" bIns="0" anchor="ctr">
+                <a:spAutoFit/>
+              </a:bodyPr>
+              <a:lstStyle/>
+              <a:p>
+                <a:pPr marL="0" marR="0" lvl="0" indent="0" defTabSz="914400" eaLnBrk="1" fontAlgn="base" latinLnBrk="0" hangingPunct="1">
+                  <a:lnSpc>
+                    <a:spcPct val="100000"/>
+                  </a:lnSpc>
+                  <a:spcBef>
+                    <a:spcPct val="0"/>
+                  </a:spcBef>
+                  <a:spcAft>
+                    <a:spcPct val="0"/>
+                  </a:spcAft>
+                  <a:buClrTx/>
+                  <a:buSzTx/>
+                  <a:buFontTx/>
+                  <a:buNone/>
+                  <a:tabLst/>
+                  <a:defRPr/>
+                </a:pPr>
+                <a:r>
+                  <a:rPr kumimoji="0" lang="en-GB" sz="1000" b="0" i="0" u="none" strike="noStrike" kern="0" cap="none" spc="0" normalizeH="0" baseline="0" noProof="0" dirty="0">
+                    <a:ln>
+                      <a:noFill/>
+                    </a:ln>
+                    <a:solidFill>
+                      <a:srgbClr val="000000"/>
+                    </a:solidFill>
+                    <a:effectLst/>
+                    <a:uLnTx/>
+                    <a:uFillTx/>
+                    <a:latin typeface="Tahoma" pitchFamily="34" charset="0"/>
+                    <a:ea typeface="ＭＳ Ｐゴシック" pitchFamily="34" charset="-128"/>
+                  </a:rPr>
+                  <a:t>18S rRNA gene</a:t>
+                </a:r>
+              </a:p>
+            </p:txBody>
+          </p:sp>
+          <p:sp>
+            <p:nvSpPr>
+              <p:cNvPr id="34" name="Triangle 33">
+                <a:extLst>
+                  <a:ext uri="{FF2B5EF4-FFF2-40B4-BE49-F238E27FC236}">
+                    <a16:creationId xmlns:a16="http://schemas.microsoft.com/office/drawing/2014/main" id="{845B5015-2F8A-54DE-E5BA-A450E817546A}"/>
+                  </a:ext>
+                </a:extLst>
+              </p:cNvPr>
+              <p:cNvSpPr/>
+              <p:nvPr/>
+            </p:nvSpPr>
+            <p:spPr bwMode="auto">
+              <a:xfrm rot="10800000" flipV="1">
+                <a:off x="2441209" y="3915471"/>
+                <a:ext cx="119093" cy="102666"/>
+              </a:xfrm>
+              <a:prstGeom prst="triangle">
+                <a:avLst/>
+              </a:prstGeom>
+              <a:solidFill>
+                <a:srgbClr val="87CEED"/>
+              </a:solidFill>
+              <a:ln w="12700" cap="flat" cmpd="sng" algn="ctr">
+                <a:solidFill>
+                  <a:srgbClr val="323D43"/>
+                </a:solidFill>
+                <a:prstDash val="solid"/>
+                <a:round/>
+                <a:headEnd type="none" w="med" len="med"/>
+                <a:tailEnd type="none" w="med" len="med"/>
+              </a:ln>
+              <a:effectLst/>
+            </p:spPr>
+            <p:txBody>
+              <a:bodyPr vert="horz" wrap="none" lIns="0" tIns="45720" rIns="91440" bIns="45720" numCol="1" rtlCol="0" anchor="ctr" anchorCtr="0" compatLnSpc="1">
+                <a:prstTxWarp prst="textNoShape">
+                  <a:avLst/>
+                </a:prstTxWarp>
+              </a:bodyPr>
+              <a:lstStyle/>
+              <a:p>
+                <a:pPr marL="342900" marR="0" lvl="0" indent="-342900" algn="ctr" defTabSz="914400" eaLnBrk="1" fontAlgn="base" latinLnBrk="0" hangingPunct="1">
+                  <a:lnSpc>
+                    <a:spcPct val="100000"/>
+                  </a:lnSpc>
+                  <a:spcBef>
+                    <a:spcPct val="40000"/>
+                  </a:spcBef>
+                  <a:spcAft>
+                    <a:spcPct val="20000"/>
+                  </a:spcAft>
+                  <a:buClr>
+                    <a:srgbClr val="0D01FF"/>
+                  </a:buClr>
+                  <a:buSzTx/>
+                  <a:buFont typeface="Wingdings" pitchFamily="2" charset="2"/>
+                  <a:buChar char="§"/>
+                  <a:tabLst/>
+                  <a:defRPr/>
+                </a:pPr>
+                <a:endParaRPr kumimoji="0" lang="en-US" sz="1000" b="0" i="0" u="none" strike="noStrike" kern="0" cap="none" spc="0" normalizeH="0" baseline="0" noProof="0">
+                  <a:ln>
+                    <a:noFill/>
+                  </a:ln>
+                  <a:solidFill>
+                    <a:srgbClr val="323D43"/>
+                  </a:solidFill>
+                  <a:effectLst/>
+                  <a:uLnTx/>
+                  <a:uFillTx/>
+                  <a:latin typeface="Georgia" pitchFamily="18" charset="0"/>
+                  <a:ea typeface="ＭＳ Ｐゴシック" pitchFamily="34" charset="-128"/>
+                </a:endParaRPr>
+              </a:p>
+            </p:txBody>
+          </p:sp>
+        </p:grpSp>
+        <p:grpSp>
+          <p:nvGrpSpPr>
+            <p:cNvPr id="11" name="Group 10">
+              <a:extLst>
+                <a:ext uri="{FF2B5EF4-FFF2-40B4-BE49-F238E27FC236}">
+                  <a16:creationId xmlns:a16="http://schemas.microsoft.com/office/drawing/2014/main" id="{98A46392-D060-D512-5C1F-137651A9ABAE}"/>
+                </a:ext>
+              </a:extLst>
+            </p:cNvPr>
+            <p:cNvGrpSpPr/>
+            <p:nvPr/>
+          </p:nvGrpSpPr>
+          <p:grpSpPr>
+            <a:xfrm>
+              <a:off x="7887778" y="3886822"/>
+              <a:ext cx="1073915" cy="153888"/>
+              <a:chOff x="2434880" y="4112938"/>
+              <a:chExt cx="1073915" cy="153888"/>
+            </a:xfrm>
+          </p:grpSpPr>
+          <p:sp>
+            <p:nvSpPr>
+              <p:cNvPr id="12" name="Rectangle 11">
+                <a:extLst>
+                  <a:ext uri="{FF2B5EF4-FFF2-40B4-BE49-F238E27FC236}">
+                    <a16:creationId xmlns:a16="http://schemas.microsoft.com/office/drawing/2014/main" id="{C4BC2816-A6D4-3852-F31B-01D94E3322B8}"/>
+                  </a:ext>
+                </a:extLst>
+              </p:cNvPr>
+              <p:cNvSpPr>
+                <a:spLocks noChangeArrowheads="1"/>
+              </p:cNvSpPr>
+              <p:nvPr/>
+            </p:nvSpPr>
+            <p:spPr bwMode="auto">
+              <a:xfrm>
+                <a:off x="2611113" y="4112938"/>
+                <a:ext cx="897682" cy="153888"/>
+              </a:xfrm>
+              <a:prstGeom prst="rect">
+                <a:avLst/>
+              </a:prstGeom>
+              <a:noFill/>
+              <a:ln w="12700" algn="ctr">
+                <a:noFill/>
+                <a:miter lim="800000"/>
+                <a:headEnd/>
+                <a:tailEnd/>
+              </a:ln>
+            </p:spPr>
+            <p:txBody>
+              <a:bodyPr wrap="none" lIns="0" tIns="0" rIns="0" bIns="0" anchor="ctr">
+                <a:spAutoFit/>
+              </a:bodyPr>
+              <a:lstStyle/>
+              <a:p>
+                <a:pPr marL="0" marR="0" lvl="0" indent="0" defTabSz="914400" eaLnBrk="1" fontAlgn="base" latinLnBrk="0" hangingPunct="1">
+                  <a:lnSpc>
+                    <a:spcPct val="100000"/>
+                  </a:lnSpc>
+                  <a:spcBef>
+                    <a:spcPct val="0"/>
+                  </a:spcBef>
+                  <a:spcAft>
+                    <a:spcPct val="0"/>
+                  </a:spcAft>
+                  <a:buClrTx/>
+                  <a:buSzTx/>
+                  <a:buFontTx/>
+                  <a:buNone/>
+                  <a:tabLst/>
+                  <a:defRPr/>
+                </a:pPr>
+                <a:r>
+                  <a:rPr kumimoji="0" lang="en-GB" sz="1000" b="0" i="0" u="none" strike="noStrike" kern="0" cap="none" spc="0" normalizeH="0" baseline="0" noProof="0" dirty="0">
+                    <a:ln>
+                      <a:noFill/>
+                    </a:ln>
+                    <a:solidFill>
+                      <a:srgbClr val="000000"/>
+                    </a:solidFill>
+                    <a:effectLst/>
+                    <a:uLnTx/>
+                    <a:uFillTx/>
+                    <a:latin typeface="Tahoma" pitchFamily="34" charset="0"/>
+                    <a:ea typeface="ＭＳ Ｐゴシック" pitchFamily="34" charset="-128"/>
+                  </a:rPr>
+                  <a:t>5.8S rRNA gene</a:t>
+                </a:r>
+              </a:p>
+            </p:txBody>
+          </p:sp>
+          <p:sp>
+            <p:nvSpPr>
+              <p:cNvPr id="13" name="Rectangle 12">
+                <a:extLst>
+                  <a:ext uri="{FF2B5EF4-FFF2-40B4-BE49-F238E27FC236}">
+                    <a16:creationId xmlns:a16="http://schemas.microsoft.com/office/drawing/2014/main" id="{5A89660F-FFF0-F4AC-1829-3ED212E100F0}"/>
+                  </a:ext>
+                </a:extLst>
+              </p:cNvPr>
+              <p:cNvSpPr/>
+              <p:nvPr/>
+            </p:nvSpPr>
+            <p:spPr>
+              <a:xfrm>
+                <a:off x="2434880" y="4140296"/>
+                <a:ext cx="107722" cy="107722"/>
+              </a:xfrm>
+              <a:prstGeom prst="rect">
+                <a:avLst/>
+              </a:prstGeom>
+              <a:solidFill>
+                <a:srgbClr val="FFC0CB"/>
+              </a:solidFill>
+              <a:ln w="12700">
+                <a:solidFill>
+                  <a:schemeClr val="tx1"/>
+                </a:solidFill>
+              </a:ln>
+            </p:spPr>
+            <p:style>
+              <a:lnRef idx="2">
+                <a:schemeClr val="accent1">
+                  <a:shade val="15000"/>
+                </a:schemeClr>
+              </a:lnRef>
+              <a:fillRef idx="1">
+                <a:schemeClr val="accent1"/>
+              </a:fillRef>
+              <a:effectRef idx="0">
+                <a:schemeClr val="accent1"/>
+              </a:effectRef>
+              <a:fontRef idx="minor">
+                <a:schemeClr val="lt1"/>
+              </a:fontRef>
+            </p:style>
+            <p:txBody>
+              <a:bodyPr rtlCol="0" anchor="ctr"/>
+              <a:lstStyle/>
+              <a:p>
+                <a:pPr algn="ctr"/>
+                <a:endParaRPr lang="en-AU" sz="1000"/>
+              </a:p>
+            </p:txBody>
+          </p:sp>
+        </p:grpSp>
+      </p:grpSp>
+      <p:grpSp>
+        <p:nvGrpSpPr>
+          <p:cNvPr id="162" name="Group 161">
+            <a:extLst>
+              <a:ext uri="{FF2B5EF4-FFF2-40B4-BE49-F238E27FC236}">
+                <a16:creationId xmlns:a16="http://schemas.microsoft.com/office/drawing/2014/main" id="{0BD4FE16-BA15-39CE-7837-40AAB1BFAFD3}"/>
+              </a:ext>
+            </a:extLst>
+          </p:cNvPr>
+          <p:cNvGrpSpPr/>
+          <p:nvPr/>
+        </p:nvGrpSpPr>
+        <p:grpSpPr>
+          <a:xfrm>
+            <a:off x="116395" y="4974799"/>
+            <a:ext cx="4663570" cy="567968"/>
+            <a:chOff x="116395" y="4974799"/>
+            <a:chExt cx="4663570" cy="567968"/>
+          </a:xfrm>
+        </p:grpSpPr>
+        <p:sp>
+          <p:nvSpPr>
+            <p:cNvPr id="105" name="Rectangle 104">
+              <a:extLst>
+                <a:ext uri="{FF2B5EF4-FFF2-40B4-BE49-F238E27FC236}">
+                  <a16:creationId xmlns:a16="http://schemas.microsoft.com/office/drawing/2014/main" id="{71A70E85-9571-85D2-B3B0-6165B8D9B78F}"/>
+                </a:ext>
+              </a:extLst>
+            </p:cNvPr>
+            <p:cNvSpPr/>
+            <p:nvPr/>
+          </p:nvSpPr>
+          <p:spPr bwMode="auto">
+            <a:xfrm>
+              <a:off x="116395" y="4974799"/>
+              <a:ext cx="4663570" cy="567968"/>
+            </a:xfrm>
+            <a:prstGeom prst="rect">
+              <a:avLst/>
+            </a:prstGeom>
+            <a:solidFill>
+              <a:srgbClr val="FFFFFF"/>
+            </a:solidFill>
+            <a:ln w="19050" cap="flat" cmpd="sng" algn="ctr">
+              <a:solidFill>
+                <a:srgbClr val="323D43"/>
+              </a:solidFill>
+              <a:prstDash val="solid"/>
+              <a:round/>
+              <a:headEnd type="none" w="med" len="med"/>
+              <a:tailEnd type="none" w="med" len="med"/>
+            </a:ln>
+            <a:effectLst/>
+          </p:spPr>
+          <p:txBody>
+            <a:bodyPr vert="horz" wrap="none" lIns="0" tIns="45720" rIns="91440" bIns="45720" numCol="1" rtlCol="0" anchor="ctr" anchorCtr="0" compatLnSpc="1">
+              <a:prstTxWarp prst="textNoShape">
+                <a:avLst/>
+              </a:prstTxWarp>
+            </a:bodyPr>
+            <a:lstStyle/>
+            <a:p>
+              <a:pPr marL="342900" marR="0" lvl="0" indent="-342900" algn="ctr" defTabSz="914400" eaLnBrk="1" fontAlgn="base" latinLnBrk="0" hangingPunct="1">
+                <a:lnSpc>
+                  <a:spcPct val="100000"/>
+                </a:lnSpc>
+                <a:spcBef>
+                  <a:spcPct val="40000"/>
+                </a:spcBef>
+                <a:spcAft>
+                  <a:spcPct val="20000"/>
+                </a:spcAft>
+                <a:buClr>
+                  <a:srgbClr val="0D01FF"/>
+                </a:buClr>
+                <a:buSzTx/>
+                <a:buFont typeface="Wingdings" pitchFamily="2" charset="2"/>
+                <a:buChar char="§"/>
+                <a:tabLst/>
+                <a:defRPr/>
+              </a:pPr>
+              <a:endParaRPr kumimoji="0" lang="en-US" sz="1000" b="0" i="0" u="none" strike="noStrike" kern="0" cap="none" spc="0" normalizeH="0" baseline="0" noProof="0" dirty="0">
+                <a:ln>
+                  <a:noFill/>
+                </a:ln>
+                <a:solidFill>
+                  <a:srgbClr val="323D43"/>
+                </a:solidFill>
+                <a:effectLst/>
+                <a:uLnTx/>
+                <a:uFillTx/>
+                <a:latin typeface="Georgia" pitchFamily="18" charset="0"/>
+                <a:ea typeface="ＭＳ Ｐゴシック" pitchFamily="34" charset="-128"/>
+              </a:endParaRPr>
+            </a:p>
+          </p:txBody>
+        </p:sp>
+        <p:grpSp>
+          <p:nvGrpSpPr>
+            <p:cNvPr id="106" name="Group 105">
+              <a:extLst>
+                <a:ext uri="{FF2B5EF4-FFF2-40B4-BE49-F238E27FC236}">
+                  <a16:creationId xmlns:a16="http://schemas.microsoft.com/office/drawing/2014/main" id="{4C3B949F-EB40-5FE6-7C6C-8B0156DA1B80}"/>
+                </a:ext>
+              </a:extLst>
+            </p:cNvPr>
+            <p:cNvGrpSpPr/>
+            <p:nvPr/>
+          </p:nvGrpSpPr>
+          <p:grpSpPr>
+            <a:xfrm>
+              <a:off x="954991" y="5045805"/>
+              <a:ext cx="1054455" cy="122129"/>
+              <a:chOff x="313564" y="4112938"/>
+              <a:chExt cx="1415381" cy="153888"/>
+            </a:xfrm>
+          </p:grpSpPr>
+          <p:sp>
+            <p:nvSpPr>
+              <p:cNvPr id="130" name="Oval 129">
+                <a:extLst>
+                  <a:ext uri="{FF2B5EF4-FFF2-40B4-BE49-F238E27FC236}">
+                    <a16:creationId xmlns:a16="http://schemas.microsoft.com/office/drawing/2014/main" id="{6119CCCB-E3E1-D11C-AADB-9912C8332AE4}"/>
+                  </a:ext>
+                </a:extLst>
+              </p:cNvPr>
+              <p:cNvSpPr/>
+              <p:nvPr/>
+            </p:nvSpPr>
+            <p:spPr bwMode="auto">
+              <a:xfrm>
+                <a:off x="452617" y="4147020"/>
+                <a:ext cx="85725" cy="85725"/>
+              </a:xfrm>
+              <a:prstGeom prst="ellipse">
+                <a:avLst/>
+              </a:prstGeom>
+              <a:solidFill>
+                <a:srgbClr val="000000"/>
+              </a:solidFill>
+              <a:ln w="12700" cap="flat" cmpd="sng" algn="ctr">
+                <a:solidFill>
+                  <a:srgbClr val="323D43"/>
+                </a:solidFill>
+                <a:prstDash val="solid"/>
+                <a:round/>
+                <a:headEnd type="none" w="med" len="med"/>
+                <a:tailEnd type="none" w="med" len="med"/>
+              </a:ln>
+              <a:effectLst/>
+            </p:spPr>
+            <p:txBody>
+              <a:bodyPr vert="horz" wrap="none" lIns="0" tIns="45720" rIns="91440" bIns="45720" numCol="1" rtlCol="0" anchor="ctr" anchorCtr="0" compatLnSpc="1">
+                <a:prstTxWarp prst="textNoShape">
+                  <a:avLst/>
+                </a:prstTxWarp>
+              </a:bodyPr>
+              <a:lstStyle/>
+              <a:p>
+                <a:pPr marL="342900" marR="0" lvl="0" indent="-342900" algn="ctr" defTabSz="914400" eaLnBrk="1" fontAlgn="base" latinLnBrk="0" hangingPunct="1">
+                  <a:lnSpc>
+                    <a:spcPct val="100000"/>
+                  </a:lnSpc>
+                  <a:spcBef>
+                    <a:spcPct val="40000"/>
+                  </a:spcBef>
+                  <a:spcAft>
+                    <a:spcPct val="20000"/>
+                  </a:spcAft>
+                  <a:buClr>
+                    <a:srgbClr val="0D01FF"/>
+                  </a:buClr>
+                  <a:buSzTx/>
+                  <a:buFont typeface="Wingdings" pitchFamily="2" charset="2"/>
+                  <a:buChar char="§"/>
+                  <a:tabLst/>
+                  <a:defRPr/>
+                </a:pPr>
+                <a:endParaRPr kumimoji="0" lang="en-US" sz="1000" b="0" i="0" u="none" strike="noStrike" kern="0" cap="none" spc="0" normalizeH="0" baseline="0" noProof="0">
+                  <a:ln>
+                    <a:noFill/>
+                  </a:ln>
+                  <a:solidFill>
+                    <a:srgbClr val="323D43"/>
+                  </a:solidFill>
+                  <a:effectLst/>
+                  <a:uLnTx/>
+                  <a:uFillTx/>
+                  <a:latin typeface="Georgia" pitchFamily="18" charset="0"/>
+                  <a:ea typeface="ＭＳ Ｐゴシック" pitchFamily="34" charset="-128"/>
+                </a:endParaRPr>
+              </a:p>
+            </p:txBody>
+          </p:sp>
+          <p:sp>
+            <p:nvSpPr>
+              <p:cNvPr id="131" name="Oval 130">
+                <a:extLst>
+                  <a:ext uri="{FF2B5EF4-FFF2-40B4-BE49-F238E27FC236}">
+                    <a16:creationId xmlns:a16="http://schemas.microsoft.com/office/drawing/2014/main" id="{C06B0A81-21E3-54B3-A794-6666A748DCE3}"/>
+                  </a:ext>
+                </a:extLst>
+              </p:cNvPr>
+              <p:cNvSpPr/>
+              <p:nvPr/>
+            </p:nvSpPr>
+            <p:spPr bwMode="auto">
+              <a:xfrm>
+                <a:off x="313564" y="4149673"/>
+                <a:ext cx="85725" cy="85725"/>
+              </a:xfrm>
+              <a:prstGeom prst="ellipse">
+                <a:avLst/>
+              </a:prstGeom>
+              <a:solidFill>
+                <a:srgbClr val="0D01FF"/>
+              </a:solidFill>
+              <a:ln w="12700" cap="flat" cmpd="sng" algn="ctr">
+                <a:solidFill>
+                  <a:srgbClr val="0D01FF"/>
+                </a:solidFill>
+                <a:prstDash val="solid"/>
+                <a:round/>
+                <a:headEnd type="none" w="med" len="med"/>
+                <a:tailEnd type="none" w="med" len="med"/>
+              </a:ln>
+              <a:effectLst/>
+            </p:spPr>
+            <p:txBody>
+              <a:bodyPr vert="horz" wrap="none" lIns="0" tIns="45720" rIns="91440" bIns="45720" numCol="1" rtlCol="0" anchor="ctr" anchorCtr="0" compatLnSpc="1">
+                <a:prstTxWarp prst="textNoShape">
+                  <a:avLst/>
+                </a:prstTxWarp>
+              </a:bodyPr>
+              <a:lstStyle/>
+              <a:p>
+                <a:pPr marL="342900" marR="0" lvl="0" indent="-342900" algn="ctr" defTabSz="914400" eaLnBrk="1" fontAlgn="base" latinLnBrk="0" hangingPunct="1">
+                  <a:lnSpc>
+                    <a:spcPct val="100000"/>
+                  </a:lnSpc>
+                  <a:spcBef>
+                    <a:spcPct val="40000"/>
+                  </a:spcBef>
+                  <a:spcAft>
+                    <a:spcPct val="20000"/>
+                  </a:spcAft>
+                  <a:buClr>
+                    <a:srgbClr val="0D01FF"/>
+                  </a:buClr>
+                  <a:buSzTx/>
+                  <a:buFont typeface="Wingdings" pitchFamily="2" charset="2"/>
+                  <a:buChar char="§"/>
+                  <a:tabLst/>
+                  <a:defRPr/>
+                </a:pPr>
+                <a:endParaRPr kumimoji="0" lang="en-US" sz="1000" b="0" i="0" u="none" strike="noStrike" kern="0" cap="none" spc="0" normalizeH="0" baseline="0" noProof="0">
+                  <a:ln>
+                    <a:noFill/>
+                  </a:ln>
+                  <a:solidFill>
+                    <a:srgbClr val="323D43"/>
+                  </a:solidFill>
+                  <a:effectLst/>
+                  <a:uLnTx/>
+                  <a:uFillTx/>
+                  <a:latin typeface="Georgia" pitchFamily="18" charset="0"/>
+                  <a:ea typeface="ＭＳ Ｐゴシック" pitchFamily="34" charset="-128"/>
+                </a:endParaRPr>
+              </a:p>
+            </p:txBody>
+          </p:sp>
+          <p:sp>
+            <p:nvSpPr>
+              <p:cNvPr id="132" name="Rectangle 131">
+                <a:extLst>
+                  <a:ext uri="{FF2B5EF4-FFF2-40B4-BE49-F238E27FC236}">
+                    <a16:creationId xmlns:a16="http://schemas.microsoft.com/office/drawing/2014/main" id="{8A31358D-B2F6-AD0E-64DD-115FB993D034}"/>
+                  </a:ext>
+                </a:extLst>
+              </p:cNvPr>
+              <p:cNvSpPr>
+                <a:spLocks noChangeArrowheads="1"/>
+              </p:cNvSpPr>
+              <p:nvPr/>
+            </p:nvSpPr>
+            <p:spPr bwMode="auto">
+              <a:xfrm>
+                <a:off x="603637" y="4112938"/>
+                <a:ext cx="1125308" cy="153888"/>
+              </a:xfrm>
+              <a:prstGeom prst="rect">
+                <a:avLst/>
+              </a:prstGeom>
+              <a:noFill/>
+              <a:ln w="12700" algn="ctr">
+                <a:noFill/>
+                <a:miter lim="800000"/>
+                <a:headEnd/>
+                <a:tailEnd/>
+              </a:ln>
+            </p:spPr>
+            <p:txBody>
+              <a:bodyPr wrap="none" lIns="0" tIns="0" rIns="0" bIns="0" anchor="ctr">
+                <a:spAutoFit/>
+              </a:bodyPr>
+              <a:lstStyle/>
+              <a:p>
+                <a:pPr marL="0" marR="0" lvl="0" indent="0" defTabSz="914400" eaLnBrk="1" fontAlgn="base" latinLnBrk="0" hangingPunct="1">
+                  <a:lnSpc>
+                    <a:spcPct val="100000"/>
+                  </a:lnSpc>
+                  <a:spcBef>
+                    <a:spcPct val="0"/>
+                  </a:spcBef>
+                  <a:spcAft>
+                    <a:spcPct val="0"/>
+                  </a:spcAft>
+                  <a:buClrTx/>
+                  <a:buSzTx/>
+                  <a:buFontTx/>
+                  <a:buNone/>
+                  <a:tabLst/>
+                  <a:defRPr/>
+                </a:pPr>
+                <a:r>
+                  <a:rPr kumimoji="0" lang="en-GB" sz="1000" b="0" i="0" u="none" strike="noStrike" kern="0" cap="none" spc="0" normalizeH="0" baseline="0" noProof="0" dirty="0">
+                    <a:ln>
+                      <a:noFill/>
+                    </a:ln>
+                    <a:solidFill>
+                      <a:srgbClr val="000000"/>
+                    </a:solidFill>
+                    <a:effectLst/>
+                    <a:uLnTx/>
+                    <a:uFillTx/>
+                    <a:latin typeface="Tahoma" pitchFamily="34" charset="0"/>
+                    <a:ea typeface="ＭＳ Ｐゴシック" pitchFamily="34" charset="-128"/>
+                  </a:rPr>
+                  <a:t>Telomere prediction</a:t>
+                </a:r>
+              </a:p>
+            </p:txBody>
+          </p:sp>
+        </p:grpSp>
+        <p:grpSp>
+          <p:nvGrpSpPr>
+            <p:cNvPr id="107" name="Group 106">
+              <a:extLst>
+                <a:ext uri="{FF2B5EF4-FFF2-40B4-BE49-F238E27FC236}">
+                  <a16:creationId xmlns:a16="http://schemas.microsoft.com/office/drawing/2014/main" id="{CF1FAFB2-74DA-ED04-7691-EDB9B62D3126}"/>
+                </a:ext>
+              </a:extLst>
+            </p:cNvPr>
+            <p:cNvGrpSpPr/>
+            <p:nvPr/>
+          </p:nvGrpSpPr>
+          <p:grpSpPr>
+            <a:xfrm>
+              <a:off x="2400784" y="5045805"/>
+              <a:ext cx="1011923" cy="122129"/>
+              <a:chOff x="279283" y="4341538"/>
+              <a:chExt cx="1358291" cy="153888"/>
+            </a:xfrm>
+          </p:grpSpPr>
+          <p:sp>
+            <p:nvSpPr>
+              <p:cNvPr id="127" name="Triangle 126">
+                <a:extLst>
+                  <a:ext uri="{FF2B5EF4-FFF2-40B4-BE49-F238E27FC236}">
+                    <a16:creationId xmlns:a16="http://schemas.microsoft.com/office/drawing/2014/main" id="{B25BA60D-FE3B-AD62-6300-3E1404342F29}"/>
+                  </a:ext>
+                </a:extLst>
+              </p:cNvPr>
+              <p:cNvSpPr/>
+              <p:nvPr/>
+            </p:nvSpPr>
+            <p:spPr bwMode="auto">
+              <a:xfrm>
+                <a:off x="279283" y="4372123"/>
+                <a:ext cx="119093" cy="102666"/>
+              </a:xfrm>
+              <a:prstGeom prst="triangle">
+                <a:avLst/>
+              </a:prstGeom>
+              <a:solidFill>
+                <a:srgbClr val="FFE313"/>
+              </a:solidFill>
+              <a:ln w="12700" cap="flat" cmpd="sng" algn="ctr">
+                <a:solidFill>
+                  <a:srgbClr val="323D43"/>
+                </a:solidFill>
+                <a:prstDash val="solid"/>
+                <a:round/>
+                <a:headEnd type="none" w="med" len="med"/>
+                <a:tailEnd type="none" w="med" len="med"/>
+              </a:ln>
+              <a:effectLst/>
+            </p:spPr>
+            <p:txBody>
+              <a:bodyPr vert="horz" wrap="none" lIns="0" tIns="45720" rIns="91440" bIns="45720" numCol="1" rtlCol="0" anchor="ctr" anchorCtr="0" compatLnSpc="1">
+                <a:prstTxWarp prst="textNoShape">
+                  <a:avLst/>
+                </a:prstTxWarp>
+              </a:bodyPr>
+              <a:lstStyle/>
+              <a:p>
+                <a:pPr marL="342900" marR="0" lvl="0" indent="-342900" algn="ctr" defTabSz="914400" eaLnBrk="1" fontAlgn="base" latinLnBrk="0" hangingPunct="1">
+                  <a:lnSpc>
+                    <a:spcPct val="100000"/>
+                  </a:lnSpc>
+                  <a:spcBef>
+                    <a:spcPct val="40000"/>
+                  </a:spcBef>
+                  <a:spcAft>
+                    <a:spcPct val="20000"/>
+                  </a:spcAft>
+                  <a:buClr>
+                    <a:srgbClr val="0D01FF"/>
+                  </a:buClr>
+                  <a:buSzTx/>
+                  <a:buFont typeface="Wingdings" pitchFamily="2" charset="2"/>
+                  <a:buChar char="§"/>
+                  <a:tabLst/>
+                  <a:defRPr/>
+                </a:pPr>
+                <a:endParaRPr kumimoji="0" lang="en-US" sz="1000" b="0" i="0" u="none" strike="noStrike" kern="0" cap="none" spc="0" normalizeH="0" baseline="0" noProof="0">
+                  <a:ln>
+                    <a:noFill/>
+                  </a:ln>
+                  <a:solidFill>
+                    <a:srgbClr val="323D43"/>
+                  </a:solidFill>
+                  <a:effectLst/>
+                  <a:uLnTx/>
+                  <a:uFillTx/>
+                  <a:latin typeface="Georgia" pitchFamily="18" charset="0"/>
+                  <a:ea typeface="ＭＳ Ｐゴシック" pitchFamily="34" charset="-128"/>
+                </a:endParaRPr>
+              </a:p>
+            </p:txBody>
+          </p:sp>
+          <p:sp>
+            <p:nvSpPr>
+              <p:cNvPr id="128" name="Triangle 127">
+                <a:extLst>
+                  <a:ext uri="{FF2B5EF4-FFF2-40B4-BE49-F238E27FC236}">
+                    <a16:creationId xmlns:a16="http://schemas.microsoft.com/office/drawing/2014/main" id="{06525AE9-8AD7-5B47-B55E-A127E4311F0B}"/>
+                  </a:ext>
+                </a:extLst>
+              </p:cNvPr>
+              <p:cNvSpPr/>
+              <p:nvPr/>
+            </p:nvSpPr>
+            <p:spPr bwMode="auto">
+              <a:xfrm flipV="1">
+                <a:off x="420202" y="4372123"/>
+                <a:ext cx="119093" cy="102666"/>
+              </a:xfrm>
+              <a:prstGeom prst="triangle">
+                <a:avLst/>
+              </a:prstGeom>
+              <a:solidFill>
+                <a:srgbClr val="FFE313"/>
+              </a:solidFill>
+              <a:ln w="12700" cap="flat" cmpd="sng" algn="ctr">
+                <a:solidFill>
+                  <a:srgbClr val="323D43"/>
+                </a:solidFill>
+                <a:prstDash val="solid"/>
+                <a:round/>
+                <a:headEnd type="none" w="med" len="med"/>
+                <a:tailEnd type="none" w="med" len="med"/>
+              </a:ln>
+              <a:effectLst/>
+            </p:spPr>
+            <p:txBody>
+              <a:bodyPr vert="horz" wrap="none" lIns="0" tIns="45720" rIns="91440" bIns="45720" numCol="1" rtlCol="0" anchor="ctr" anchorCtr="0" compatLnSpc="1">
+                <a:prstTxWarp prst="textNoShape">
+                  <a:avLst/>
+                </a:prstTxWarp>
+              </a:bodyPr>
+              <a:lstStyle/>
+              <a:p>
+                <a:pPr marL="342900" marR="0" lvl="0" indent="-342900" algn="ctr" defTabSz="914400" eaLnBrk="1" fontAlgn="base" latinLnBrk="0" hangingPunct="1">
+                  <a:lnSpc>
+                    <a:spcPct val="100000"/>
+                  </a:lnSpc>
+                  <a:spcBef>
+                    <a:spcPct val="40000"/>
+                  </a:spcBef>
+                  <a:spcAft>
+                    <a:spcPct val="20000"/>
+                  </a:spcAft>
+                  <a:buClr>
+                    <a:srgbClr val="0D01FF"/>
+                  </a:buClr>
+                  <a:buSzTx/>
+                  <a:buFont typeface="Wingdings" pitchFamily="2" charset="2"/>
+                  <a:buChar char="§"/>
+                  <a:tabLst/>
+                  <a:defRPr/>
+                </a:pPr>
+                <a:endParaRPr kumimoji="0" lang="en-US" sz="1000" b="0" i="0" u="none" strike="noStrike" kern="0" cap="none" spc="0" normalizeH="0" baseline="0" noProof="0">
+                  <a:ln>
+                    <a:noFill/>
+                  </a:ln>
+                  <a:solidFill>
+                    <a:srgbClr val="323D43"/>
+                  </a:solidFill>
+                  <a:effectLst/>
+                  <a:uLnTx/>
+                  <a:uFillTx/>
+                  <a:latin typeface="Georgia" pitchFamily="18" charset="0"/>
+                  <a:ea typeface="ＭＳ Ｐゴシック" pitchFamily="34" charset="-128"/>
+                </a:endParaRPr>
+              </a:p>
+            </p:txBody>
+          </p:sp>
+          <p:sp>
+            <p:nvSpPr>
+              <p:cNvPr id="129" name="Rectangle 128">
+                <a:extLst>
+                  <a:ext uri="{FF2B5EF4-FFF2-40B4-BE49-F238E27FC236}">
+                    <a16:creationId xmlns:a16="http://schemas.microsoft.com/office/drawing/2014/main" id="{278D2773-F098-48DA-4964-44829D049453}"/>
+                  </a:ext>
+                </a:extLst>
+              </p:cNvPr>
+              <p:cNvSpPr>
+                <a:spLocks noChangeArrowheads="1"/>
+              </p:cNvSpPr>
+              <p:nvPr/>
+            </p:nvSpPr>
+            <p:spPr bwMode="auto">
+              <a:xfrm>
+                <a:off x="603637" y="4341538"/>
+                <a:ext cx="1033937" cy="153888"/>
+              </a:xfrm>
+              <a:prstGeom prst="rect">
+                <a:avLst/>
+              </a:prstGeom>
+              <a:noFill/>
+              <a:ln w="12700" algn="ctr">
+                <a:noFill/>
+                <a:miter lim="800000"/>
+                <a:headEnd/>
+                <a:tailEnd/>
+              </a:ln>
+            </p:spPr>
+            <p:txBody>
+              <a:bodyPr wrap="none" lIns="0" tIns="0" rIns="0" bIns="0" anchor="ctr">
+                <a:spAutoFit/>
+              </a:bodyPr>
+              <a:lstStyle/>
+              <a:p>
+                <a:pPr marL="0" marR="0" lvl="0" indent="0" defTabSz="914400" eaLnBrk="1" fontAlgn="base" latinLnBrk="0" hangingPunct="1">
+                  <a:lnSpc>
+                    <a:spcPct val="100000"/>
+                  </a:lnSpc>
+                  <a:spcBef>
+                    <a:spcPct val="0"/>
+                  </a:spcBef>
+                  <a:spcAft>
+                    <a:spcPct val="0"/>
+                  </a:spcAft>
+                  <a:buClrTx/>
+                  <a:buSzTx/>
+                  <a:buFontTx/>
+                  <a:buNone/>
+                  <a:tabLst/>
+                  <a:defRPr/>
+                </a:pPr>
+                <a:r>
+                  <a:rPr kumimoji="0" lang="en-GB" sz="1000" b="0" i="0" u="none" strike="noStrike" kern="0" cap="none" spc="0" normalizeH="0" baseline="0" noProof="0" dirty="0">
+                    <a:ln>
+                      <a:noFill/>
+                    </a:ln>
+                    <a:solidFill>
+                      <a:srgbClr val="000000"/>
+                    </a:solidFill>
+                    <a:effectLst/>
+                    <a:uLnTx/>
+                    <a:uFillTx/>
+                    <a:latin typeface="Tahoma" pitchFamily="34" charset="0"/>
+                    <a:ea typeface="ＭＳ Ｐゴシック" pitchFamily="34" charset="-128"/>
+                  </a:rPr>
+                  <a:t>Duplicated BUSCO</a:t>
+                </a:r>
+              </a:p>
+            </p:txBody>
+          </p:sp>
+        </p:grpSp>
+        <p:grpSp>
+          <p:nvGrpSpPr>
+            <p:cNvPr id="108" name="Group 107">
+              <a:extLst>
+                <a:ext uri="{FF2B5EF4-FFF2-40B4-BE49-F238E27FC236}">
+                  <a16:creationId xmlns:a16="http://schemas.microsoft.com/office/drawing/2014/main" id="{5C4C36F4-2AD2-715D-BBF2-5F91880CB2B6}"/>
+                </a:ext>
+              </a:extLst>
+            </p:cNvPr>
+            <p:cNvGrpSpPr/>
+            <p:nvPr/>
+          </p:nvGrpSpPr>
+          <p:grpSpPr>
+            <a:xfrm>
+              <a:off x="3789331" y="5040585"/>
+              <a:ext cx="726050" cy="132569"/>
+              <a:chOff x="408129" y="4556982"/>
+              <a:chExt cx="974567" cy="167044"/>
+            </a:xfrm>
+          </p:grpSpPr>
+          <p:sp>
+            <p:nvSpPr>
+              <p:cNvPr id="125" name="Rectangle 124">
+                <a:extLst>
+                  <a:ext uri="{FF2B5EF4-FFF2-40B4-BE49-F238E27FC236}">
+                    <a16:creationId xmlns:a16="http://schemas.microsoft.com/office/drawing/2014/main" id="{492949D5-576B-D3A9-F1FF-FE2A2109A068}"/>
+                  </a:ext>
+                </a:extLst>
+              </p:cNvPr>
+              <p:cNvSpPr>
+                <a:spLocks noChangeArrowheads="1"/>
+              </p:cNvSpPr>
+              <p:nvPr/>
+            </p:nvSpPr>
+            <p:spPr bwMode="auto">
+              <a:xfrm>
+                <a:off x="603637" y="4570138"/>
+                <a:ext cx="779059" cy="153888"/>
+              </a:xfrm>
+              <a:prstGeom prst="rect">
+                <a:avLst/>
+              </a:prstGeom>
+              <a:noFill/>
+              <a:ln w="12700" algn="ctr">
+                <a:noFill/>
+                <a:miter lim="800000"/>
+                <a:headEnd/>
+                <a:tailEnd/>
+              </a:ln>
+            </p:spPr>
+            <p:txBody>
+              <a:bodyPr wrap="none" lIns="0" tIns="0" rIns="0" bIns="0" anchor="ctr">
+                <a:spAutoFit/>
+              </a:bodyPr>
+              <a:lstStyle/>
+              <a:p>
+                <a:pPr marL="0" marR="0" lvl="0" indent="0" defTabSz="914400" eaLnBrk="1" fontAlgn="base" latinLnBrk="0" hangingPunct="1">
+                  <a:lnSpc>
+                    <a:spcPct val="100000"/>
+                  </a:lnSpc>
+                  <a:spcBef>
+                    <a:spcPct val="0"/>
+                  </a:spcBef>
+                  <a:spcAft>
+                    <a:spcPct val="0"/>
+                  </a:spcAft>
+                  <a:buClrTx/>
+                  <a:buSzTx/>
+                  <a:buFontTx/>
+                  <a:buNone/>
+                  <a:tabLst/>
+                  <a:defRPr/>
+                </a:pPr>
+                <a:r>
+                  <a:rPr kumimoji="0" lang="en-GB" sz="1000" b="0" i="0" u="none" strike="noStrike" kern="0" cap="none" spc="0" normalizeH="0" baseline="0" noProof="0" dirty="0">
+                    <a:ln>
+                      <a:noFill/>
+                    </a:ln>
+                    <a:solidFill>
+                      <a:srgbClr val="000000"/>
+                    </a:solidFill>
+                    <a:effectLst/>
+                    <a:uLnTx/>
+                    <a:uFillTx/>
+                    <a:latin typeface="Tahoma" pitchFamily="34" charset="0"/>
+                    <a:ea typeface="ＭＳ Ｐゴシック" pitchFamily="34" charset="-128"/>
+                  </a:rPr>
+                  <a:t>Assembly gap</a:t>
+                </a:r>
+              </a:p>
+            </p:txBody>
+          </p:sp>
+          <p:sp>
+            <p:nvSpPr>
+              <p:cNvPr id="126" name="Rectangle 125">
+                <a:extLst>
+                  <a:ext uri="{FF2B5EF4-FFF2-40B4-BE49-F238E27FC236}">
+                    <a16:creationId xmlns:a16="http://schemas.microsoft.com/office/drawing/2014/main" id="{18207E3A-A025-15CA-7505-D9FCC126FCA5}"/>
+                  </a:ext>
+                </a:extLst>
+              </p:cNvPr>
+              <p:cNvSpPr>
+                <a:spLocks noChangeArrowheads="1"/>
+              </p:cNvSpPr>
+              <p:nvPr/>
+            </p:nvSpPr>
+            <p:spPr bwMode="auto">
+              <a:xfrm>
+                <a:off x="408129" y="4556982"/>
+                <a:ext cx="92974" cy="153888"/>
+              </a:xfrm>
+              <a:prstGeom prst="rect">
+                <a:avLst/>
+              </a:prstGeom>
+              <a:noFill/>
+              <a:ln w="12700" algn="ctr">
+                <a:noFill/>
+                <a:miter lim="800000"/>
+                <a:headEnd/>
+                <a:tailEnd/>
+              </a:ln>
+            </p:spPr>
+            <p:txBody>
+              <a:bodyPr wrap="none" lIns="0" tIns="0" rIns="0" bIns="0" anchor="ctr">
+                <a:spAutoFit/>
+              </a:bodyPr>
+              <a:lstStyle/>
+              <a:p>
+                <a:pPr marL="0" marR="0" lvl="0" indent="0" defTabSz="914400" eaLnBrk="1" fontAlgn="base" latinLnBrk="0" hangingPunct="1">
+                  <a:lnSpc>
+                    <a:spcPct val="100000"/>
+                  </a:lnSpc>
+                  <a:spcBef>
+                    <a:spcPct val="0"/>
+                  </a:spcBef>
+                  <a:spcAft>
+                    <a:spcPct val="0"/>
+                  </a:spcAft>
+                  <a:buClrTx/>
+                  <a:buSzTx/>
+                  <a:buFontTx/>
+                  <a:buNone/>
+                  <a:tabLst/>
+                  <a:defRPr/>
+                </a:pPr>
+                <a:r>
+                  <a:rPr kumimoji="0" lang="en-GB" sz="1000" b="0" i="0" u="none" strike="noStrike" kern="0" cap="none" spc="0" normalizeH="0" baseline="0" noProof="0" dirty="0">
+                    <a:ln>
+                      <a:noFill/>
+                    </a:ln>
+                    <a:solidFill>
+                      <a:srgbClr val="B93022">
+                        <a:lumMod val="75000"/>
+                      </a:srgbClr>
+                    </a:solidFill>
+                    <a:effectLst/>
+                    <a:uLnTx/>
+                    <a:uFillTx/>
+                    <a:latin typeface="Tahoma" pitchFamily="34" charset="0"/>
+                    <a:ea typeface="ＭＳ Ｐゴシック" pitchFamily="34" charset="-128"/>
+                  </a:rPr>
+                  <a:t>+</a:t>
+                </a:r>
+              </a:p>
+            </p:txBody>
+          </p:sp>
+        </p:grpSp>
+        <p:grpSp>
+          <p:nvGrpSpPr>
+            <p:cNvPr id="109" name="Group 108">
+              <a:extLst>
+                <a:ext uri="{FF2B5EF4-FFF2-40B4-BE49-F238E27FC236}">
+                  <a16:creationId xmlns:a16="http://schemas.microsoft.com/office/drawing/2014/main" id="{EF1ED84C-EF85-6B72-7204-5F6950955D26}"/>
+                </a:ext>
+              </a:extLst>
+            </p:cNvPr>
+            <p:cNvGrpSpPr/>
+            <p:nvPr/>
+          </p:nvGrpSpPr>
+          <p:grpSpPr>
+            <a:xfrm>
+              <a:off x="197440" y="5045805"/>
+              <a:ext cx="557817" cy="133329"/>
+              <a:chOff x="310140" y="3884338"/>
+              <a:chExt cx="748750" cy="168001"/>
+            </a:xfrm>
+          </p:grpSpPr>
+          <p:sp>
+            <p:nvSpPr>
+              <p:cNvPr id="122" name="Rectangle 121">
+                <a:extLst>
+                  <a:ext uri="{FF2B5EF4-FFF2-40B4-BE49-F238E27FC236}">
+                    <a16:creationId xmlns:a16="http://schemas.microsoft.com/office/drawing/2014/main" id="{4C970739-7011-C9DD-FE82-220C9590BA26}"/>
+                  </a:ext>
+                </a:extLst>
+              </p:cNvPr>
+              <p:cNvSpPr>
+                <a:spLocks noChangeArrowheads="1"/>
+              </p:cNvSpPr>
+              <p:nvPr/>
+            </p:nvSpPr>
+            <p:spPr bwMode="auto">
+              <a:xfrm>
+                <a:off x="603637" y="3884338"/>
+                <a:ext cx="455253" cy="153888"/>
+              </a:xfrm>
+              <a:prstGeom prst="rect">
+                <a:avLst/>
+              </a:prstGeom>
+              <a:noFill/>
+              <a:ln w="12700" algn="ctr">
+                <a:noFill/>
+                <a:miter lim="800000"/>
+                <a:headEnd/>
+                <a:tailEnd/>
+              </a:ln>
+            </p:spPr>
+            <p:txBody>
+              <a:bodyPr wrap="none" lIns="0" tIns="0" rIns="0" bIns="0" anchor="ctr">
+                <a:spAutoFit/>
+              </a:bodyPr>
+              <a:lstStyle/>
+              <a:p>
+                <a:pPr marL="0" marR="0" lvl="0" indent="0" defTabSz="914400" eaLnBrk="1" fontAlgn="base" latinLnBrk="0" hangingPunct="1">
+                  <a:lnSpc>
+                    <a:spcPct val="100000"/>
+                  </a:lnSpc>
+                  <a:spcBef>
+                    <a:spcPct val="0"/>
+                  </a:spcBef>
+                  <a:spcAft>
+                    <a:spcPct val="0"/>
+                  </a:spcAft>
+                  <a:buClrTx/>
+                  <a:buSzTx/>
+                  <a:buFontTx/>
+                  <a:buNone/>
+                  <a:tabLst/>
+                  <a:defRPr/>
+                </a:pPr>
+                <a:r>
+                  <a:rPr kumimoji="0" lang="en-GB" sz="1000" b="0" i="0" u="none" strike="noStrike" kern="0" cap="none" spc="0" normalizeH="0" baseline="0" noProof="0" dirty="0">
+                    <a:ln>
+                      <a:noFill/>
+                    </a:ln>
+                    <a:solidFill>
+                      <a:srgbClr val="000000"/>
+                    </a:solidFill>
+                    <a:effectLst/>
+                    <a:uLnTx/>
+                    <a:uFillTx/>
+                    <a:latin typeface="Tahoma" pitchFamily="34" charset="0"/>
+                    <a:ea typeface="ＭＳ Ｐゴシック" pitchFamily="34" charset="-128"/>
+                  </a:rPr>
+                  <a:t>Synteny</a:t>
+                </a:r>
+              </a:p>
+            </p:txBody>
+          </p:sp>
+          <p:sp>
+            <p:nvSpPr>
+              <p:cNvPr id="123" name="Rectangle 122">
+                <a:extLst>
+                  <a:ext uri="{FF2B5EF4-FFF2-40B4-BE49-F238E27FC236}">
+                    <a16:creationId xmlns:a16="http://schemas.microsoft.com/office/drawing/2014/main" id="{CAE0C146-5BF3-0013-FC41-569FEFF2EB2F}"/>
+                  </a:ext>
+                </a:extLst>
+              </p:cNvPr>
+              <p:cNvSpPr/>
+              <p:nvPr/>
+            </p:nvSpPr>
+            <p:spPr>
+              <a:xfrm>
+                <a:off x="310140" y="3886529"/>
+                <a:ext cx="85725" cy="165810"/>
+              </a:xfrm>
+              <a:prstGeom prst="rect">
+                <a:avLst/>
+              </a:prstGeom>
+              <a:solidFill>
+                <a:srgbClr val="C8DBE9"/>
+              </a:solidFill>
+              <a:ln>
+                <a:noFill/>
+              </a:ln>
+            </p:spPr>
+            <p:style>
+              <a:lnRef idx="2">
+                <a:schemeClr val="accent1">
+                  <a:shade val="15000"/>
+                </a:schemeClr>
+              </a:lnRef>
+              <a:fillRef idx="1">
+                <a:schemeClr val="accent1"/>
+              </a:fillRef>
+              <a:effectRef idx="0">
+                <a:schemeClr val="accent1"/>
+              </a:effectRef>
+              <a:fontRef idx="minor">
+                <a:schemeClr val="lt1"/>
+              </a:fontRef>
+            </p:style>
+            <p:txBody>
+              <a:bodyPr rtlCol="0" anchor="ctr"/>
+              <a:lstStyle/>
+              <a:p>
+                <a:pPr algn="ctr"/>
+                <a:endParaRPr lang="en-AU" sz="1000"/>
+              </a:p>
+            </p:txBody>
+          </p:sp>
+          <p:sp>
+            <p:nvSpPr>
+              <p:cNvPr id="124" name="Rectangle 123">
+                <a:extLst>
+                  <a:ext uri="{FF2B5EF4-FFF2-40B4-BE49-F238E27FC236}">
+                    <a16:creationId xmlns:a16="http://schemas.microsoft.com/office/drawing/2014/main" id="{68ECE522-C9BC-028B-A90F-D539A2768D76}"/>
+                  </a:ext>
+                </a:extLst>
+              </p:cNvPr>
+              <p:cNvSpPr/>
+              <p:nvPr/>
+            </p:nvSpPr>
+            <p:spPr>
+              <a:xfrm>
+                <a:off x="449193" y="3886529"/>
+                <a:ext cx="85725" cy="165810"/>
+              </a:xfrm>
+              <a:prstGeom prst="rect">
+                <a:avLst/>
+              </a:prstGeom>
+              <a:solidFill>
+                <a:srgbClr val="F1CECF"/>
+              </a:solidFill>
+              <a:ln>
+                <a:noFill/>
+              </a:ln>
+            </p:spPr>
+            <p:style>
+              <a:lnRef idx="2">
+                <a:schemeClr val="accent1">
+                  <a:shade val="15000"/>
+                </a:schemeClr>
+              </a:lnRef>
+              <a:fillRef idx="1">
+                <a:schemeClr val="accent1"/>
+              </a:fillRef>
+              <a:effectRef idx="0">
+                <a:schemeClr val="accent1"/>
+              </a:effectRef>
+              <a:fontRef idx="minor">
+                <a:schemeClr val="lt1"/>
+              </a:fontRef>
+            </p:style>
+            <p:txBody>
+              <a:bodyPr rtlCol="0" anchor="ctr"/>
+              <a:lstStyle/>
+              <a:p>
+                <a:pPr algn="ctr"/>
+                <a:endParaRPr lang="en-AU" sz="1000"/>
+              </a:p>
+            </p:txBody>
+          </p:sp>
+        </p:grpSp>
+        <p:grpSp>
+          <p:nvGrpSpPr>
+            <p:cNvPr id="139" name="Group 138">
+              <a:extLst>
+                <a:ext uri="{FF2B5EF4-FFF2-40B4-BE49-F238E27FC236}">
+                  <a16:creationId xmlns:a16="http://schemas.microsoft.com/office/drawing/2014/main" id="{045FC6BD-922A-D3C2-EDF2-06FC7B6D8736}"/>
+                </a:ext>
+              </a:extLst>
+            </p:cNvPr>
+            <p:cNvGrpSpPr/>
+            <p:nvPr/>
+          </p:nvGrpSpPr>
+          <p:grpSpPr>
+            <a:xfrm>
+              <a:off x="2419225" y="5305810"/>
+              <a:ext cx="762875" cy="122129"/>
+              <a:chOff x="2446326" y="4341538"/>
+              <a:chExt cx="1023997" cy="153888"/>
+            </a:xfrm>
+          </p:grpSpPr>
+          <p:sp>
+            <p:nvSpPr>
+              <p:cNvPr id="149" name="Triangle 148">
+                <a:extLst>
+                  <a:ext uri="{FF2B5EF4-FFF2-40B4-BE49-F238E27FC236}">
+                    <a16:creationId xmlns:a16="http://schemas.microsoft.com/office/drawing/2014/main" id="{1771D492-7B0C-909C-3A8E-1FB4FA5B732A}"/>
+                  </a:ext>
+                </a:extLst>
+              </p:cNvPr>
+              <p:cNvSpPr/>
+              <p:nvPr/>
+            </p:nvSpPr>
+            <p:spPr bwMode="auto">
+              <a:xfrm flipV="1">
+                <a:off x="2446326" y="4372123"/>
+                <a:ext cx="119093" cy="102666"/>
+              </a:xfrm>
+              <a:prstGeom prst="triangle">
+                <a:avLst/>
+              </a:prstGeom>
+              <a:solidFill>
+                <a:srgbClr val="318B57"/>
+              </a:solidFill>
+              <a:ln w="12700" cap="flat" cmpd="sng" algn="ctr">
+                <a:solidFill>
+                  <a:srgbClr val="323D43"/>
+                </a:solidFill>
+                <a:prstDash val="solid"/>
+                <a:round/>
+                <a:headEnd type="none" w="med" len="med"/>
+                <a:tailEnd type="none" w="med" len="med"/>
+              </a:ln>
+              <a:effectLst/>
+            </p:spPr>
+            <p:txBody>
+              <a:bodyPr vert="horz" wrap="none" lIns="0" tIns="45720" rIns="91440" bIns="45720" numCol="1" rtlCol="0" anchor="ctr" anchorCtr="0" compatLnSpc="1">
+                <a:prstTxWarp prst="textNoShape">
+                  <a:avLst/>
+                </a:prstTxWarp>
+              </a:bodyPr>
+              <a:lstStyle/>
+              <a:p>
+                <a:pPr marL="342900" marR="0" lvl="0" indent="-342900" algn="ctr" defTabSz="914400" eaLnBrk="1" fontAlgn="base" latinLnBrk="0" hangingPunct="1">
+                  <a:lnSpc>
+                    <a:spcPct val="100000"/>
+                  </a:lnSpc>
+                  <a:spcBef>
+                    <a:spcPct val="40000"/>
+                  </a:spcBef>
+                  <a:spcAft>
+                    <a:spcPct val="20000"/>
+                  </a:spcAft>
+                  <a:buClr>
+                    <a:srgbClr val="0D01FF"/>
+                  </a:buClr>
+                  <a:buSzTx/>
+                  <a:buFont typeface="Wingdings" pitchFamily="2" charset="2"/>
+                  <a:buChar char="§"/>
+                  <a:tabLst/>
+                  <a:defRPr/>
+                </a:pPr>
+                <a:endParaRPr kumimoji="0" lang="en-US" sz="1000" b="0" i="0" u="none" strike="noStrike" kern="0" cap="none" spc="0" normalizeH="0" baseline="0" noProof="0">
+                  <a:ln>
+                    <a:noFill/>
+                  </a:ln>
+                  <a:solidFill>
+                    <a:srgbClr val="323D43"/>
+                  </a:solidFill>
+                  <a:effectLst/>
+                  <a:uLnTx/>
+                  <a:uFillTx/>
+                  <a:latin typeface="Georgia" pitchFamily="18" charset="0"/>
+                  <a:ea typeface="ＭＳ Ｐゴシック" pitchFamily="34" charset="-128"/>
+                </a:endParaRPr>
+              </a:p>
+            </p:txBody>
+          </p:sp>
+          <p:sp>
+            <p:nvSpPr>
+              <p:cNvPr id="150" name="Rectangle 149">
+                <a:extLst>
+                  <a:ext uri="{FF2B5EF4-FFF2-40B4-BE49-F238E27FC236}">
+                    <a16:creationId xmlns:a16="http://schemas.microsoft.com/office/drawing/2014/main" id="{E37E467F-6B06-B74C-B5DE-AFB7C9E8C09E}"/>
+                  </a:ext>
+                </a:extLst>
+              </p:cNvPr>
+              <p:cNvSpPr>
+                <a:spLocks noChangeArrowheads="1"/>
+              </p:cNvSpPr>
+              <p:nvPr/>
+            </p:nvSpPr>
+            <p:spPr bwMode="auto">
+              <a:xfrm>
+                <a:off x="2611113" y="4341538"/>
+                <a:ext cx="859210" cy="153888"/>
+              </a:xfrm>
+              <a:prstGeom prst="rect">
+                <a:avLst/>
+              </a:prstGeom>
+              <a:noFill/>
+              <a:ln w="12700" algn="ctr">
+                <a:noFill/>
+                <a:miter lim="800000"/>
+                <a:headEnd/>
+                <a:tailEnd/>
+              </a:ln>
+            </p:spPr>
+            <p:txBody>
+              <a:bodyPr wrap="none" lIns="0" tIns="0" rIns="0" bIns="0" anchor="ctr">
+                <a:spAutoFit/>
+              </a:bodyPr>
+              <a:lstStyle/>
+              <a:p>
+                <a:pPr marL="0" marR="0" lvl="0" indent="0" defTabSz="914400" eaLnBrk="1" fontAlgn="base" latinLnBrk="0" hangingPunct="1">
+                  <a:lnSpc>
+                    <a:spcPct val="100000"/>
+                  </a:lnSpc>
+                  <a:spcBef>
+                    <a:spcPct val="0"/>
+                  </a:spcBef>
+                  <a:spcAft>
+                    <a:spcPct val="0"/>
+                  </a:spcAft>
+                  <a:buClrTx/>
+                  <a:buSzTx/>
+                  <a:buFontTx/>
+                  <a:buNone/>
+                  <a:tabLst/>
+                  <a:defRPr/>
+                </a:pPr>
+                <a:r>
+                  <a:rPr kumimoji="0" lang="en-GB" sz="1000" b="0" i="0" u="none" strike="noStrike" kern="0" cap="none" spc="0" normalizeH="0" baseline="0" noProof="0" dirty="0">
+                    <a:ln>
+                      <a:noFill/>
+                    </a:ln>
+                    <a:solidFill>
+                      <a:srgbClr val="000000"/>
+                    </a:solidFill>
+                    <a:effectLst/>
+                    <a:uLnTx/>
+                    <a:uFillTx/>
+                    <a:latin typeface="Tahoma" pitchFamily="34" charset="0"/>
+                    <a:ea typeface="ＭＳ Ｐゴシック" pitchFamily="34" charset="-128"/>
+                  </a:rPr>
+                  <a:t>28S rRNA gene</a:t>
+                </a:r>
+              </a:p>
+            </p:txBody>
+          </p:sp>
+        </p:grpSp>
+        <p:grpSp>
+          <p:nvGrpSpPr>
+            <p:cNvPr id="140" name="Group 139">
+              <a:extLst>
+                <a:ext uri="{FF2B5EF4-FFF2-40B4-BE49-F238E27FC236}">
+                  <a16:creationId xmlns:a16="http://schemas.microsoft.com/office/drawing/2014/main" id="{896BD373-F119-EF05-9216-2C4B7814D7A0}"/>
+                </a:ext>
+              </a:extLst>
+            </p:cNvPr>
+            <p:cNvGrpSpPr/>
+            <p:nvPr/>
+          </p:nvGrpSpPr>
+          <p:grpSpPr>
+            <a:xfrm>
+              <a:off x="3503643" y="5305810"/>
+              <a:ext cx="698816" cy="122129"/>
+              <a:chOff x="2461778" y="4570138"/>
+              <a:chExt cx="938012" cy="153888"/>
+            </a:xfrm>
+          </p:grpSpPr>
+          <p:sp>
+            <p:nvSpPr>
+              <p:cNvPr id="147" name="Rectangle 146">
+                <a:extLst>
+                  <a:ext uri="{FF2B5EF4-FFF2-40B4-BE49-F238E27FC236}">
+                    <a16:creationId xmlns:a16="http://schemas.microsoft.com/office/drawing/2014/main" id="{B6CBA031-C634-6892-655E-8D07D446ED6B}"/>
+                  </a:ext>
+                </a:extLst>
+              </p:cNvPr>
+              <p:cNvSpPr>
+                <a:spLocks noChangeArrowheads="1"/>
+              </p:cNvSpPr>
+              <p:nvPr/>
+            </p:nvSpPr>
+            <p:spPr bwMode="auto">
+              <a:xfrm>
+                <a:off x="2611113" y="4570138"/>
+                <a:ext cx="788677" cy="153888"/>
+              </a:xfrm>
+              <a:prstGeom prst="rect">
+                <a:avLst/>
+              </a:prstGeom>
+              <a:noFill/>
+              <a:ln w="12700" algn="ctr">
+                <a:noFill/>
+                <a:miter lim="800000"/>
+                <a:headEnd/>
+                <a:tailEnd/>
+              </a:ln>
+            </p:spPr>
+            <p:txBody>
+              <a:bodyPr wrap="none" lIns="0" tIns="0" rIns="0" bIns="0" anchor="ctr">
+                <a:spAutoFit/>
+              </a:bodyPr>
+              <a:lstStyle/>
+              <a:p>
+                <a:pPr marL="0" marR="0" lvl="0" indent="0" defTabSz="914400" eaLnBrk="1" fontAlgn="base" latinLnBrk="0" hangingPunct="1">
+                  <a:lnSpc>
+                    <a:spcPct val="100000"/>
+                  </a:lnSpc>
+                  <a:spcBef>
+                    <a:spcPct val="0"/>
+                  </a:spcBef>
+                  <a:spcAft>
+                    <a:spcPct val="0"/>
+                  </a:spcAft>
+                  <a:buClrTx/>
+                  <a:buSzTx/>
+                  <a:buFontTx/>
+                  <a:buNone/>
+                  <a:tabLst/>
+                  <a:defRPr/>
+                </a:pPr>
+                <a:r>
+                  <a:rPr kumimoji="0" lang="en-GB" sz="1000" b="0" i="0" u="none" strike="noStrike" kern="0" cap="none" spc="0" normalizeH="0" baseline="0" noProof="0" dirty="0">
+                    <a:ln>
+                      <a:noFill/>
+                    </a:ln>
+                    <a:solidFill>
+                      <a:srgbClr val="000000"/>
+                    </a:solidFill>
+                    <a:effectLst/>
+                    <a:uLnTx/>
+                    <a:uFillTx/>
+                    <a:latin typeface="Tahoma" pitchFamily="34" charset="0"/>
+                    <a:ea typeface="ＭＳ Ｐゴシック" pitchFamily="34" charset="-128"/>
+                  </a:rPr>
+                  <a:t>5S rRNA gene</a:t>
+                </a:r>
+              </a:p>
+            </p:txBody>
+          </p:sp>
+          <p:sp>
+            <p:nvSpPr>
+              <p:cNvPr id="148" name="Diamond 147">
+                <a:extLst>
+                  <a:ext uri="{FF2B5EF4-FFF2-40B4-BE49-F238E27FC236}">
+                    <a16:creationId xmlns:a16="http://schemas.microsoft.com/office/drawing/2014/main" id="{05114174-CCFE-CF0C-2A70-721EC4FE4E05}"/>
+                  </a:ext>
+                </a:extLst>
+              </p:cNvPr>
+              <p:cNvSpPr/>
+              <p:nvPr/>
+            </p:nvSpPr>
+            <p:spPr>
+              <a:xfrm>
+                <a:off x="2461778" y="4593857"/>
+                <a:ext cx="102666" cy="102666"/>
+              </a:xfrm>
+              <a:prstGeom prst="diamond">
+                <a:avLst/>
+              </a:prstGeom>
+              <a:solidFill>
+                <a:schemeClr val="bg1"/>
+              </a:solidFill>
+              <a:ln w="12700">
+                <a:solidFill>
+                  <a:schemeClr val="tx1"/>
+                </a:solidFill>
+              </a:ln>
+            </p:spPr>
+            <p:style>
+              <a:lnRef idx="2">
+                <a:schemeClr val="accent1">
+                  <a:shade val="15000"/>
+                </a:schemeClr>
+              </a:lnRef>
+              <a:fillRef idx="1">
+                <a:schemeClr val="accent1"/>
+              </a:fillRef>
+              <a:effectRef idx="0">
+                <a:schemeClr val="accent1"/>
+              </a:effectRef>
+              <a:fontRef idx="minor">
+                <a:schemeClr val="lt1"/>
+              </a:fontRef>
+            </p:style>
+            <p:txBody>
+              <a:bodyPr rtlCol="0" anchor="ctr"/>
+              <a:lstStyle/>
+              <a:p>
+                <a:pPr algn="ctr"/>
+                <a:endParaRPr lang="en-AU" sz="1000"/>
+              </a:p>
+            </p:txBody>
+          </p:sp>
+        </p:grpSp>
+        <p:grpSp>
+          <p:nvGrpSpPr>
+            <p:cNvPr id="141" name="Group 140">
+              <a:extLst>
+                <a:ext uri="{FF2B5EF4-FFF2-40B4-BE49-F238E27FC236}">
+                  <a16:creationId xmlns:a16="http://schemas.microsoft.com/office/drawing/2014/main" id="{F0BE1911-631C-26A6-EC37-49A175F4F052}"/>
+                </a:ext>
+              </a:extLst>
+            </p:cNvPr>
+            <p:cNvGrpSpPr/>
+            <p:nvPr/>
+          </p:nvGrpSpPr>
+          <p:grpSpPr>
+            <a:xfrm>
+              <a:off x="197440" y="5305810"/>
+              <a:ext cx="766687" cy="122129"/>
+              <a:chOff x="2441209" y="3884338"/>
+              <a:chExt cx="1029114" cy="153888"/>
+            </a:xfrm>
+          </p:grpSpPr>
+          <p:sp>
+            <p:nvSpPr>
+              <p:cNvPr id="145" name="Rectangle 144">
+                <a:extLst>
+                  <a:ext uri="{FF2B5EF4-FFF2-40B4-BE49-F238E27FC236}">
+                    <a16:creationId xmlns:a16="http://schemas.microsoft.com/office/drawing/2014/main" id="{A5441298-572D-2389-D31A-CE24E1A3C592}"/>
+                  </a:ext>
+                </a:extLst>
+              </p:cNvPr>
+              <p:cNvSpPr>
+                <a:spLocks noChangeArrowheads="1"/>
+              </p:cNvSpPr>
+              <p:nvPr/>
+            </p:nvSpPr>
+            <p:spPr bwMode="auto">
+              <a:xfrm>
+                <a:off x="2611113" y="3884338"/>
+                <a:ext cx="859210" cy="153888"/>
+              </a:xfrm>
+              <a:prstGeom prst="rect">
+                <a:avLst/>
+              </a:prstGeom>
+              <a:noFill/>
+              <a:ln w="12700" algn="ctr">
+                <a:noFill/>
+                <a:miter lim="800000"/>
+                <a:headEnd/>
+                <a:tailEnd/>
+              </a:ln>
+            </p:spPr>
+            <p:txBody>
+              <a:bodyPr wrap="none" lIns="0" tIns="0" rIns="0" bIns="0" anchor="ctr">
+                <a:spAutoFit/>
+              </a:bodyPr>
+              <a:lstStyle/>
+              <a:p>
+                <a:pPr marL="0" marR="0" lvl="0" indent="0" defTabSz="914400" eaLnBrk="1" fontAlgn="base" latinLnBrk="0" hangingPunct="1">
+                  <a:lnSpc>
+                    <a:spcPct val="100000"/>
+                  </a:lnSpc>
+                  <a:spcBef>
+                    <a:spcPct val="0"/>
+                  </a:spcBef>
+                  <a:spcAft>
+                    <a:spcPct val="0"/>
+                  </a:spcAft>
+                  <a:buClrTx/>
+                  <a:buSzTx/>
+                  <a:buFontTx/>
+                  <a:buNone/>
+                  <a:tabLst/>
+                  <a:defRPr/>
+                </a:pPr>
+                <a:r>
+                  <a:rPr kumimoji="0" lang="en-GB" sz="1000" b="0" i="0" u="none" strike="noStrike" kern="0" cap="none" spc="0" normalizeH="0" baseline="0" noProof="0" dirty="0">
+                    <a:ln>
+                      <a:noFill/>
+                    </a:ln>
+                    <a:solidFill>
+                      <a:srgbClr val="000000"/>
+                    </a:solidFill>
+                    <a:effectLst/>
+                    <a:uLnTx/>
+                    <a:uFillTx/>
+                    <a:latin typeface="Tahoma" pitchFamily="34" charset="0"/>
+                    <a:ea typeface="ＭＳ Ｐゴシック" pitchFamily="34" charset="-128"/>
+                  </a:rPr>
+                  <a:t>18S rRNA gene</a:t>
+                </a:r>
+              </a:p>
+            </p:txBody>
+          </p:sp>
+          <p:sp>
+            <p:nvSpPr>
+              <p:cNvPr id="146" name="Triangle 145">
+                <a:extLst>
+                  <a:ext uri="{FF2B5EF4-FFF2-40B4-BE49-F238E27FC236}">
+                    <a16:creationId xmlns:a16="http://schemas.microsoft.com/office/drawing/2014/main" id="{9644F19E-ED8E-8056-28BB-DE41496C3DCF}"/>
+                  </a:ext>
+                </a:extLst>
+              </p:cNvPr>
+              <p:cNvSpPr/>
+              <p:nvPr/>
+            </p:nvSpPr>
+            <p:spPr bwMode="auto">
+              <a:xfrm rot="10800000" flipV="1">
+                <a:off x="2441209" y="3915471"/>
+                <a:ext cx="119093" cy="102666"/>
+              </a:xfrm>
+              <a:prstGeom prst="triangle">
+                <a:avLst/>
+              </a:prstGeom>
+              <a:solidFill>
+                <a:srgbClr val="87CEED"/>
+              </a:solidFill>
+              <a:ln w="12700" cap="flat" cmpd="sng" algn="ctr">
+                <a:solidFill>
+                  <a:srgbClr val="323D43"/>
+                </a:solidFill>
+                <a:prstDash val="solid"/>
+                <a:round/>
+                <a:headEnd type="none" w="med" len="med"/>
+                <a:tailEnd type="none" w="med" len="med"/>
+              </a:ln>
+              <a:effectLst/>
+            </p:spPr>
+            <p:txBody>
+              <a:bodyPr vert="horz" wrap="none" lIns="0" tIns="45720" rIns="91440" bIns="45720" numCol="1" rtlCol="0" anchor="ctr" anchorCtr="0" compatLnSpc="1">
+                <a:prstTxWarp prst="textNoShape">
+                  <a:avLst/>
+                </a:prstTxWarp>
+              </a:bodyPr>
+              <a:lstStyle/>
+              <a:p>
+                <a:pPr marL="342900" marR="0" lvl="0" indent="-342900" algn="ctr" defTabSz="914400" eaLnBrk="1" fontAlgn="base" latinLnBrk="0" hangingPunct="1">
+                  <a:lnSpc>
+                    <a:spcPct val="100000"/>
+                  </a:lnSpc>
+                  <a:spcBef>
+                    <a:spcPct val="40000"/>
+                  </a:spcBef>
+                  <a:spcAft>
+                    <a:spcPct val="20000"/>
+                  </a:spcAft>
+                  <a:buClr>
+                    <a:srgbClr val="0D01FF"/>
+                  </a:buClr>
+                  <a:buSzTx/>
+                  <a:buFont typeface="Wingdings" pitchFamily="2" charset="2"/>
+                  <a:buChar char="§"/>
+                  <a:tabLst/>
+                  <a:defRPr/>
+                </a:pPr>
+                <a:endParaRPr kumimoji="0" lang="en-US" sz="1000" b="0" i="0" u="none" strike="noStrike" kern="0" cap="none" spc="0" normalizeH="0" baseline="0" noProof="0">
+                  <a:ln>
+                    <a:noFill/>
+                  </a:ln>
+                  <a:solidFill>
+                    <a:srgbClr val="323D43"/>
+                  </a:solidFill>
+                  <a:effectLst/>
+                  <a:uLnTx/>
+                  <a:uFillTx/>
+                  <a:latin typeface="Georgia" pitchFamily="18" charset="0"/>
+                  <a:ea typeface="ＭＳ Ｐゴシック" pitchFamily="34" charset="-128"/>
+                </a:endParaRPr>
+              </a:p>
+            </p:txBody>
+          </p:sp>
+        </p:grpSp>
+        <p:grpSp>
+          <p:nvGrpSpPr>
+            <p:cNvPr id="142" name="Group 141">
+              <a:extLst>
+                <a:ext uri="{FF2B5EF4-FFF2-40B4-BE49-F238E27FC236}">
+                  <a16:creationId xmlns:a16="http://schemas.microsoft.com/office/drawing/2014/main" id="{76E4828A-590C-3C2B-AAE6-67EE0F2823F4}"/>
+                </a:ext>
+              </a:extLst>
+            </p:cNvPr>
+            <p:cNvGrpSpPr/>
+            <p:nvPr/>
+          </p:nvGrpSpPr>
+          <p:grpSpPr>
+            <a:xfrm>
+              <a:off x="1285673" y="5305810"/>
+              <a:ext cx="800064" cy="122129"/>
+              <a:chOff x="2434880" y="4112938"/>
+              <a:chExt cx="1073915" cy="153888"/>
+            </a:xfrm>
+          </p:grpSpPr>
+          <p:sp>
+            <p:nvSpPr>
+              <p:cNvPr id="143" name="Rectangle 142">
+                <a:extLst>
+                  <a:ext uri="{FF2B5EF4-FFF2-40B4-BE49-F238E27FC236}">
+                    <a16:creationId xmlns:a16="http://schemas.microsoft.com/office/drawing/2014/main" id="{E3975311-BD64-3FDD-977D-DB10934B7690}"/>
+                  </a:ext>
+                </a:extLst>
+              </p:cNvPr>
+              <p:cNvSpPr>
+                <a:spLocks noChangeArrowheads="1"/>
+              </p:cNvSpPr>
+              <p:nvPr/>
+            </p:nvSpPr>
+            <p:spPr bwMode="auto">
+              <a:xfrm>
+                <a:off x="2611113" y="4112938"/>
+                <a:ext cx="897682" cy="153888"/>
+              </a:xfrm>
+              <a:prstGeom prst="rect">
+                <a:avLst/>
+              </a:prstGeom>
+              <a:noFill/>
+              <a:ln w="12700" algn="ctr">
+                <a:noFill/>
+                <a:miter lim="800000"/>
+                <a:headEnd/>
+                <a:tailEnd/>
+              </a:ln>
+            </p:spPr>
+            <p:txBody>
+              <a:bodyPr wrap="none" lIns="0" tIns="0" rIns="0" bIns="0" anchor="ctr">
+                <a:spAutoFit/>
+              </a:bodyPr>
+              <a:lstStyle/>
+              <a:p>
+                <a:pPr marL="0" marR="0" lvl="0" indent="0" defTabSz="914400" eaLnBrk="1" fontAlgn="base" latinLnBrk="0" hangingPunct="1">
+                  <a:lnSpc>
+                    <a:spcPct val="100000"/>
+                  </a:lnSpc>
+                  <a:spcBef>
+                    <a:spcPct val="0"/>
+                  </a:spcBef>
+                  <a:spcAft>
+                    <a:spcPct val="0"/>
+                  </a:spcAft>
+                  <a:buClrTx/>
+                  <a:buSzTx/>
+                  <a:buFontTx/>
+                  <a:buNone/>
+                  <a:tabLst/>
+                  <a:defRPr/>
+                </a:pPr>
+                <a:r>
+                  <a:rPr kumimoji="0" lang="en-GB" sz="1000" b="0" i="0" u="none" strike="noStrike" kern="0" cap="none" spc="0" normalizeH="0" baseline="0" noProof="0" dirty="0">
+                    <a:ln>
+                      <a:noFill/>
+                    </a:ln>
+                    <a:solidFill>
+                      <a:srgbClr val="000000"/>
+                    </a:solidFill>
+                    <a:effectLst/>
+                    <a:uLnTx/>
+                    <a:uFillTx/>
+                    <a:latin typeface="Tahoma" pitchFamily="34" charset="0"/>
+                    <a:ea typeface="ＭＳ Ｐゴシック" pitchFamily="34" charset="-128"/>
+                  </a:rPr>
+                  <a:t>5.8S rRNA gene</a:t>
+                </a:r>
+              </a:p>
+            </p:txBody>
+          </p:sp>
+          <p:sp>
+            <p:nvSpPr>
+              <p:cNvPr id="144" name="Rectangle 143">
+                <a:extLst>
+                  <a:ext uri="{FF2B5EF4-FFF2-40B4-BE49-F238E27FC236}">
+                    <a16:creationId xmlns:a16="http://schemas.microsoft.com/office/drawing/2014/main" id="{23FD25BB-EAD4-40FC-5927-294717A6DD46}"/>
+                  </a:ext>
+                </a:extLst>
+              </p:cNvPr>
+              <p:cNvSpPr/>
+              <p:nvPr/>
+            </p:nvSpPr>
+            <p:spPr>
+              <a:xfrm>
+                <a:off x="2434880" y="4140296"/>
+                <a:ext cx="107722" cy="107722"/>
+              </a:xfrm>
+              <a:prstGeom prst="rect">
+                <a:avLst/>
+              </a:prstGeom>
+              <a:solidFill>
+                <a:srgbClr val="FFC0CB"/>
+              </a:solidFill>
+              <a:ln w="12700">
+                <a:solidFill>
+                  <a:schemeClr val="tx1"/>
+                </a:solidFill>
+              </a:ln>
+            </p:spPr>
+            <p:style>
+              <a:lnRef idx="2">
+                <a:schemeClr val="accent1">
+                  <a:shade val="15000"/>
+                </a:schemeClr>
+              </a:lnRef>
+              <a:fillRef idx="1">
+                <a:schemeClr val="accent1"/>
+              </a:fillRef>
+              <a:effectRef idx="0">
+                <a:schemeClr val="accent1"/>
+              </a:effectRef>
+              <a:fontRef idx="minor">
+                <a:schemeClr val="lt1"/>
+              </a:fontRef>
+            </p:style>
+            <p:txBody>
+              <a:bodyPr rtlCol="0" anchor="ctr"/>
+              <a:lstStyle/>
+              <a:p>
+                <a:pPr algn="ctr"/>
+                <a:endParaRPr lang="en-AU" sz="1000"/>
+              </a:p>
+            </p:txBody>
+          </p:sp>
+        </p:grpSp>
+      </p:grpSp>
     </p:spTree>
     <p:extLst>
       <p:ext uri="{BB962C8B-B14F-4D97-AF65-F5344CB8AC3E}">

</xml_diff>

<commit_message>
v1.6.1 : Moved linkage plotting to behind features & fixed CN plotting bug..
</commit_message>
<xml_diff>
--- a/chromsyn_key.pptx
+++ b/chromsyn_key.pptx
@@ -115,13 +115,597 @@
 <file path=ppt/revisionInfo.xml><?xml version="1.0" encoding="utf-8"?>
 <p1510:revInfo xmlns:a="http://schemas.openxmlformats.org/drawingml/2006/main" xmlns:r="http://schemas.openxmlformats.org/officeDocument/2006/relationships" xmlns:p1510="http://schemas.microsoft.com/office/powerpoint/2015/10/main">
   <p1510:revLst>
-    <p1510:client id="{8811C6CF-0419-8B48-A759-88B4EBFFCA77}" v="3" dt="2024-08-15T04:28:40.054"/>
+    <p1510:client id="{FAB4F9A4-6EB3-124C-B89A-CB514B224EF6}" v="8" dt="2024-09-12T13:23:08.190"/>
   </p1510:revLst>
 </p1510:revInfo>
 </file>
 
 <file path=ppt/changesInfos/changesInfo1.xml><?xml version="1.0" encoding="utf-8"?>
 <pc:chgInfo xmlns:a="http://schemas.openxmlformats.org/drawingml/2006/main" xmlns:r="http://schemas.openxmlformats.org/officeDocument/2006/relationships" xmlns:ac="http://schemas.microsoft.com/office/drawing/2013/main/command" xmlns:pc="http://schemas.microsoft.com/office/powerpoint/2013/main/command">
+  <pc:docChgLst>
+    <pc:chgData name="Rich Edwards" userId="00f4226a-1697-4716-8928-b43d7726cc59" providerId="ADAL" clId="{FAB4F9A4-6EB3-124C-B89A-CB514B224EF6}"/>
+    <pc:docChg chg="undo custSel modSld">
+      <pc:chgData name="Rich Edwards" userId="00f4226a-1697-4716-8928-b43d7726cc59" providerId="ADAL" clId="{FAB4F9A4-6EB3-124C-B89A-CB514B224EF6}" dt="2024-09-12T13:29:33.228" v="72" actId="164"/>
+      <pc:docMkLst>
+        <pc:docMk/>
+      </pc:docMkLst>
+      <pc:sldChg chg="addSp delSp modSp mod">
+        <pc:chgData name="Rich Edwards" userId="00f4226a-1697-4716-8928-b43d7726cc59" providerId="ADAL" clId="{FAB4F9A4-6EB3-124C-B89A-CB514B224EF6}" dt="2024-09-12T13:29:33.228" v="72" actId="164"/>
+        <pc:sldMkLst>
+          <pc:docMk/>
+          <pc:sldMk cId="1681145084" sldId="256"/>
+        </pc:sldMkLst>
+        <pc:spChg chg="mod topLvl">
+          <ac:chgData name="Rich Edwards" userId="00f4226a-1697-4716-8928-b43d7726cc59" providerId="ADAL" clId="{FAB4F9A4-6EB3-124C-B89A-CB514B224EF6}" dt="2024-09-12T13:22:56.845" v="54" actId="14100"/>
+          <ac:spMkLst>
+            <pc:docMk/>
+            <pc:sldMk cId="1681145084" sldId="256"/>
+            <ac:spMk id="110" creationId="{DF414DC1-8B28-C7C5-0747-117E3BF58795}"/>
+          </ac:spMkLst>
+        </pc:spChg>
+        <pc:spChg chg="del mod topLvl">
+          <ac:chgData name="Rich Edwards" userId="00f4226a-1697-4716-8928-b43d7726cc59" providerId="ADAL" clId="{FAB4F9A4-6EB3-124C-B89A-CB514B224EF6}" dt="2024-09-12T13:16:07.359" v="29" actId="478"/>
+          <ac:spMkLst>
+            <pc:docMk/>
+            <pc:sldMk cId="1681145084" sldId="256"/>
+            <ac:spMk id="119" creationId="{594A98AE-534D-DC18-6B7A-23CC73B3A58C}"/>
+          </ac:spMkLst>
+        </pc:spChg>
+        <pc:spChg chg="mod topLvl">
+          <ac:chgData name="Rich Edwards" userId="00f4226a-1697-4716-8928-b43d7726cc59" providerId="ADAL" clId="{FAB4F9A4-6EB3-124C-B89A-CB514B224EF6}" dt="2024-09-12T13:23:41.415" v="56" actId="207"/>
+          <ac:spMkLst>
+            <pc:docMk/>
+            <pc:sldMk cId="1681145084" sldId="256"/>
+            <ac:spMk id="120" creationId="{A47A1BE6-64FF-5B9C-FF1A-48C0499B1308}"/>
+          </ac:spMkLst>
+        </pc:spChg>
+        <pc:spChg chg="mod topLvl">
+          <ac:chgData name="Rich Edwards" userId="00f4226a-1697-4716-8928-b43d7726cc59" providerId="ADAL" clId="{FAB4F9A4-6EB3-124C-B89A-CB514B224EF6}" dt="2024-09-12T13:16:01.771" v="28" actId="1076"/>
+          <ac:spMkLst>
+            <pc:docMk/>
+            <pc:sldMk cId="1681145084" sldId="256"/>
+            <ac:spMk id="121" creationId="{DA9F22BA-A222-2DFD-81ED-C69BB92A0C8F}"/>
+          </ac:spMkLst>
+        </pc:spChg>
+        <pc:spChg chg="mod topLvl">
+          <ac:chgData name="Rich Edwards" userId="00f4226a-1697-4716-8928-b43d7726cc59" providerId="ADAL" clId="{FAB4F9A4-6EB3-124C-B89A-CB514B224EF6}" dt="2024-09-12T13:23:41.415" v="56" actId="207"/>
+          <ac:spMkLst>
+            <pc:docMk/>
+            <pc:sldMk cId="1681145084" sldId="256"/>
+            <ac:spMk id="133" creationId="{57B327B5-B669-B776-16C0-304B2512B565}"/>
+          </ac:spMkLst>
+        </pc:spChg>
+        <pc:spChg chg="mod">
+          <ac:chgData name="Rich Edwards" userId="00f4226a-1697-4716-8928-b43d7726cc59" providerId="ADAL" clId="{FAB4F9A4-6EB3-124C-B89A-CB514B224EF6}" dt="2024-09-12T13:13:44.962" v="0" actId="571"/>
+          <ac:spMkLst>
+            <pc:docMk/>
+            <pc:sldMk cId="1681145084" sldId="256"/>
+            <ac:spMk id="134" creationId="{BCD17391-D3EF-07D4-A8A7-B9176D4D4055}"/>
+          </ac:spMkLst>
+        </pc:spChg>
+        <pc:spChg chg="mod">
+          <ac:chgData name="Rich Edwards" userId="00f4226a-1697-4716-8928-b43d7726cc59" providerId="ADAL" clId="{FAB4F9A4-6EB3-124C-B89A-CB514B224EF6}" dt="2024-09-12T13:13:44.962" v="0" actId="571"/>
+          <ac:spMkLst>
+            <pc:docMk/>
+            <pc:sldMk cId="1681145084" sldId="256"/>
+            <ac:spMk id="135" creationId="{ED370652-1D87-BAB3-AA15-1C6D8FCB0D65}"/>
+          </ac:spMkLst>
+        </pc:spChg>
+        <pc:spChg chg="mod">
+          <ac:chgData name="Rich Edwards" userId="00f4226a-1697-4716-8928-b43d7726cc59" providerId="ADAL" clId="{FAB4F9A4-6EB3-124C-B89A-CB514B224EF6}" dt="2024-09-12T13:13:44.962" v="0" actId="571"/>
+          <ac:spMkLst>
+            <pc:docMk/>
+            <pc:sldMk cId="1681145084" sldId="256"/>
+            <ac:spMk id="136" creationId="{6F0663D5-55AF-57D1-103A-22D04FD49ACB}"/>
+          </ac:spMkLst>
+        </pc:spChg>
+        <pc:spChg chg="mod">
+          <ac:chgData name="Rich Edwards" userId="00f4226a-1697-4716-8928-b43d7726cc59" providerId="ADAL" clId="{FAB4F9A4-6EB3-124C-B89A-CB514B224EF6}" dt="2024-09-12T13:13:44.962" v="0" actId="571"/>
+          <ac:spMkLst>
+            <pc:docMk/>
+            <pc:sldMk cId="1681145084" sldId="256"/>
+            <ac:spMk id="137" creationId="{545DEEB4-9BC1-74D4-D46B-63EB093AF954}"/>
+          </ac:spMkLst>
+        </pc:spChg>
+        <pc:spChg chg="mod topLvl">
+          <ac:chgData name="Rich Edwards" userId="00f4226a-1697-4716-8928-b43d7726cc59" providerId="ADAL" clId="{FAB4F9A4-6EB3-124C-B89A-CB514B224EF6}" dt="2024-09-12T13:14:24.884" v="17" actId="20577"/>
+          <ac:spMkLst>
+            <pc:docMk/>
+            <pc:sldMk cId="1681145084" sldId="256"/>
+            <ac:spMk id="138" creationId="{E9316DFF-8F25-22B5-3918-BB20EC99979D}"/>
+          </ac:spMkLst>
+        </pc:spChg>
+        <pc:spChg chg="del mod topLvl">
+          <ac:chgData name="Rich Edwards" userId="00f4226a-1697-4716-8928-b43d7726cc59" providerId="ADAL" clId="{FAB4F9A4-6EB3-124C-B89A-CB514B224EF6}" dt="2024-09-12T13:14:02.359" v="2" actId="478"/>
+          <ac:spMkLst>
+            <pc:docMk/>
+            <pc:sldMk cId="1681145084" sldId="256"/>
+            <ac:spMk id="151" creationId="{58EFB27C-45FE-054A-E58B-4C2305F0F2A5}"/>
+          </ac:spMkLst>
+        </pc:spChg>
+        <pc:spChg chg="del mod">
+          <ac:chgData name="Rich Edwards" userId="00f4226a-1697-4716-8928-b43d7726cc59" providerId="ADAL" clId="{FAB4F9A4-6EB3-124C-B89A-CB514B224EF6}" dt="2024-09-12T13:14:02.359" v="2" actId="478"/>
+          <ac:spMkLst>
+            <pc:docMk/>
+            <pc:sldMk cId="1681145084" sldId="256"/>
+            <ac:spMk id="152" creationId="{930B131B-5BB6-6121-BF55-CD03EBBF4CC9}"/>
+          </ac:spMkLst>
+        </pc:spChg>
+        <pc:spChg chg="mod">
+          <ac:chgData name="Rich Edwards" userId="00f4226a-1697-4716-8928-b43d7726cc59" providerId="ADAL" clId="{FAB4F9A4-6EB3-124C-B89A-CB514B224EF6}" dt="2024-09-12T13:13:44.962" v="0" actId="571"/>
+          <ac:spMkLst>
+            <pc:docMk/>
+            <pc:sldMk cId="1681145084" sldId="256"/>
+            <ac:spMk id="153" creationId="{125A7EA6-47CD-B8B4-A838-B15917F62BF5}"/>
+          </ac:spMkLst>
+        </pc:spChg>
+        <pc:spChg chg="mod">
+          <ac:chgData name="Rich Edwards" userId="00f4226a-1697-4716-8928-b43d7726cc59" providerId="ADAL" clId="{FAB4F9A4-6EB3-124C-B89A-CB514B224EF6}" dt="2024-09-12T13:13:44.962" v="0" actId="571"/>
+          <ac:spMkLst>
+            <pc:docMk/>
+            <pc:sldMk cId="1681145084" sldId="256"/>
+            <ac:spMk id="154" creationId="{F2A82402-3B60-7A73-A3C6-5F8A93BE6428}"/>
+          </ac:spMkLst>
+        </pc:spChg>
+        <pc:spChg chg="mod">
+          <ac:chgData name="Rich Edwards" userId="00f4226a-1697-4716-8928-b43d7726cc59" providerId="ADAL" clId="{FAB4F9A4-6EB3-124C-B89A-CB514B224EF6}" dt="2024-09-12T13:13:44.962" v="0" actId="571"/>
+          <ac:spMkLst>
+            <pc:docMk/>
+            <pc:sldMk cId="1681145084" sldId="256"/>
+            <ac:spMk id="155" creationId="{97071CBF-E464-AD84-9D34-7082B8FEB818}"/>
+          </ac:spMkLst>
+        </pc:spChg>
+        <pc:spChg chg="mod">
+          <ac:chgData name="Rich Edwards" userId="00f4226a-1697-4716-8928-b43d7726cc59" providerId="ADAL" clId="{FAB4F9A4-6EB3-124C-B89A-CB514B224EF6}" dt="2024-09-12T13:13:44.962" v="0" actId="571"/>
+          <ac:spMkLst>
+            <pc:docMk/>
+            <pc:sldMk cId="1681145084" sldId="256"/>
+            <ac:spMk id="156" creationId="{63CB0EC5-E075-8EBE-5C0C-A1BD78157560}"/>
+          </ac:spMkLst>
+        </pc:spChg>
+        <pc:spChg chg="mod">
+          <ac:chgData name="Rich Edwards" userId="00f4226a-1697-4716-8928-b43d7726cc59" providerId="ADAL" clId="{FAB4F9A4-6EB3-124C-B89A-CB514B224EF6}" dt="2024-09-12T13:13:44.962" v="0" actId="571"/>
+          <ac:spMkLst>
+            <pc:docMk/>
+            <pc:sldMk cId="1681145084" sldId="256"/>
+            <ac:spMk id="157" creationId="{9A5FF60E-B297-44A7-324E-E2DDB0E2C8F4}"/>
+          </ac:spMkLst>
+        </pc:spChg>
+        <pc:spChg chg="mod">
+          <ac:chgData name="Rich Edwards" userId="00f4226a-1697-4716-8928-b43d7726cc59" providerId="ADAL" clId="{FAB4F9A4-6EB3-124C-B89A-CB514B224EF6}" dt="2024-09-12T13:13:44.962" v="0" actId="571"/>
+          <ac:spMkLst>
+            <pc:docMk/>
+            <pc:sldMk cId="1681145084" sldId="256"/>
+            <ac:spMk id="158" creationId="{8D2FB7E9-7A46-A1A4-6DF8-1F71661F0A9F}"/>
+          </ac:spMkLst>
+        </pc:spChg>
+        <pc:spChg chg="mod">
+          <ac:chgData name="Rich Edwards" userId="00f4226a-1697-4716-8928-b43d7726cc59" providerId="ADAL" clId="{FAB4F9A4-6EB3-124C-B89A-CB514B224EF6}" dt="2024-09-12T13:13:44.962" v="0" actId="571"/>
+          <ac:spMkLst>
+            <pc:docMk/>
+            <pc:sldMk cId="1681145084" sldId="256"/>
+            <ac:spMk id="159" creationId="{B8605ECC-CF9A-AAA4-584F-5EB81560D862}"/>
+          </ac:spMkLst>
+        </pc:spChg>
+        <pc:spChg chg="mod">
+          <ac:chgData name="Rich Edwards" userId="00f4226a-1697-4716-8928-b43d7726cc59" providerId="ADAL" clId="{FAB4F9A4-6EB3-124C-B89A-CB514B224EF6}" dt="2024-09-12T13:13:44.962" v="0" actId="571"/>
+          <ac:spMkLst>
+            <pc:docMk/>
+            <pc:sldMk cId="1681145084" sldId="256"/>
+            <ac:spMk id="160" creationId="{368D1606-08DF-5F40-970E-C6181EDBFB80}"/>
+          </ac:spMkLst>
+        </pc:spChg>
+        <pc:spChg chg="add mod">
+          <ac:chgData name="Rich Edwards" userId="00f4226a-1697-4716-8928-b43d7726cc59" providerId="ADAL" clId="{FAB4F9A4-6EB3-124C-B89A-CB514B224EF6}" dt="2024-09-12T13:21:09.193" v="36" actId="20577"/>
+          <ac:spMkLst>
+            <pc:docMk/>
+            <pc:sldMk cId="1681145084" sldId="256"/>
+            <ac:spMk id="163" creationId="{0783BC3F-7607-92AD-6133-A67D30A00254}"/>
+          </ac:spMkLst>
+        </pc:spChg>
+        <pc:spChg chg="add mod">
+          <ac:chgData name="Rich Edwards" userId="00f4226a-1697-4716-8928-b43d7726cc59" providerId="ADAL" clId="{FAB4F9A4-6EB3-124C-B89A-CB514B224EF6}" dt="2024-09-12T13:25:37.413" v="60" actId="207"/>
+          <ac:spMkLst>
+            <pc:docMk/>
+            <pc:sldMk cId="1681145084" sldId="256"/>
+            <ac:spMk id="164" creationId="{23CD59D5-F658-E35F-AC14-40C88ED30C34}"/>
+          </ac:spMkLst>
+        </pc:spChg>
+        <pc:spChg chg="add mod">
+          <ac:chgData name="Rich Edwards" userId="00f4226a-1697-4716-8928-b43d7726cc59" providerId="ADAL" clId="{FAB4F9A4-6EB3-124C-B89A-CB514B224EF6}" dt="2024-09-12T13:25:37.413" v="60" actId="207"/>
+          <ac:spMkLst>
+            <pc:docMk/>
+            <pc:sldMk cId="1681145084" sldId="256"/>
+            <ac:spMk id="165" creationId="{D977FF98-3DED-C1B6-C3EF-4EE68048D282}"/>
+          </ac:spMkLst>
+        </pc:spChg>
+        <pc:spChg chg="add mod">
+          <ac:chgData name="Rich Edwards" userId="00f4226a-1697-4716-8928-b43d7726cc59" providerId="ADAL" clId="{FAB4F9A4-6EB3-124C-B89A-CB514B224EF6}" dt="2024-09-12T13:22:21.765" v="41" actId="20577"/>
+          <ac:spMkLst>
+            <pc:docMk/>
+            <pc:sldMk cId="1681145084" sldId="256"/>
+            <ac:spMk id="166" creationId="{4DF970F3-49D9-1308-3197-99252941CF83}"/>
+          </ac:spMkLst>
+        </pc:spChg>
+        <pc:spChg chg="add mod">
+          <ac:chgData name="Rich Edwards" userId="00f4226a-1697-4716-8928-b43d7726cc59" providerId="ADAL" clId="{FAB4F9A4-6EB3-124C-B89A-CB514B224EF6}" dt="2024-09-12T13:24:42.334" v="58" actId="207"/>
+          <ac:spMkLst>
+            <pc:docMk/>
+            <pc:sldMk cId="1681145084" sldId="256"/>
+            <ac:spMk id="167" creationId="{634A423E-EEE0-7075-2A0C-5AA82CBA8DEC}"/>
+          </ac:spMkLst>
+        </pc:spChg>
+        <pc:spChg chg="add mod">
+          <ac:chgData name="Rich Edwards" userId="00f4226a-1697-4716-8928-b43d7726cc59" providerId="ADAL" clId="{FAB4F9A4-6EB3-124C-B89A-CB514B224EF6}" dt="2024-09-12T13:24:42.334" v="58" actId="207"/>
+          <ac:spMkLst>
+            <pc:docMk/>
+            <pc:sldMk cId="1681145084" sldId="256"/>
+            <ac:spMk id="168" creationId="{7ADF4DE7-9D37-285B-A557-D0AE98A8A9F9}"/>
+          </ac:spMkLst>
+        </pc:spChg>
+        <pc:spChg chg="add mod">
+          <ac:chgData name="Rich Edwards" userId="00f4226a-1697-4716-8928-b43d7726cc59" providerId="ADAL" clId="{FAB4F9A4-6EB3-124C-B89A-CB514B224EF6}" dt="2024-09-12T13:22:24.151" v="44" actId="20577"/>
+          <ac:spMkLst>
+            <pc:docMk/>
+            <pc:sldMk cId="1681145084" sldId="256"/>
+            <ac:spMk id="169" creationId="{68B899A6-321D-FDEC-7A41-F386AD4AFAF3}"/>
+          </ac:spMkLst>
+        </pc:spChg>
+        <pc:spChg chg="add mod">
+          <ac:chgData name="Rich Edwards" userId="00f4226a-1697-4716-8928-b43d7726cc59" providerId="ADAL" clId="{FAB4F9A4-6EB3-124C-B89A-CB514B224EF6}" dt="2024-09-12T13:26:02.845" v="61" actId="207"/>
+          <ac:spMkLst>
+            <pc:docMk/>
+            <pc:sldMk cId="1681145084" sldId="256"/>
+            <ac:spMk id="170" creationId="{B9F960FD-DCA2-B08F-4F85-5DE47976AAC1}"/>
+          </ac:spMkLst>
+        </pc:spChg>
+        <pc:spChg chg="add mod">
+          <ac:chgData name="Rich Edwards" userId="00f4226a-1697-4716-8928-b43d7726cc59" providerId="ADAL" clId="{FAB4F9A4-6EB3-124C-B89A-CB514B224EF6}" dt="2024-09-12T13:26:02.845" v="61" actId="207"/>
+          <ac:spMkLst>
+            <pc:docMk/>
+            <pc:sldMk cId="1681145084" sldId="256"/>
+            <ac:spMk id="171" creationId="{ED39BCB1-618A-8545-68E0-1232AFBF654D}"/>
+          </ac:spMkLst>
+        </pc:spChg>
+        <pc:spChg chg="add mod">
+          <ac:chgData name="Rich Edwards" userId="00f4226a-1697-4716-8928-b43d7726cc59" providerId="ADAL" clId="{FAB4F9A4-6EB3-124C-B89A-CB514B224EF6}" dt="2024-09-12T13:22:29.723" v="47" actId="20577"/>
+          <ac:spMkLst>
+            <pc:docMk/>
+            <pc:sldMk cId="1681145084" sldId="256"/>
+            <ac:spMk id="172" creationId="{C8CC2D4E-E01D-8DF4-4548-B8B96D481F32}"/>
+          </ac:spMkLst>
+        </pc:spChg>
+        <pc:spChg chg="add mod">
+          <ac:chgData name="Rich Edwards" userId="00f4226a-1697-4716-8928-b43d7726cc59" providerId="ADAL" clId="{FAB4F9A4-6EB3-124C-B89A-CB514B224EF6}" dt="2024-09-12T13:26:47.926" v="63" actId="207"/>
+          <ac:spMkLst>
+            <pc:docMk/>
+            <pc:sldMk cId="1681145084" sldId="256"/>
+            <ac:spMk id="173" creationId="{5687903D-C697-5199-C7AD-6AF31453DAA3}"/>
+          </ac:spMkLst>
+        </pc:spChg>
+        <pc:spChg chg="add mod">
+          <ac:chgData name="Rich Edwards" userId="00f4226a-1697-4716-8928-b43d7726cc59" providerId="ADAL" clId="{FAB4F9A4-6EB3-124C-B89A-CB514B224EF6}" dt="2024-09-12T13:26:47.926" v="63" actId="207"/>
+          <ac:spMkLst>
+            <pc:docMk/>
+            <pc:sldMk cId="1681145084" sldId="256"/>
+            <ac:spMk id="174" creationId="{96DA8784-A44B-E155-F72F-E05E09F5E736}"/>
+          </ac:spMkLst>
+        </pc:spChg>
+        <pc:spChg chg="add mod">
+          <ac:chgData name="Rich Edwards" userId="00f4226a-1697-4716-8928-b43d7726cc59" providerId="ADAL" clId="{FAB4F9A4-6EB3-124C-B89A-CB514B224EF6}" dt="2024-09-12T13:22:37.253" v="52" actId="114"/>
+          <ac:spMkLst>
+            <pc:docMk/>
+            <pc:sldMk cId="1681145084" sldId="256"/>
+            <ac:spMk id="175" creationId="{D8C1459C-34B6-8EA3-E18A-A4CC9FD75B38}"/>
+          </ac:spMkLst>
+        </pc:spChg>
+        <pc:spChg chg="add mod">
+          <ac:chgData name="Rich Edwards" userId="00f4226a-1697-4716-8928-b43d7726cc59" providerId="ADAL" clId="{FAB4F9A4-6EB3-124C-B89A-CB514B224EF6}" dt="2024-09-12T13:26:34.003" v="62" actId="207"/>
+          <ac:spMkLst>
+            <pc:docMk/>
+            <pc:sldMk cId="1681145084" sldId="256"/>
+            <ac:spMk id="176" creationId="{FF37512F-17B1-662C-E4DE-466C7C01255E}"/>
+          </ac:spMkLst>
+        </pc:spChg>
+        <pc:spChg chg="add mod">
+          <ac:chgData name="Rich Edwards" userId="00f4226a-1697-4716-8928-b43d7726cc59" providerId="ADAL" clId="{FAB4F9A4-6EB3-124C-B89A-CB514B224EF6}" dt="2024-09-12T13:26:34.003" v="62" actId="207"/>
+          <ac:spMkLst>
+            <pc:docMk/>
+            <pc:sldMk cId="1681145084" sldId="256"/>
+            <ac:spMk id="177" creationId="{A862712D-5C97-1BB9-8BFF-29906210428F}"/>
+          </ac:spMkLst>
+        </pc:spChg>
+        <pc:spChg chg="add del mod">
+          <ac:chgData name="Rich Edwards" userId="00f4226a-1697-4716-8928-b43d7726cc59" providerId="ADAL" clId="{FAB4F9A4-6EB3-124C-B89A-CB514B224EF6}" dt="2024-09-12T13:27:06.588" v="66" actId="478"/>
+          <ac:spMkLst>
+            <pc:docMk/>
+            <pc:sldMk cId="1681145084" sldId="256"/>
+            <ac:spMk id="178" creationId="{10B3C133-63D7-75C1-A5F6-F17CC249CC9C}"/>
+          </ac:spMkLst>
+        </pc:spChg>
+        <pc:spChg chg="add del mod">
+          <ac:chgData name="Rich Edwards" userId="00f4226a-1697-4716-8928-b43d7726cc59" providerId="ADAL" clId="{FAB4F9A4-6EB3-124C-B89A-CB514B224EF6}" dt="2024-09-12T13:27:06.588" v="66" actId="478"/>
+          <ac:spMkLst>
+            <pc:docMk/>
+            <pc:sldMk cId="1681145084" sldId="256"/>
+            <ac:spMk id="179" creationId="{8D076E8B-84F6-B8CA-DC1E-1A9245514630}"/>
+          </ac:spMkLst>
+        </pc:spChg>
+        <pc:spChg chg="add del mod">
+          <ac:chgData name="Rich Edwards" userId="00f4226a-1697-4716-8928-b43d7726cc59" providerId="ADAL" clId="{FAB4F9A4-6EB3-124C-B89A-CB514B224EF6}" dt="2024-09-12T13:27:06.588" v="66" actId="478"/>
+          <ac:spMkLst>
+            <pc:docMk/>
+            <pc:sldMk cId="1681145084" sldId="256"/>
+            <ac:spMk id="180" creationId="{D5D94E72-04FF-0A96-4747-AF3F1FE29DEB}"/>
+          </ac:spMkLst>
+        </pc:spChg>
+        <pc:spChg chg="add del mod">
+          <ac:chgData name="Rich Edwards" userId="00f4226a-1697-4716-8928-b43d7726cc59" providerId="ADAL" clId="{FAB4F9A4-6EB3-124C-B89A-CB514B224EF6}" dt="2024-09-12T13:27:06.588" v="66" actId="478"/>
+          <ac:spMkLst>
+            <pc:docMk/>
+            <pc:sldMk cId="1681145084" sldId="256"/>
+            <ac:spMk id="181" creationId="{5B321051-81DF-53C3-AB20-A9DEFC74AD49}"/>
+          </ac:spMkLst>
+        </pc:spChg>
+        <pc:spChg chg="add del mod">
+          <ac:chgData name="Rich Edwards" userId="00f4226a-1697-4716-8928-b43d7726cc59" providerId="ADAL" clId="{FAB4F9A4-6EB3-124C-B89A-CB514B224EF6}" dt="2024-09-12T13:27:06.588" v="66" actId="478"/>
+          <ac:spMkLst>
+            <pc:docMk/>
+            <pc:sldMk cId="1681145084" sldId="256"/>
+            <ac:spMk id="182" creationId="{9AC5F700-E9A1-118E-1664-E8FA95F17711}"/>
+          </ac:spMkLst>
+        </pc:spChg>
+        <pc:spChg chg="add del mod">
+          <ac:chgData name="Rich Edwards" userId="00f4226a-1697-4716-8928-b43d7726cc59" providerId="ADAL" clId="{FAB4F9A4-6EB3-124C-B89A-CB514B224EF6}" dt="2024-09-12T13:27:06.588" v="66" actId="478"/>
+          <ac:spMkLst>
+            <pc:docMk/>
+            <pc:sldMk cId="1681145084" sldId="256"/>
+            <ac:spMk id="183" creationId="{3EC90501-2548-8F53-F3C2-B5079143BC52}"/>
+          </ac:spMkLst>
+        </pc:spChg>
+        <pc:spChg chg="add del mod">
+          <ac:chgData name="Rich Edwards" userId="00f4226a-1697-4716-8928-b43d7726cc59" providerId="ADAL" clId="{FAB4F9A4-6EB3-124C-B89A-CB514B224EF6}" dt="2024-09-12T13:27:06.588" v="66" actId="478"/>
+          <ac:spMkLst>
+            <pc:docMk/>
+            <pc:sldMk cId="1681145084" sldId="256"/>
+            <ac:spMk id="184" creationId="{6221CCF1-29DC-4B66-75BE-2233E89F399A}"/>
+          </ac:spMkLst>
+        </pc:spChg>
+        <pc:spChg chg="add del mod">
+          <ac:chgData name="Rich Edwards" userId="00f4226a-1697-4716-8928-b43d7726cc59" providerId="ADAL" clId="{FAB4F9A4-6EB3-124C-B89A-CB514B224EF6}" dt="2024-09-12T13:27:06.588" v="66" actId="478"/>
+          <ac:spMkLst>
+            <pc:docMk/>
+            <pc:sldMk cId="1681145084" sldId="256"/>
+            <ac:spMk id="185" creationId="{9B488D6C-74E5-EF73-21E0-D14F4DEFA143}"/>
+          </ac:spMkLst>
+        </pc:spChg>
+        <pc:spChg chg="add del mod">
+          <ac:chgData name="Rich Edwards" userId="00f4226a-1697-4716-8928-b43d7726cc59" providerId="ADAL" clId="{FAB4F9A4-6EB3-124C-B89A-CB514B224EF6}" dt="2024-09-12T13:27:06.588" v="66" actId="478"/>
+          <ac:spMkLst>
+            <pc:docMk/>
+            <pc:sldMk cId="1681145084" sldId="256"/>
+            <ac:spMk id="186" creationId="{D7C543FB-2608-F762-6E0B-5DAE2D697241}"/>
+          </ac:spMkLst>
+        </pc:spChg>
+        <pc:spChg chg="add del mod">
+          <ac:chgData name="Rich Edwards" userId="00f4226a-1697-4716-8928-b43d7726cc59" providerId="ADAL" clId="{FAB4F9A4-6EB3-124C-B89A-CB514B224EF6}" dt="2024-09-12T13:27:06.588" v="66" actId="478"/>
+          <ac:spMkLst>
+            <pc:docMk/>
+            <pc:sldMk cId="1681145084" sldId="256"/>
+            <ac:spMk id="187" creationId="{33BEDB1A-3BF2-0D4E-8A5B-72A7BD8D7D59}"/>
+          </ac:spMkLst>
+        </pc:spChg>
+        <pc:spChg chg="add del mod">
+          <ac:chgData name="Rich Edwards" userId="00f4226a-1697-4716-8928-b43d7726cc59" providerId="ADAL" clId="{FAB4F9A4-6EB3-124C-B89A-CB514B224EF6}" dt="2024-09-12T13:27:06.588" v="66" actId="478"/>
+          <ac:spMkLst>
+            <pc:docMk/>
+            <pc:sldMk cId="1681145084" sldId="256"/>
+            <ac:spMk id="188" creationId="{B68CA921-9196-9C0F-71FC-06D983798DBA}"/>
+          </ac:spMkLst>
+        </pc:spChg>
+        <pc:spChg chg="add del mod">
+          <ac:chgData name="Rich Edwards" userId="00f4226a-1697-4716-8928-b43d7726cc59" providerId="ADAL" clId="{FAB4F9A4-6EB3-124C-B89A-CB514B224EF6}" dt="2024-09-12T13:27:06.588" v="66" actId="478"/>
+          <ac:spMkLst>
+            <pc:docMk/>
+            <pc:sldMk cId="1681145084" sldId="256"/>
+            <ac:spMk id="189" creationId="{B01BE5DD-4C7E-0801-9F96-70625A17155B}"/>
+          </ac:spMkLst>
+        </pc:spChg>
+        <pc:spChg chg="add del mod">
+          <ac:chgData name="Rich Edwards" userId="00f4226a-1697-4716-8928-b43d7726cc59" providerId="ADAL" clId="{FAB4F9A4-6EB3-124C-B89A-CB514B224EF6}" dt="2024-09-12T13:27:06.588" v="66" actId="478"/>
+          <ac:spMkLst>
+            <pc:docMk/>
+            <pc:sldMk cId="1681145084" sldId="256"/>
+            <ac:spMk id="190" creationId="{0E4EE726-854E-2A35-F9C2-5C02D021EA31}"/>
+          </ac:spMkLst>
+        </pc:spChg>
+        <pc:spChg chg="add del mod">
+          <ac:chgData name="Rich Edwards" userId="00f4226a-1697-4716-8928-b43d7726cc59" providerId="ADAL" clId="{FAB4F9A4-6EB3-124C-B89A-CB514B224EF6}" dt="2024-09-12T13:27:06.588" v="66" actId="478"/>
+          <ac:spMkLst>
+            <pc:docMk/>
+            <pc:sldMk cId="1681145084" sldId="256"/>
+            <ac:spMk id="191" creationId="{8EFBAE84-72B6-AF0B-BEAD-36135E8AD835}"/>
+          </ac:spMkLst>
+        </pc:spChg>
+        <pc:spChg chg="add del mod">
+          <ac:chgData name="Rich Edwards" userId="00f4226a-1697-4716-8928-b43d7726cc59" providerId="ADAL" clId="{FAB4F9A4-6EB3-124C-B89A-CB514B224EF6}" dt="2024-09-12T13:27:06.588" v="66" actId="478"/>
+          <ac:spMkLst>
+            <pc:docMk/>
+            <pc:sldMk cId="1681145084" sldId="256"/>
+            <ac:spMk id="192" creationId="{047255DB-E3C7-19C5-2AFB-B62F4D7F2518}"/>
+          </ac:spMkLst>
+        </pc:spChg>
+        <pc:spChg chg="add del mod">
+          <ac:chgData name="Rich Edwards" userId="00f4226a-1697-4716-8928-b43d7726cc59" providerId="ADAL" clId="{FAB4F9A4-6EB3-124C-B89A-CB514B224EF6}" dt="2024-09-12T13:27:06.588" v="66" actId="478"/>
+          <ac:spMkLst>
+            <pc:docMk/>
+            <pc:sldMk cId="1681145084" sldId="256"/>
+            <ac:spMk id="193" creationId="{BD726096-AAF9-04E2-B41A-6B842A438BA4}"/>
+          </ac:spMkLst>
+        </pc:spChg>
+        <pc:spChg chg="add del mod">
+          <ac:chgData name="Rich Edwards" userId="00f4226a-1697-4716-8928-b43d7726cc59" providerId="ADAL" clId="{FAB4F9A4-6EB3-124C-B89A-CB514B224EF6}" dt="2024-09-12T13:27:06.588" v="66" actId="478"/>
+          <ac:spMkLst>
+            <pc:docMk/>
+            <pc:sldMk cId="1681145084" sldId="256"/>
+            <ac:spMk id="194" creationId="{30A4347C-E854-F0BF-2C63-74D9D0DC7E9E}"/>
+          </ac:spMkLst>
+        </pc:spChg>
+        <pc:spChg chg="add del mod">
+          <ac:chgData name="Rich Edwards" userId="00f4226a-1697-4716-8928-b43d7726cc59" providerId="ADAL" clId="{FAB4F9A4-6EB3-124C-B89A-CB514B224EF6}" dt="2024-09-12T13:27:06.588" v="66" actId="478"/>
+          <ac:spMkLst>
+            <pc:docMk/>
+            <pc:sldMk cId="1681145084" sldId="256"/>
+            <ac:spMk id="195" creationId="{BD63EF48-B38B-D5F0-DBA1-E6492E78D6BD}"/>
+          </ac:spMkLst>
+        </pc:spChg>
+        <pc:spChg chg="add del mod">
+          <ac:chgData name="Rich Edwards" userId="00f4226a-1697-4716-8928-b43d7726cc59" providerId="ADAL" clId="{FAB4F9A4-6EB3-124C-B89A-CB514B224EF6}" dt="2024-09-12T13:27:06.588" v="66" actId="478"/>
+          <ac:spMkLst>
+            <pc:docMk/>
+            <pc:sldMk cId="1681145084" sldId="256"/>
+            <ac:spMk id="196" creationId="{DD835522-4FFD-82CB-4A15-41CE99B66CDE}"/>
+          </ac:spMkLst>
+        </pc:spChg>
+        <pc:spChg chg="add del mod">
+          <ac:chgData name="Rich Edwards" userId="00f4226a-1697-4716-8928-b43d7726cc59" providerId="ADAL" clId="{FAB4F9A4-6EB3-124C-B89A-CB514B224EF6}" dt="2024-09-12T13:27:06.588" v="66" actId="478"/>
+          <ac:spMkLst>
+            <pc:docMk/>
+            <pc:sldMk cId="1681145084" sldId="256"/>
+            <ac:spMk id="197" creationId="{686954BE-2D4E-7707-320C-722ED3E15554}"/>
+          </ac:spMkLst>
+        </pc:spChg>
+        <pc:grpChg chg="add del mod">
+          <ac:chgData name="Rich Edwards" userId="00f4226a-1697-4716-8928-b43d7726cc59" providerId="ADAL" clId="{FAB4F9A4-6EB3-124C-B89A-CB514B224EF6}" dt="2024-09-12T13:13:55.299" v="1" actId="165"/>
+          <ac:grpSpMkLst>
+            <pc:docMk/>
+            <pc:sldMk cId="1681145084" sldId="256"/>
+            <ac:grpSpMk id="104" creationId="{C841F26D-64D5-919E-C27A-56FFCAD276D5}"/>
+          </ac:grpSpMkLst>
+        </pc:grpChg>
+        <pc:grpChg chg="del mod topLvl">
+          <ac:chgData name="Rich Edwards" userId="00f4226a-1697-4716-8928-b43d7726cc59" providerId="ADAL" clId="{FAB4F9A4-6EB3-124C-B89A-CB514B224EF6}" dt="2024-09-12T13:14:29.890" v="18" actId="478"/>
+          <ac:grpSpMkLst>
+            <pc:docMk/>
+            <pc:sldMk cId="1681145084" sldId="256"/>
+            <ac:grpSpMk id="111" creationId="{18433949-D0B5-8968-9DAC-05407D548E56}"/>
+          </ac:grpSpMkLst>
+        </pc:grpChg>
+        <pc:grpChg chg="del mod topLvl">
+          <ac:chgData name="Rich Edwards" userId="00f4226a-1697-4716-8928-b43d7726cc59" providerId="ADAL" clId="{FAB4F9A4-6EB3-124C-B89A-CB514B224EF6}" dt="2024-09-12T13:16:07.359" v="29" actId="478"/>
+          <ac:grpSpMkLst>
+            <pc:docMk/>
+            <pc:sldMk cId="1681145084" sldId="256"/>
+            <ac:grpSpMk id="112" creationId="{CCE9215B-DBC7-002E-701B-D8038FBE41AA}"/>
+          </ac:grpSpMkLst>
+        </pc:grpChg>
+        <pc:grpChg chg="del mod topLvl">
+          <ac:chgData name="Rich Edwards" userId="00f4226a-1697-4716-8928-b43d7726cc59" providerId="ADAL" clId="{FAB4F9A4-6EB3-124C-B89A-CB514B224EF6}" dt="2024-09-12T13:16:07.359" v="29" actId="478"/>
+          <ac:grpSpMkLst>
+            <pc:docMk/>
+            <pc:sldMk cId="1681145084" sldId="256"/>
+            <ac:grpSpMk id="113" creationId="{B10A594D-639E-5269-E518-29850638CECA}"/>
+          </ac:grpSpMkLst>
+        </pc:grpChg>
+        <pc:grpChg chg="del mod topLvl">
+          <ac:chgData name="Rich Edwards" userId="00f4226a-1697-4716-8928-b43d7726cc59" providerId="ADAL" clId="{FAB4F9A4-6EB3-124C-B89A-CB514B224EF6}" dt="2024-09-12T13:14:02.359" v="2" actId="478"/>
+          <ac:grpSpMkLst>
+            <pc:docMk/>
+            <pc:sldMk cId="1681145084" sldId="256"/>
+            <ac:grpSpMk id="114" creationId="{647854E6-78B5-7D11-3902-3DDFD3733070}"/>
+          </ac:grpSpMkLst>
+        </pc:grpChg>
+        <pc:grpChg chg="del mod topLvl">
+          <ac:chgData name="Rich Edwards" userId="00f4226a-1697-4716-8928-b43d7726cc59" providerId="ADAL" clId="{FAB4F9A4-6EB3-124C-B89A-CB514B224EF6}" dt="2024-09-12T13:16:07.359" v="29" actId="478"/>
+          <ac:grpSpMkLst>
+            <pc:docMk/>
+            <pc:sldMk cId="1681145084" sldId="256"/>
+            <ac:grpSpMk id="115" creationId="{B7FFB537-8109-2FD0-32AF-CBA13D00DF7C}"/>
+          </ac:grpSpMkLst>
+        </pc:grpChg>
+        <pc:grpChg chg="del mod topLvl">
+          <ac:chgData name="Rich Edwards" userId="00f4226a-1697-4716-8928-b43d7726cc59" providerId="ADAL" clId="{FAB4F9A4-6EB3-124C-B89A-CB514B224EF6}" dt="2024-09-12T13:16:11.526" v="30" actId="478"/>
+          <ac:grpSpMkLst>
+            <pc:docMk/>
+            <pc:sldMk cId="1681145084" sldId="256"/>
+            <ac:grpSpMk id="116" creationId="{AAFCAA8F-669A-9D9A-96F7-CB0A872E33F5}"/>
+          </ac:grpSpMkLst>
+        </pc:grpChg>
+        <pc:grpChg chg="del mod topLvl">
+          <ac:chgData name="Rich Edwards" userId="00f4226a-1697-4716-8928-b43d7726cc59" providerId="ADAL" clId="{FAB4F9A4-6EB3-124C-B89A-CB514B224EF6}" dt="2024-09-12T13:14:36.594" v="19" actId="165"/>
+          <ac:grpSpMkLst>
+            <pc:docMk/>
+            <pc:sldMk cId="1681145084" sldId="256"/>
+            <ac:grpSpMk id="117" creationId="{359CF176-6434-AD5A-2605-DC0605B34396}"/>
+          </ac:grpSpMkLst>
+        </pc:grpChg>
+        <pc:grpChg chg="del mod topLvl">
+          <ac:chgData name="Rich Edwards" userId="00f4226a-1697-4716-8928-b43d7726cc59" providerId="ADAL" clId="{FAB4F9A4-6EB3-124C-B89A-CB514B224EF6}" dt="2024-09-12T13:14:41.185" v="20" actId="165"/>
+          <ac:grpSpMkLst>
+            <pc:docMk/>
+            <pc:sldMk cId="1681145084" sldId="256"/>
+            <ac:grpSpMk id="118" creationId="{D3ACC98B-747F-D6C7-3646-E45E49592197}"/>
+          </ac:grpSpMkLst>
+        </pc:grpChg>
+        <pc:grpChg chg="add">
+          <ac:chgData name="Rich Edwards" userId="00f4226a-1697-4716-8928-b43d7726cc59" providerId="ADAL" clId="{FAB4F9A4-6EB3-124C-B89A-CB514B224EF6}" dt="2024-09-12T13:29:08.074" v="67" actId="164"/>
+          <ac:grpSpMkLst>
+            <pc:docMk/>
+            <pc:sldMk cId="1681145084" sldId="256"/>
+            <ac:grpSpMk id="198" creationId="{071584CF-BE45-3522-92A1-71CCAFE22DC1}"/>
+          </ac:grpSpMkLst>
+        </pc:grpChg>
+        <pc:grpChg chg="add">
+          <ac:chgData name="Rich Edwards" userId="00f4226a-1697-4716-8928-b43d7726cc59" providerId="ADAL" clId="{FAB4F9A4-6EB3-124C-B89A-CB514B224EF6}" dt="2024-09-12T13:29:12.469" v="68" actId="164"/>
+          <ac:grpSpMkLst>
+            <pc:docMk/>
+            <pc:sldMk cId="1681145084" sldId="256"/>
+            <ac:grpSpMk id="199" creationId="{D5FAD84E-15F3-D2FF-11DE-93052BB5F8FE}"/>
+          </ac:grpSpMkLst>
+        </pc:grpChg>
+        <pc:grpChg chg="add">
+          <ac:chgData name="Rich Edwards" userId="00f4226a-1697-4716-8928-b43d7726cc59" providerId="ADAL" clId="{FAB4F9A4-6EB3-124C-B89A-CB514B224EF6}" dt="2024-09-12T13:29:20.860" v="69" actId="164"/>
+          <ac:grpSpMkLst>
+            <pc:docMk/>
+            <pc:sldMk cId="1681145084" sldId="256"/>
+            <ac:grpSpMk id="200" creationId="{A65BD506-DD03-C974-A7C8-0D78176CC35E}"/>
+          </ac:grpSpMkLst>
+        </pc:grpChg>
+        <pc:grpChg chg="add">
+          <ac:chgData name="Rich Edwards" userId="00f4226a-1697-4716-8928-b43d7726cc59" providerId="ADAL" clId="{FAB4F9A4-6EB3-124C-B89A-CB514B224EF6}" dt="2024-09-12T13:29:25.876" v="70" actId="164"/>
+          <ac:grpSpMkLst>
+            <pc:docMk/>
+            <pc:sldMk cId="1681145084" sldId="256"/>
+            <ac:grpSpMk id="201" creationId="{4974F89C-7346-8438-1518-7964B4343EBC}"/>
+          </ac:grpSpMkLst>
+        </pc:grpChg>
+        <pc:grpChg chg="add">
+          <ac:chgData name="Rich Edwards" userId="00f4226a-1697-4716-8928-b43d7726cc59" providerId="ADAL" clId="{FAB4F9A4-6EB3-124C-B89A-CB514B224EF6}" dt="2024-09-12T13:29:29.435" v="71" actId="164"/>
+          <ac:grpSpMkLst>
+            <pc:docMk/>
+            <pc:sldMk cId="1681145084" sldId="256"/>
+            <ac:grpSpMk id="202" creationId="{712D0CF4-8537-3FBB-CC2E-B6E31FD7194E}"/>
+          </ac:grpSpMkLst>
+        </pc:grpChg>
+        <pc:grpChg chg="add">
+          <ac:chgData name="Rich Edwards" userId="00f4226a-1697-4716-8928-b43d7726cc59" providerId="ADAL" clId="{FAB4F9A4-6EB3-124C-B89A-CB514B224EF6}" dt="2024-09-12T13:29:33.228" v="72" actId="164"/>
+          <ac:grpSpMkLst>
+            <pc:docMk/>
+            <pc:sldMk cId="1681145084" sldId="256"/>
+            <ac:grpSpMk id="203" creationId="{EF99E5EA-B796-B4A1-8E87-07D7834F5594}"/>
+          </ac:grpSpMkLst>
+        </pc:grpChg>
+        <pc:picChg chg="add del mod">
+          <ac:chgData name="Rich Edwards" userId="00f4226a-1697-4716-8928-b43d7726cc59" providerId="ADAL" clId="{FAB4F9A4-6EB3-124C-B89A-CB514B224EF6}" dt="2024-09-12T13:26:55.369" v="64" actId="478"/>
+          <ac:picMkLst>
+            <pc:docMk/>
+            <pc:sldMk cId="1681145084" sldId="256"/>
+            <ac:picMk id="161" creationId="{DBEA1A4E-C1A1-D432-B724-4E8D0ECC6C3C}"/>
+          </ac:picMkLst>
+        </pc:picChg>
+      </pc:sldChg>
+    </pc:docChg>
+  </pc:docChgLst>
   <pc:docChgLst>
     <pc:chgData name="Rich Edwards" userId="00f4226a-1697-4716-8928-b43d7726cc59" providerId="ADAL" clId="{8811C6CF-0419-8B48-A759-88B4EBFFCA77}"/>
     <pc:docChg chg="undo custSel modSld">
@@ -994,7 +1578,7 @@
           <a:p>
             <a:fld id="{AD1FA78F-BF5D-AF4E-806D-83B291B0B8BA}" type="datetimeFigureOut">
               <a:rPr lang="en-AU" smtClean="0"/>
-              <a:t>15/8/2024</a:t>
+              <a:t>12/9/2024</a:t>
             </a:fld>
             <a:endParaRPr lang="en-AU"/>
           </a:p>
@@ -1194,7 +1778,7 @@
           <a:p>
             <a:fld id="{AD1FA78F-BF5D-AF4E-806D-83B291B0B8BA}" type="datetimeFigureOut">
               <a:rPr lang="en-AU" smtClean="0"/>
-              <a:t>15/8/2024</a:t>
+              <a:t>12/9/2024</a:t>
             </a:fld>
             <a:endParaRPr lang="en-AU"/>
           </a:p>
@@ -1404,7 +1988,7 @@
           <a:p>
             <a:fld id="{AD1FA78F-BF5D-AF4E-806D-83B291B0B8BA}" type="datetimeFigureOut">
               <a:rPr lang="en-AU" smtClean="0"/>
-              <a:t>15/8/2024</a:t>
+              <a:t>12/9/2024</a:t>
             </a:fld>
             <a:endParaRPr lang="en-AU"/>
           </a:p>
@@ -1604,7 +2188,7 @@
           <a:p>
             <a:fld id="{AD1FA78F-BF5D-AF4E-806D-83B291B0B8BA}" type="datetimeFigureOut">
               <a:rPr lang="en-AU" smtClean="0"/>
-              <a:t>15/8/2024</a:t>
+              <a:t>12/9/2024</a:t>
             </a:fld>
             <a:endParaRPr lang="en-AU"/>
           </a:p>
@@ -1880,7 +2464,7 @@
           <a:p>
             <a:fld id="{AD1FA78F-BF5D-AF4E-806D-83B291B0B8BA}" type="datetimeFigureOut">
               <a:rPr lang="en-AU" smtClean="0"/>
-              <a:t>15/8/2024</a:t>
+              <a:t>12/9/2024</a:t>
             </a:fld>
             <a:endParaRPr lang="en-AU"/>
           </a:p>
@@ -2148,7 +2732,7 @@
           <a:p>
             <a:fld id="{AD1FA78F-BF5D-AF4E-806D-83B291B0B8BA}" type="datetimeFigureOut">
               <a:rPr lang="en-AU" smtClean="0"/>
-              <a:t>15/8/2024</a:t>
+              <a:t>12/9/2024</a:t>
             </a:fld>
             <a:endParaRPr lang="en-AU"/>
           </a:p>
@@ -2563,7 +3147,7 @@
           <a:p>
             <a:fld id="{AD1FA78F-BF5D-AF4E-806D-83B291B0B8BA}" type="datetimeFigureOut">
               <a:rPr lang="en-AU" smtClean="0"/>
-              <a:t>15/8/2024</a:t>
+              <a:t>12/9/2024</a:t>
             </a:fld>
             <a:endParaRPr lang="en-AU"/>
           </a:p>
@@ -2705,7 +3289,7 @@
           <a:p>
             <a:fld id="{AD1FA78F-BF5D-AF4E-806D-83B291B0B8BA}" type="datetimeFigureOut">
               <a:rPr lang="en-AU" smtClean="0"/>
-              <a:t>15/8/2024</a:t>
+              <a:t>12/9/2024</a:t>
             </a:fld>
             <a:endParaRPr lang="en-AU"/>
           </a:p>
@@ -2818,7 +3402,7 @@
           <a:p>
             <a:fld id="{AD1FA78F-BF5D-AF4E-806D-83B291B0B8BA}" type="datetimeFigureOut">
               <a:rPr lang="en-AU" smtClean="0"/>
-              <a:t>15/8/2024</a:t>
+              <a:t>12/9/2024</a:t>
             </a:fld>
             <a:endParaRPr lang="en-AU"/>
           </a:p>
@@ -3131,7 +3715,7 @@
           <a:p>
             <a:fld id="{AD1FA78F-BF5D-AF4E-806D-83B291B0B8BA}" type="datetimeFigureOut">
               <a:rPr lang="en-AU" smtClean="0"/>
-              <a:t>15/8/2024</a:t>
+              <a:t>12/9/2024</a:t>
             </a:fld>
             <a:endParaRPr lang="en-AU"/>
           </a:p>
@@ -3420,7 +4004,7 @@
           <a:p>
             <a:fld id="{AD1FA78F-BF5D-AF4E-806D-83B291B0B8BA}" type="datetimeFigureOut">
               <a:rPr lang="en-AU" smtClean="0"/>
-              <a:t>15/8/2024</a:t>
+              <a:t>12/9/2024</a:t>
             </a:fld>
             <a:endParaRPr lang="en-AU"/>
           </a:p>
@@ -3663,7 +4247,7 @@
           <a:p>
             <a:fld id="{AD1FA78F-BF5D-AF4E-806D-83B291B0B8BA}" type="datetimeFigureOut">
               <a:rPr lang="en-AU" smtClean="0"/>
-              <a:t>15/8/2024</a:t>
+              <a:t>12/9/2024</a:t>
             </a:fld>
             <a:endParaRPr lang="en-AU"/>
           </a:p>
@@ -11840,6 +12424,1593 @@
           </p:sp>
         </p:grpSp>
       </p:grpSp>
+      <p:sp>
+        <p:nvSpPr>
+          <p:cNvPr id="110" name="Rectangle 109">
+            <a:extLst>
+              <a:ext uri="{FF2B5EF4-FFF2-40B4-BE49-F238E27FC236}">
+                <a16:creationId xmlns:a16="http://schemas.microsoft.com/office/drawing/2014/main" id="{DF414DC1-8B28-C7C5-0747-117E3BF58795}"/>
+              </a:ext>
+            </a:extLst>
+          </p:cNvPr>
+          <p:cNvSpPr/>
+          <p:nvPr/>
+        </p:nvSpPr>
+        <p:spPr bwMode="auto">
+          <a:xfrm>
+            <a:off x="116394" y="5896244"/>
+            <a:ext cx="5686095" cy="285853"/>
+          </a:xfrm>
+          <a:prstGeom prst="rect">
+            <a:avLst/>
+          </a:prstGeom>
+          <a:solidFill>
+            <a:srgbClr val="FFFFFF"/>
+          </a:solidFill>
+          <a:ln w="19050" cap="flat" cmpd="sng" algn="ctr">
+            <a:solidFill>
+              <a:srgbClr val="323D43"/>
+            </a:solidFill>
+            <a:prstDash val="solid"/>
+            <a:round/>
+            <a:headEnd type="none" w="med" len="med"/>
+            <a:tailEnd type="none" w="med" len="med"/>
+          </a:ln>
+          <a:effectLst/>
+        </p:spPr>
+        <p:txBody>
+          <a:bodyPr vert="horz" wrap="none" lIns="0" tIns="45720" rIns="91440" bIns="45720" numCol="1" rtlCol="0" anchor="ctr" anchorCtr="0" compatLnSpc="1">
+            <a:prstTxWarp prst="textNoShape">
+              <a:avLst/>
+            </a:prstTxWarp>
+          </a:bodyPr>
+          <a:lstStyle/>
+          <a:p>
+            <a:pPr marL="342900" marR="0" lvl="0" indent="-342900" algn="ctr" defTabSz="914400" eaLnBrk="1" fontAlgn="base" latinLnBrk="0" hangingPunct="1">
+              <a:lnSpc>
+                <a:spcPct val="100000"/>
+              </a:lnSpc>
+              <a:spcBef>
+                <a:spcPct val="40000"/>
+              </a:spcBef>
+              <a:spcAft>
+                <a:spcPct val="20000"/>
+              </a:spcAft>
+              <a:buClr>
+                <a:srgbClr val="0D01FF"/>
+              </a:buClr>
+              <a:buSzTx/>
+              <a:buFont typeface="Wingdings" pitchFamily="2" charset="2"/>
+              <a:buChar char="§"/>
+              <a:tabLst/>
+              <a:defRPr/>
+            </a:pPr>
+            <a:endParaRPr kumimoji="0" lang="en-US" sz="1000" b="0" i="0" u="none" strike="noStrike" kern="0" cap="none" spc="0" normalizeH="0" baseline="0" noProof="0" dirty="0">
+              <a:ln>
+                <a:noFill/>
+              </a:ln>
+              <a:solidFill>
+                <a:srgbClr val="323D43"/>
+              </a:solidFill>
+              <a:effectLst/>
+              <a:uLnTx/>
+              <a:uFillTx/>
+              <a:latin typeface="Georgia" pitchFamily="18" charset="0"/>
+              <a:ea typeface="ＭＳ Ｐゴシック" pitchFamily="34" charset="-128"/>
+            </a:endParaRPr>
+          </a:p>
+        </p:txBody>
+      </p:sp>
+      <p:sp>
+        <p:nvSpPr>
+          <p:cNvPr id="138" name="Rectangle 137">
+            <a:extLst>
+              <a:ext uri="{FF2B5EF4-FFF2-40B4-BE49-F238E27FC236}">
+                <a16:creationId xmlns:a16="http://schemas.microsoft.com/office/drawing/2014/main" id="{E9316DFF-8F25-22B5-3918-BB20EC99979D}"/>
+              </a:ext>
+            </a:extLst>
+          </p:cNvPr>
+          <p:cNvSpPr>
+            <a:spLocks noChangeArrowheads="1"/>
+          </p:cNvSpPr>
+          <p:nvPr/>
+        </p:nvSpPr>
+        <p:spPr bwMode="auto">
+          <a:xfrm>
+            <a:off x="200955" y="5951371"/>
+            <a:ext cx="814325" cy="153888"/>
+          </a:xfrm>
+          <a:prstGeom prst="rect">
+            <a:avLst/>
+          </a:prstGeom>
+          <a:noFill/>
+          <a:ln w="12700" algn="ctr">
+            <a:noFill/>
+            <a:miter lim="800000"/>
+            <a:headEnd/>
+            <a:tailEnd/>
+          </a:ln>
+        </p:spPr>
+        <p:txBody>
+          <a:bodyPr wrap="none" lIns="0" tIns="0" rIns="0" bIns="0" anchor="ctr">
+            <a:spAutoFit/>
+          </a:bodyPr>
+          <a:lstStyle/>
+          <a:p>
+            <a:pPr marL="0" marR="0" lvl="0" indent="0" defTabSz="914400" eaLnBrk="1" fontAlgn="base" latinLnBrk="0" hangingPunct="1">
+              <a:lnSpc>
+                <a:spcPct val="100000"/>
+              </a:lnSpc>
+              <a:spcBef>
+                <a:spcPct val="0"/>
+              </a:spcBef>
+              <a:spcAft>
+                <a:spcPct val="0"/>
+              </a:spcAft>
+              <a:buClrTx/>
+              <a:buSzTx/>
+              <a:buFontTx/>
+              <a:buNone/>
+              <a:tabLst/>
+              <a:defRPr/>
+            </a:pPr>
+            <a:r>
+              <a:rPr kumimoji="0" lang="en-GB" sz="1000" i="0" u="none" strike="noStrike" kern="0" cap="none" spc="0" normalizeH="0" baseline="0" noProof="0" dirty="0">
+                <a:ln>
+                  <a:noFill/>
+                </a:ln>
+                <a:solidFill>
+                  <a:srgbClr val="000000"/>
+                </a:solidFill>
+                <a:effectLst/>
+                <a:uLnTx/>
+                <a:uFillTx/>
+                <a:latin typeface="Tahoma" pitchFamily="34" charset="0"/>
+                <a:ea typeface="ＭＳ Ｐゴシック" pitchFamily="34" charset="-128"/>
+              </a:rPr>
+              <a:t>Copy Number:</a:t>
+            </a:r>
+          </a:p>
+        </p:txBody>
+      </p:sp>
+      <p:grpSp>
+        <p:nvGrpSpPr>
+          <p:cNvPr id="198" name="Group 197">
+            <a:extLst>
+              <a:ext uri="{FF2B5EF4-FFF2-40B4-BE49-F238E27FC236}">
+                <a16:creationId xmlns:a16="http://schemas.microsoft.com/office/drawing/2014/main" id="{071584CF-BE45-3522-92A1-71CCAFE22DC1}"/>
+              </a:ext>
+            </a:extLst>
+          </p:cNvPr>
+          <p:cNvGrpSpPr/>
+          <p:nvPr/>
+        </p:nvGrpSpPr>
+        <p:grpSpPr>
+          <a:xfrm>
+            <a:off x="1127204" y="5951371"/>
+            <a:ext cx="422213" cy="153888"/>
+            <a:chOff x="1127204" y="5951371"/>
+            <a:chExt cx="422213" cy="153888"/>
+          </a:xfrm>
+        </p:grpSpPr>
+        <p:sp>
+          <p:nvSpPr>
+            <p:cNvPr id="121" name="Rectangle 120">
+              <a:extLst>
+                <a:ext uri="{FF2B5EF4-FFF2-40B4-BE49-F238E27FC236}">
+                  <a16:creationId xmlns:a16="http://schemas.microsoft.com/office/drawing/2014/main" id="{DA9F22BA-A222-2DFD-81ED-C69BB92A0C8F}"/>
+                </a:ext>
+              </a:extLst>
+            </p:cNvPr>
+            <p:cNvSpPr>
+              <a:spLocks noChangeArrowheads="1"/>
+            </p:cNvSpPr>
+            <p:nvPr/>
+          </p:nvSpPr>
+          <p:spPr bwMode="auto">
+            <a:xfrm>
+              <a:off x="1406749" y="5951371"/>
+              <a:ext cx="142668" cy="153888"/>
+            </a:xfrm>
+            <a:prstGeom prst="rect">
+              <a:avLst/>
+            </a:prstGeom>
+            <a:noFill/>
+            <a:ln w="12700" algn="ctr">
+              <a:noFill/>
+              <a:miter lim="800000"/>
+              <a:headEnd/>
+              <a:tailEnd/>
+            </a:ln>
+          </p:spPr>
+          <p:txBody>
+            <a:bodyPr wrap="none" lIns="0" tIns="0" rIns="0" bIns="0" anchor="ctr">
+              <a:spAutoFit/>
+            </a:bodyPr>
+            <a:lstStyle/>
+            <a:p>
+              <a:pPr marL="0" marR="0" lvl="0" indent="0" defTabSz="914400" eaLnBrk="1" fontAlgn="base" latinLnBrk="0" hangingPunct="1">
+                <a:lnSpc>
+                  <a:spcPct val="100000"/>
+                </a:lnSpc>
+                <a:spcBef>
+                  <a:spcPct val="0"/>
+                </a:spcBef>
+                <a:spcAft>
+                  <a:spcPct val="0"/>
+                </a:spcAft>
+                <a:buClrTx/>
+                <a:buSzTx/>
+                <a:buFontTx/>
+                <a:buNone/>
+                <a:tabLst/>
+                <a:defRPr/>
+              </a:pPr>
+              <a:r>
+                <a:rPr kumimoji="0" lang="en-GB" sz="1000" b="0" i="0" u="none" strike="noStrike" kern="0" cap="none" spc="0" normalizeH="0" baseline="0" noProof="0" dirty="0">
+                  <a:ln>
+                    <a:noFill/>
+                  </a:ln>
+                  <a:solidFill>
+                    <a:srgbClr val="000000"/>
+                  </a:solidFill>
+                  <a:effectLst/>
+                  <a:uLnTx/>
+                  <a:uFillTx/>
+                  <a:latin typeface="Tahoma" pitchFamily="34" charset="0"/>
+                  <a:ea typeface="ＭＳ Ｐゴシック" pitchFamily="34" charset="-128"/>
+                </a:rPr>
+                <a:t>0</a:t>
+              </a:r>
+              <a:r>
+                <a:rPr kumimoji="0" lang="en-GB" sz="1000" b="0" i="1" u="none" strike="noStrike" kern="0" cap="none" spc="0" normalizeH="0" baseline="0" noProof="0" dirty="0">
+                  <a:ln>
+                    <a:noFill/>
+                  </a:ln>
+                  <a:solidFill>
+                    <a:srgbClr val="000000"/>
+                  </a:solidFill>
+                  <a:effectLst/>
+                  <a:uLnTx/>
+                  <a:uFillTx/>
+                  <a:latin typeface="Tahoma" pitchFamily="34" charset="0"/>
+                  <a:ea typeface="ＭＳ Ｐゴシック" pitchFamily="34" charset="-128"/>
+                </a:rPr>
+                <a:t>n</a:t>
+              </a:r>
+            </a:p>
+          </p:txBody>
+        </p:sp>
+        <p:sp>
+          <p:nvSpPr>
+            <p:cNvPr id="133" name="Triangle 132">
+              <a:extLst>
+                <a:ext uri="{FF2B5EF4-FFF2-40B4-BE49-F238E27FC236}">
+                  <a16:creationId xmlns:a16="http://schemas.microsoft.com/office/drawing/2014/main" id="{57B327B5-B669-B776-16C0-304B2512B565}"/>
+                </a:ext>
+              </a:extLst>
+            </p:cNvPr>
+            <p:cNvSpPr/>
+            <p:nvPr/>
+          </p:nvSpPr>
+          <p:spPr bwMode="auto">
+            <a:xfrm rot="10800000" flipV="1">
+              <a:off x="1127204" y="5991958"/>
+              <a:ext cx="88724" cy="81478"/>
+            </a:xfrm>
+            <a:prstGeom prst="triangle">
+              <a:avLst/>
+            </a:prstGeom>
+            <a:solidFill>
+              <a:srgbClr val="999999"/>
+            </a:solidFill>
+            <a:ln w="12700" cap="flat" cmpd="sng" algn="ctr">
+              <a:solidFill>
+                <a:srgbClr val="323D43"/>
+              </a:solidFill>
+              <a:prstDash val="solid"/>
+              <a:round/>
+              <a:headEnd type="none" w="med" len="med"/>
+              <a:tailEnd type="none" w="med" len="med"/>
+            </a:ln>
+            <a:effectLst/>
+          </p:spPr>
+          <p:txBody>
+            <a:bodyPr vert="horz" wrap="none" lIns="0" tIns="45720" rIns="91440" bIns="45720" numCol="1" rtlCol="0" anchor="ctr" anchorCtr="0" compatLnSpc="1">
+              <a:prstTxWarp prst="textNoShape">
+                <a:avLst/>
+              </a:prstTxWarp>
+            </a:bodyPr>
+            <a:lstStyle/>
+            <a:p>
+              <a:pPr marL="342900" marR="0" lvl="0" indent="-342900" algn="ctr" defTabSz="914400" eaLnBrk="1" fontAlgn="base" latinLnBrk="0" hangingPunct="1">
+                <a:lnSpc>
+                  <a:spcPct val="100000"/>
+                </a:lnSpc>
+                <a:spcBef>
+                  <a:spcPct val="40000"/>
+                </a:spcBef>
+                <a:spcAft>
+                  <a:spcPct val="20000"/>
+                </a:spcAft>
+                <a:buClr>
+                  <a:srgbClr val="0D01FF"/>
+                </a:buClr>
+                <a:buSzTx/>
+                <a:buFont typeface="Wingdings" pitchFamily="2" charset="2"/>
+                <a:buChar char="§"/>
+                <a:tabLst/>
+                <a:defRPr/>
+              </a:pPr>
+              <a:endParaRPr kumimoji="0" lang="en-US" sz="1000" b="0" i="0" u="none" strike="noStrike" kern="0" cap="none" spc="0" normalizeH="0" baseline="0" noProof="0">
+                <a:ln>
+                  <a:noFill/>
+                </a:ln>
+                <a:solidFill>
+                  <a:srgbClr val="323D43"/>
+                </a:solidFill>
+                <a:effectLst/>
+                <a:uLnTx/>
+                <a:uFillTx/>
+                <a:latin typeface="Georgia" pitchFamily="18" charset="0"/>
+                <a:ea typeface="ＭＳ Ｐゴシック" pitchFamily="34" charset="-128"/>
+              </a:endParaRPr>
+            </a:p>
+          </p:txBody>
+        </p:sp>
+        <p:sp>
+          <p:nvSpPr>
+            <p:cNvPr id="120" name="Rectangle 119">
+              <a:extLst>
+                <a:ext uri="{FF2B5EF4-FFF2-40B4-BE49-F238E27FC236}">
+                  <a16:creationId xmlns:a16="http://schemas.microsoft.com/office/drawing/2014/main" id="{A47A1BE6-64FF-5B9C-FF1A-48C0499B1308}"/>
+                </a:ext>
+              </a:extLst>
+            </p:cNvPr>
+            <p:cNvSpPr/>
+            <p:nvPr/>
+          </p:nvSpPr>
+          <p:spPr>
+            <a:xfrm>
+              <a:off x="1263712" y="5988962"/>
+              <a:ext cx="80253" cy="85491"/>
+            </a:xfrm>
+            <a:prstGeom prst="rect">
+              <a:avLst/>
+            </a:prstGeom>
+            <a:solidFill>
+              <a:srgbClr val="999999"/>
+            </a:solidFill>
+            <a:ln w="12700">
+              <a:solidFill>
+                <a:schemeClr val="tx1"/>
+              </a:solidFill>
+            </a:ln>
+          </p:spPr>
+          <p:style>
+            <a:lnRef idx="2">
+              <a:schemeClr val="accent1">
+                <a:shade val="15000"/>
+              </a:schemeClr>
+            </a:lnRef>
+            <a:fillRef idx="1">
+              <a:schemeClr val="accent1"/>
+            </a:fillRef>
+            <a:effectRef idx="0">
+              <a:schemeClr val="accent1"/>
+            </a:effectRef>
+            <a:fontRef idx="minor">
+              <a:schemeClr val="lt1"/>
+            </a:fontRef>
+          </p:style>
+          <p:txBody>
+            <a:bodyPr rtlCol="0" anchor="ctr"/>
+            <a:lstStyle/>
+            <a:p>
+              <a:pPr algn="ctr"/>
+              <a:endParaRPr lang="en-AU" sz="1000"/>
+            </a:p>
+          </p:txBody>
+        </p:sp>
+      </p:grpSp>
+      <p:grpSp>
+        <p:nvGrpSpPr>
+          <p:cNvPr id="199" name="Group 198">
+            <a:extLst>
+              <a:ext uri="{FF2B5EF4-FFF2-40B4-BE49-F238E27FC236}">
+                <a16:creationId xmlns:a16="http://schemas.microsoft.com/office/drawing/2014/main" id="{D5FAD84E-15F3-D2FF-11DE-93052BB5F8FE}"/>
+              </a:ext>
+            </a:extLst>
+          </p:cNvPr>
+          <p:cNvGrpSpPr/>
+          <p:nvPr/>
+        </p:nvGrpSpPr>
+        <p:grpSpPr>
+          <a:xfrm>
+            <a:off x="1864871" y="5951371"/>
+            <a:ext cx="515187" cy="153888"/>
+            <a:chOff x="1864871" y="5951371"/>
+            <a:chExt cx="515187" cy="153888"/>
+          </a:xfrm>
+        </p:grpSpPr>
+        <p:sp>
+          <p:nvSpPr>
+            <p:cNvPr id="163" name="Rectangle 162">
+              <a:extLst>
+                <a:ext uri="{FF2B5EF4-FFF2-40B4-BE49-F238E27FC236}">
+                  <a16:creationId xmlns:a16="http://schemas.microsoft.com/office/drawing/2014/main" id="{0783BC3F-7607-92AD-6133-A67D30A00254}"/>
+                </a:ext>
+              </a:extLst>
+            </p:cNvPr>
+            <p:cNvSpPr>
+              <a:spLocks noChangeArrowheads="1"/>
+            </p:cNvSpPr>
+            <p:nvPr/>
+          </p:nvSpPr>
+          <p:spPr bwMode="auto">
+            <a:xfrm>
+              <a:off x="2144416" y="5951371"/>
+              <a:ext cx="235642" cy="153888"/>
+            </a:xfrm>
+            <a:prstGeom prst="rect">
+              <a:avLst/>
+            </a:prstGeom>
+            <a:noFill/>
+            <a:ln w="12700" algn="ctr">
+              <a:noFill/>
+              <a:miter lim="800000"/>
+              <a:headEnd/>
+              <a:tailEnd/>
+            </a:ln>
+          </p:spPr>
+          <p:txBody>
+            <a:bodyPr wrap="none" lIns="0" tIns="0" rIns="0" bIns="0" anchor="ctr">
+              <a:spAutoFit/>
+            </a:bodyPr>
+            <a:lstStyle/>
+            <a:p>
+              <a:pPr marL="0" marR="0" lvl="0" indent="0" defTabSz="914400" eaLnBrk="1" fontAlgn="base" latinLnBrk="0" hangingPunct="1">
+                <a:lnSpc>
+                  <a:spcPct val="100000"/>
+                </a:lnSpc>
+                <a:spcBef>
+                  <a:spcPct val="0"/>
+                </a:spcBef>
+                <a:spcAft>
+                  <a:spcPct val="0"/>
+                </a:spcAft>
+                <a:buClrTx/>
+                <a:buSzTx/>
+                <a:buFontTx/>
+                <a:buNone/>
+                <a:tabLst/>
+                <a:defRPr/>
+              </a:pPr>
+              <a:r>
+                <a:rPr kumimoji="0" lang="en-GB" sz="1000" b="0" i="0" u="none" strike="noStrike" kern="0" cap="none" spc="0" normalizeH="0" baseline="0" noProof="0" dirty="0">
+                  <a:ln>
+                    <a:noFill/>
+                  </a:ln>
+                  <a:solidFill>
+                    <a:srgbClr val="000000"/>
+                  </a:solidFill>
+                  <a:effectLst/>
+                  <a:uLnTx/>
+                  <a:uFillTx/>
+                  <a:latin typeface="Tahoma" pitchFamily="34" charset="0"/>
+                  <a:ea typeface="ＭＳ Ｐゴシック" pitchFamily="34" charset="-128"/>
+                </a:rPr>
+                <a:t>&lt;1</a:t>
+              </a:r>
+              <a:r>
+                <a:rPr kumimoji="0" lang="en-GB" sz="1000" b="0" i="1" u="none" strike="noStrike" kern="0" cap="none" spc="0" normalizeH="0" baseline="0" noProof="0" dirty="0">
+                  <a:ln>
+                    <a:noFill/>
+                  </a:ln>
+                  <a:solidFill>
+                    <a:srgbClr val="000000"/>
+                  </a:solidFill>
+                  <a:effectLst/>
+                  <a:uLnTx/>
+                  <a:uFillTx/>
+                  <a:latin typeface="Tahoma" pitchFamily="34" charset="0"/>
+                  <a:ea typeface="ＭＳ Ｐゴシック" pitchFamily="34" charset="-128"/>
+                </a:rPr>
+                <a:t>n</a:t>
+              </a:r>
+            </a:p>
+          </p:txBody>
+        </p:sp>
+        <p:sp>
+          <p:nvSpPr>
+            <p:cNvPr id="164" name="Triangle 163">
+              <a:extLst>
+                <a:ext uri="{FF2B5EF4-FFF2-40B4-BE49-F238E27FC236}">
+                  <a16:creationId xmlns:a16="http://schemas.microsoft.com/office/drawing/2014/main" id="{23CD59D5-F658-E35F-AC14-40C88ED30C34}"/>
+                </a:ext>
+              </a:extLst>
+            </p:cNvPr>
+            <p:cNvSpPr/>
+            <p:nvPr/>
+          </p:nvSpPr>
+          <p:spPr bwMode="auto">
+            <a:xfrm rot="10800000" flipV="1">
+              <a:off x="1864871" y="5991958"/>
+              <a:ext cx="88724" cy="81478"/>
+            </a:xfrm>
+            <a:prstGeom prst="triangle">
+              <a:avLst/>
+            </a:prstGeom>
+            <a:solidFill>
+              <a:srgbClr val="F1E441"/>
+            </a:solidFill>
+            <a:ln w="12700" cap="flat" cmpd="sng" algn="ctr">
+              <a:solidFill>
+                <a:srgbClr val="323D43"/>
+              </a:solidFill>
+              <a:prstDash val="solid"/>
+              <a:round/>
+              <a:headEnd type="none" w="med" len="med"/>
+              <a:tailEnd type="none" w="med" len="med"/>
+            </a:ln>
+            <a:effectLst/>
+          </p:spPr>
+          <p:txBody>
+            <a:bodyPr vert="horz" wrap="none" lIns="0" tIns="45720" rIns="91440" bIns="45720" numCol="1" rtlCol="0" anchor="ctr" anchorCtr="0" compatLnSpc="1">
+              <a:prstTxWarp prst="textNoShape">
+                <a:avLst/>
+              </a:prstTxWarp>
+            </a:bodyPr>
+            <a:lstStyle/>
+            <a:p>
+              <a:pPr marL="342900" marR="0" lvl="0" indent="-342900" algn="ctr" defTabSz="914400" eaLnBrk="1" fontAlgn="base" latinLnBrk="0" hangingPunct="1">
+                <a:lnSpc>
+                  <a:spcPct val="100000"/>
+                </a:lnSpc>
+                <a:spcBef>
+                  <a:spcPct val="40000"/>
+                </a:spcBef>
+                <a:spcAft>
+                  <a:spcPct val="20000"/>
+                </a:spcAft>
+                <a:buClr>
+                  <a:srgbClr val="0D01FF"/>
+                </a:buClr>
+                <a:buSzTx/>
+                <a:buFont typeface="Wingdings" pitchFamily="2" charset="2"/>
+                <a:buChar char="§"/>
+                <a:tabLst/>
+                <a:defRPr/>
+              </a:pPr>
+              <a:endParaRPr kumimoji="0" lang="en-US" sz="1000" b="0" i="0" u="none" strike="noStrike" kern="0" cap="none" spc="0" normalizeH="0" baseline="0" noProof="0">
+                <a:ln>
+                  <a:noFill/>
+                </a:ln>
+                <a:solidFill>
+                  <a:srgbClr val="323D43"/>
+                </a:solidFill>
+                <a:effectLst/>
+                <a:uLnTx/>
+                <a:uFillTx/>
+                <a:latin typeface="Georgia" pitchFamily="18" charset="0"/>
+                <a:ea typeface="ＭＳ Ｐゴシック" pitchFamily="34" charset="-128"/>
+              </a:endParaRPr>
+            </a:p>
+          </p:txBody>
+        </p:sp>
+        <p:sp>
+          <p:nvSpPr>
+            <p:cNvPr id="165" name="Rectangle 164">
+              <a:extLst>
+                <a:ext uri="{FF2B5EF4-FFF2-40B4-BE49-F238E27FC236}">
+                  <a16:creationId xmlns:a16="http://schemas.microsoft.com/office/drawing/2014/main" id="{D977FF98-3DED-C1B6-C3EF-4EE68048D282}"/>
+                </a:ext>
+              </a:extLst>
+            </p:cNvPr>
+            <p:cNvSpPr/>
+            <p:nvPr/>
+          </p:nvSpPr>
+          <p:spPr>
+            <a:xfrm>
+              <a:off x="2001379" y="5988962"/>
+              <a:ext cx="80253" cy="85491"/>
+            </a:xfrm>
+            <a:prstGeom prst="rect">
+              <a:avLst/>
+            </a:prstGeom>
+            <a:solidFill>
+              <a:srgbClr val="F1E441"/>
+            </a:solidFill>
+            <a:ln w="12700">
+              <a:solidFill>
+                <a:schemeClr val="tx1"/>
+              </a:solidFill>
+            </a:ln>
+          </p:spPr>
+          <p:style>
+            <a:lnRef idx="2">
+              <a:schemeClr val="accent1">
+                <a:shade val="15000"/>
+              </a:schemeClr>
+            </a:lnRef>
+            <a:fillRef idx="1">
+              <a:schemeClr val="accent1"/>
+            </a:fillRef>
+            <a:effectRef idx="0">
+              <a:schemeClr val="accent1"/>
+            </a:effectRef>
+            <a:fontRef idx="minor">
+              <a:schemeClr val="lt1"/>
+            </a:fontRef>
+          </p:style>
+          <p:txBody>
+            <a:bodyPr rtlCol="0" anchor="ctr"/>
+            <a:lstStyle/>
+            <a:p>
+              <a:pPr algn="ctr"/>
+              <a:endParaRPr lang="en-AU" sz="1000"/>
+            </a:p>
+          </p:txBody>
+        </p:sp>
+      </p:grpSp>
+      <p:grpSp>
+        <p:nvGrpSpPr>
+          <p:cNvPr id="200" name="Group 199">
+            <a:extLst>
+              <a:ext uri="{FF2B5EF4-FFF2-40B4-BE49-F238E27FC236}">
+                <a16:creationId xmlns:a16="http://schemas.microsoft.com/office/drawing/2014/main" id="{A65BD506-DD03-C974-A7C8-0D78176CC35E}"/>
+              </a:ext>
+            </a:extLst>
+          </p:cNvPr>
+          <p:cNvGrpSpPr/>
+          <p:nvPr/>
+        </p:nvGrpSpPr>
+        <p:grpSpPr>
+          <a:xfrm>
+            <a:off x="2694747" y="5951371"/>
+            <a:ext cx="422213" cy="153888"/>
+            <a:chOff x="2694747" y="5951371"/>
+            <a:chExt cx="422213" cy="153888"/>
+          </a:xfrm>
+        </p:grpSpPr>
+        <p:sp>
+          <p:nvSpPr>
+            <p:cNvPr id="166" name="Rectangle 165">
+              <a:extLst>
+                <a:ext uri="{FF2B5EF4-FFF2-40B4-BE49-F238E27FC236}">
+                  <a16:creationId xmlns:a16="http://schemas.microsoft.com/office/drawing/2014/main" id="{4DF970F3-49D9-1308-3197-99252941CF83}"/>
+                </a:ext>
+              </a:extLst>
+            </p:cNvPr>
+            <p:cNvSpPr>
+              <a:spLocks noChangeArrowheads="1"/>
+            </p:cNvSpPr>
+            <p:nvPr/>
+          </p:nvSpPr>
+          <p:spPr bwMode="auto">
+            <a:xfrm>
+              <a:off x="2974292" y="5951371"/>
+              <a:ext cx="142668" cy="153888"/>
+            </a:xfrm>
+            <a:prstGeom prst="rect">
+              <a:avLst/>
+            </a:prstGeom>
+            <a:noFill/>
+            <a:ln w="12700" algn="ctr">
+              <a:noFill/>
+              <a:miter lim="800000"/>
+              <a:headEnd/>
+              <a:tailEnd/>
+            </a:ln>
+          </p:spPr>
+          <p:txBody>
+            <a:bodyPr wrap="none" lIns="0" tIns="0" rIns="0" bIns="0" anchor="ctr">
+              <a:spAutoFit/>
+            </a:bodyPr>
+            <a:lstStyle/>
+            <a:p>
+              <a:pPr marL="0" marR="0" lvl="0" indent="0" defTabSz="914400" eaLnBrk="1" fontAlgn="base" latinLnBrk="0" hangingPunct="1">
+                <a:lnSpc>
+                  <a:spcPct val="100000"/>
+                </a:lnSpc>
+                <a:spcBef>
+                  <a:spcPct val="0"/>
+                </a:spcBef>
+                <a:spcAft>
+                  <a:spcPct val="0"/>
+                </a:spcAft>
+                <a:buClrTx/>
+                <a:buSzTx/>
+                <a:buFontTx/>
+                <a:buNone/>
+                <a:tabLst/>
+                <a:defRPr/>
+              </a:pPr>
+              <a:r>
+                <a:rPr kumimoji="0" lang="en-GB" sz="1000" b="0" i="0" u="none" strike="noStrike" kern="0" cap="none" spc="0" normalizeH="0" baseline="0" noProof="0" dirty="0">
+                  <a:ln>
+                    <a:noFill/>
+                  </a:ln>
+                  <a:solidFill>
+                    <a:srgbClr val="000000"/>
+                  </a:solidFill>
+                  <a:effectLst/>
+                  <a:uLnTx/>
+                  <a:uFillTx/>
+                  <a:latin typeface="Tahoma" pitchFamily="34" charset="0"/>
+                  <a:ea typeface="ＭＳ Ｐゴシック" pitchFamily="34" charset="-128"/>
+                </a:rPr>
+                <a:t>1</a:t>
+              </a:r>
+              <a:r>
+                <a:rPr kumimoji="0" lang="en-GB" sz="1000" b="0" i="1" u="none" strike="noStrike" kern="0" cap="none" spc="0" normalizeH="0" baseline="0" noProof="0" dirty="0">
+                  <a:ln>
+                    <a:noFill/>
+                  </a:ln>
+                  <a:solidFill>
+                    <a:srgbClr val="000000"/>
+                  </a:solidFill>
+                  <a:effectLst/>
+                  <a:uLnTx/>
+                  <a:uFillTx/>
+                  <a:latin typeface="Tahoma" pitchFamily="34" charset="0"/>
+                  <a:ea typeface="ＭＳ Ｐゴシック" pitchFamily="34" charset="-128"/>
+                </a:rPr>
+                <a:t>n</a:t>
+              </a:r>
+            </a:p>
+          </p:txBody>
+        </p:sp>
+        <p:sp>
+          <p:nvSpPr>
+            <p:cNvPr id="167" name="Triangle 166">
+              <a:extLst>
+                <a:ext uri="{FF2B5EF4-FFF2-40B4-BE49-F238E27FC236}">
+                  <a16:creationId xmlns:a16="http://schemas.microsoft.com/office/drawing/2014/main" id="{634A423E-EEE0-7075-2A0C-5AA82CBA8DEC}"/>
+                </a:ext>
+              </a:extLst>
+            </p:cNvPr>
+            <p:cNvSpPr/>
+            <p:nvPr/>
+          </p:nvSpPr>
+          <p:spPr bwMode="auto">
+            <a:xfrm rot="10800000" flipV="1">
+              <a:off x="2694747" y="5991958"/>
+              <a:ext cx="88724" cy="81478"/>
+            </a:xfrm>
+            <a:prstGeom prst="triangle">
+              <a:avLst/>
+            </a:prstGeom>
+            <a:solidFill>
+              <a:srgbClr val="57B4E9"/>
+            </a:solidFill>
+            <a:ln w="12700" cap="flat" cmpd="sng" algn="ctr">
+              <a:solidFill>
+                <a:srgbClr val="323D43"/>
+              </a:solidFill>
+              <a:prstDash val="solid"/>
+              <a:round/>
+              <a:headEnd type="none" w="med" len="med"/>
+              <a:tailEnd type="none" w="med" len="med"/>
+            </a:ln>
+            <a:effectLst/>
+          </p:spPr>
+          <p:txBody>
+            <a:bodyPr vert="horz" wrap="none" lIns="0" tIns="45720" rIns="91440" bIns="45720" numCol="1" rtlCol="0" anchor="ctr" anchorCtr="0" compatLnSpc="1">
+              <a:prstTxWarp prst="textNoShape">
+                <a:avLst/>
+              </a:prstTxWarp>
+            </a:bodyPr>
+            <a:lstStyle/>
+            <a:p>
+              <a:pPr marL="342900" marR="0" lvl="0" indent="-342900" algn="ctr" defTabSz="914400" eaLnBrk="1" fontAlgn="base" latinLnBrk="0" hangingPunct="1">
+                <a:lnSpc>
+                  <a:spcPct val="100000"/>
+                </a:lnSpc>
+                <a:spcBef>
+                  <a:spcPct val="40000"/>
+                </a:spcBef>
+                <a:spcAft>
+                  <a:spcPct val="20000"/>
+                </a:spcAft>
+                <a:buClr>
+                  <a:srgbClr val="0D01FF"/>
+                </a:buClr>
+                <a:buSzTx/>
+                <a:buFont typeface="Wingdings" pitchFamily="2" charset="2"/>
+                <a:buChar char="§"/>
+                <a:tabLst/>
+                <a:defRPr/>
+              </a:pPr>
+              <a:endParaRPr kumimoji="0" lang="en-US" sz="1000" b="0" i="0" u="none" strike="noStrike" kern="0" cap="none" spc="0" normalizeH="0" baseline="0" noProof="0">
+                <a:ln>
+                  <a:noFill/>
+                </a:ln>
+                <a:solidFill>
+                  <a:srgbClr val="323D43"/>
+                </a:solidFill>
+                <a:effectLst/>
+                <a:uLnTx/>
+                <a:uFillTx/>
+                <a:latin typeface="Georgia" pitchFamily="18" charset="0"/>
+                <a:ea typeface="ＭＳ Ｐゴシック" pitchFamily="34" charset="-128"/>
+              </a:endParaRPr>
+            </a:p>
+          </p:txBody>
+        </p:sp>
+        <p:sp>
+          <p:nvSpPr>
+            <p:cNvPr id="168" name="Rectangle 167">
+              <a:extLst>
+                <a:ext uri="{FF2B5EF4-FFF2-40B4-BE49-F238E27FC236}">
+                  <a16:creationId xmlns:a16="http://schemas.microsoft.com/office/drawing/2014/main" id="{7ADF4DE7-9D37-285B-A557-D0AE98A8A9F9}"/>
+                </a:ext>
+              </a:extLst>
+            </p:cNvPr>
+            <p:cNvSpPr/>
+            <p:nvPr/>
+          </p:nvSpPr>
+          <p:spPr>
+            <a:xfrm>
+              <a:off x="2831255" y="5988962"/>
+              <a:ext cx="80253" cy="85491"/>
+            </a:xfrm>
+            <a:prstGeom prst="rect">
+              <a:avLst/>
+            </a:prstGeom>
+            <a:solidFill>
+              <a:srgbClr val="57B4E9"/>
+            </a:solidFill>
+            <a:ln w="12700">
+              <a:solidFill>
+                <a:schemeClr val="tx1"/>
+              </a:solidFill>
+            </a:ln>
+          </p:spPr>
+          <p:style>
+            <a:lnRef idx="2">
+              <a:schemeClr val="accent1">
+                <a:shade val="15000"/>
+              </a:schemeClr>
+            </a:lnRef>
+            <a:fillRef idx="1">
+              <a:schemeClr val="accent1"/>
+            </a:fillRef>
+            <a:effectRef idx="0">
+              <a:schemeClr val="accent1"/>
+            </a:effectRef>
+            <a:fontRef idx="minor">
+              <a:schemeClr val="lt1"/>
+            </a:fontRef>
+          </p:style>
+          <p:txBody>
+            <a:bodyPr rtlCol="0" anchor="ctr"/>
+            <a:lstStyle/>
+            <a:p>
+              <a:pPr algn="ctr"/>
+              <a:endParaRPr lang="en-AU" sz="1000"/>
+            </a:p>
+          </p:txBody>
+        </p:sp>
+      </p:grpSp>
+      <p:grpSp>
+        <p:nvGrpSpPr>
+          <p:cNvPr id="201" name="Group 200">
+            <a:extLst>
+              <a:ext uri="{FF2B5EF4-FFF2-40B4-BE49-F238E27FC236}">
+                <a16:creationId xmlns:a16="http://schemas.microsoft.com/office/drawing/2014/main" id="{4974F89C-7346-8438-1518-7964B4343EBC}"/>
+              </a:ext>
+            </a:extLst>
+          </p:cNvPr>
+          <p:cNvGrpSpPr/>
+          <p:nvPr/>
+        </p:nvGrpSpPr>
+        <p:grpSpPr>
+          <a:xfrm>
+            <a:off x="3520781" y="5951371"/>
+            <a:ext cx="422213" cy="153888"/>
+            <a:chOff x="3520781" y="5951371"/>
+            <a:chExt cx="422213" cy="153888"/>
+          </a:xfrm>
+        </p:grpSpPr>
+        <p:sp>
+          <p:nvSpPr>
+            <p:cNvPr id="169" name="Rectangle 168">
+              <a:extLst>
+                <a:ext uri="{FF2B5EF4-FFF2-40B4-BE49-F238E27FC236}">
+                  <a16:creationId xmlns:a16="http://schemas.microsoft.com/office/drawing/2014/main" id="{68B899A6-321D-FDEC-7A41-F386AD4AFAF3}"/>
+                </a:ext>
+              </a:extLst>
+            </p:cNvPr>
+            <p:cNvSpPr>
+              <a:spLocks noChangeArrowheads="1"/>
+            </p:cNvSpPr>
+            <p:nvPr/>
+          </p:nvSpPr>
+          <p:spPr bwMode="auto">
+            <a:xfrm>
+              <a:off x="3800326" y="5951371"/>
+              <a:ext cx="142668" cy="153888"/>
+            </a:xfrm>
+            <a:prstGeom prst="rect">
+              <a:avLst/>
+            </a:prstGeom>
+            <a:noFill/>
+            <a:ln w="12700" algn="ctr">
+              <a:noFill/>
+              <a:miter lim="800000"/>
+              <a:headEnd/>
+              <a:tailEnd/>
+            </a:ln>
+          </p:spPr>
+          <p:txBody>
+            <a:bodyPr wrap="none" lIns="0" tIns="0" rIns="0" bIns="0" anchor="ctr">
+              <a:spAutoFit/>
+            </a:bodyPr>
+            <a:lstStyle/>
+            <a:p>
+              <a:pPr marL="0" marR="0" lvl="0" indent="0" defTabSz="914400" eaLnBrk="1" fontAlgn="base" latinLnBrk="0" hangingPunct="1">
+                <a:lnSpc>
+                  <a:spcPct val="100000"/>
+                </a:lnSpc>
+                <a:spcBef>
+                  <a:spcPct val="0"/>
+                </a:spcBef>
+                <a:spcAft>
+                  <a:spcPct val="0"/>
+                </a:spcAft>
+                <a:buClrTx/>
+                <a:buSzTx/>
+                <a:buFontTx/>
+                <a:buNone/>
+                <a:tabLst/>
+                <a:defRPr/>
+              </a:pPr>
+              <a:r>
+                <a:rPr lang="en-GB" sz="1000" kern="0" dirty="0">
+                  <a:solidFill>
+                    <a:srgbClr val="000000"/>
+                  </a:solidFill>
+                  <a:latin typeface="Tahoma" pitchFamily="34" charset="0"/>
+                  <a:ea typeface="ＭＳ Ｐゴシック" pitchFamily="34" charset="-128"/>
+                </a:rPr>
+                <a:t>2</a:t>
+              </a:r>
+              <a:r>
+                <a:rPr kumimoji="0" lang="en-GB" sz="1000" b="0" i="1" u="none" strike="noStrike" kern="0" cap="none" spc="0" normalizeH="0" baseline="0" noProof="0" dirty="0">
+                  <a:ln>
+                    <a:noFill/>
+                  </a:ln>
+                  <a:solidFill>
+                    <a:srgbClr val="000000"/>
+                  </a:solidFill>
+                  <a:effectLst/>
+                  <a:uLnTx/>
+                  <a:uFillTx/>
+                  <a:latin typeface="Tahoma" pitchFamily="34" charset="0"/>
+                  <a:ea typeface="ＭＳ Ｐゴシック" pitchFamily="34" charset="-128"/>
+                </a:rPr>
+                <a:t>n</a:t>
+              </a:r>
+            </a:p>
+          </p:txBody>
+        </p:sp>
+        <p:sp>
+          <p:nvSpPr>
+            <p:cNvPr id="170" name="Triangle 169">
+              <a:extLst>
+                <a:ext uri="{FF2B5EF4-FFF2-40B4-BE49-F238E27FC236}">
+                  <a16:creationId xmlns:a16="http://schemas.microsoft.com/office/drawing/2014/main" id="{B9F960FD-DCA2-B08F-4F85-5DE47976AAC1}"/>
+                </a:ext>
+              </a:extLst>
+            </p:cNvPr>
+            <p:cNvSpPr/>
+            <p:nvPr/>
+          </p:nvSpPr>
+          <p:spPr bwMode="auto">
+            <a:xfrm rot="10800000" flipV="1">
+              <a:off x="3520781" y="5991958"/>
+              <a:ext cx="88724" cy="81478"/>
+            </a:xfrm>
+            <a:prstGeom prst="triangle">
+              <a:avLst/>
+            </a:prstGeom>
+            <a:solidFill>
+              <a:srgbClr val="0072B2"/>
+            </a:solidFill>
+            <a:ln w="12700" cap="flat" cmpd="sng" algn="ctr">
+              <a:solidFill>
+                <a:srgbClr val="323D43"/>
+              </a:solidFill>
+              <a:prstDash val="solid"/>
+              <a:round/>
+              <a:headEnd type="none" w="med" len="med"/>
+              <a:tailEnd type="none" w="med" len="med"/>
+            </a:ln>
+            <a:effectLst/>
+          </p:spPr>
+          <p:txBody>
+            <a:bodyPr vert="horz" wrap="none" lIns="0" tIns="45720" rIns="91440" bIns="45720" numCol="1" rtlCol="0" anchor="ctr" anchorCtr="0" compatLnSpc="1">
+              <a:prstTxWarp prst="textNoShape">
+                <a:avLst/>
+              </a:prstTxWarp>
+            </a:bodyPr>
+            <a:lstStyle/>
+            <a:p>
+              <a:pPr marL="342900" marR="0" lvl="0" indent="-342900" algn="ctr" defTabSz="914400" eaLnBrk="1" fontAlgn="base" latinLnBrk="0" hangingPunct="1">
+                <a:lnSpc>
+                  <a:spcPct val="100000"/>
+                </a:lnSpc>
+                <a:spcBef>
+                  <a:spcPct val="40000"/>
+                </a:spcBef>
+                <a:spcAft>
+                  <a:spcPct val="20000"/>
+                </a:spcAft>
+                <a:buClr>
+                  <a:srgbClr val="0D01FF"/>
+                </a:buClr>
+                <a:buSzTx/>
+                <a:buFont typeface="Wingdings" pitchFamily="2" charset="2"/>
+                <a:buChar char="§"/>
+                <a:tabLst/>
+                <a:defRPr/>
+              </a:pPr>
+              <a:endParaRPr kumimoji="0" lang="en-US" sz="1000" b="0" i="0" u="none" strike="noStrike" kern="0" cap="none" spc="0" normalizeH="0" baseline="0" noProof="0">
+                <a:ln>
+                  <a:noFill/>
+                </a:ln>
+                <a:solidFill>
+                  <a:srgbClr val="323D43"/>
+                </a:solidFill>
+                <a:effectLst/>
+                <a:uLnTx/>
+                <a:uFillTx/>
+                <a:latin typeface="Georgia" pitchFamily="18" charset="0"/>
+                <a:ea typeface="ＭＳ Ｐゴシック" pitchFamily="34" charset="-128"/>
+              </a:endParaRPr>
+            </a:p>
+          </p:txBody>
+        </p:sp>
+        <p:sp>
+          <p:nvSpPr>
+            <p:cNvPr id="171" name="Rectangle 170">
+              <a:extLst>
+                <a:ext uri="{FF2B5EF4-FFF2-40B4-BE49-F238E27FC236}">
+                  <a16:creationId xmlns:a16="http://schemas.microsoft.com/office/drawing/2014/main" id="{ED39BCB1-618A-8545-68E0-1232AFBF654D}"/>
+                </a:ext>
+              </a:extLst>
+            </p:cNvPr>
+            <p:cNvSpPr/>
+            <p:nvPr/>
+          </p:nvSpPr>
+          <p:spPr>
+            <a:xfrm>
+              <a:off x="3657289" y="5988962"/>
+              <a:ext cx="80253" cy="85491"/>
+            </a:xfrm>
+            <a:prstGeom prst="rect">
+              <a:avLst/>
+            </a:prstGeom>
+            <a:solidFill>
+              <a:srgbClr val="0072B2"/>
+            </a:solidFill>
+            <a:ln w="12700">
+              <a:solidFill>
+                <a:schemeClr val="tx1"/>
+              </a:solidFill>
+            </a:ln>
+          </p:spPr>
+          <p:style>
+            <a:lnRef idx="2">
+              <a:schemeClr val="accent1">
+                <a:shade val="15000"/>
+              </a:schemeClr>
+            </a:lnRef>
+            <a:fillRef idx="1">
+              <a:schemeClr val="accent1"/>
+            </a:fillRef>
+            <a:effectRef idx="0">
+              <a:schemeClr val="accent1"/>
+            </a:effectRef>
+            <a:fontRef idx="minor">
+              <a:schemeClr val="lt1"/>
+            </a:fontRef>
+          </p:style>
+          <p:txBody>
+            <a:bodyPr rtlCol="0" anchor="ctr"/>
+            <a:lstStyle/>
+            <a:p>
+              <a:pPr algn="ctr"/>
+              <a:endParaRPr lang="en-AU" sz="1000"/>
+            </a:p>
+          </p:txBody>
+        </p:sp>
+      </p:grpSp>
+      <p:grpSp>
+        <p:nvGrpSpPr>
+          <p:cNvPr id="202" name="Group 201">
+            <a:extLst>
+              <a:ext uri="{FF2B5EF4-FFF2-40B4-BE49-F238E27FC236}">
+                <a16:creationId xmlns:a16="http://schemas.microsoft.com/office/drawing/2014/main" id="{712D0CF4-8537-3FBB-CC2E-B6E31FD7194E}"/>
+              </a:ext>
+            </a:extLst>
+          </p:cNvPr>
+          <p:cNvGrpSpPr/>
+          <p:nvPr/>
+        </p:nvGrpSpPr>
+        <p:grpSpPr>
+          <a:xfrm>
+            <a:off x="4346815" y="5951371"/>
+            <a:ext cx="422213" cy="153888"/>
+            <a:chOff x="4346815" y="5951371"/>
+            <a:chExt cx="422213" cy="153888"/>
+          </a:xfrm>
+        </p:grpSpPr>
+        <p:sp>
+          <p:nvSpPr>
+            <p:cNvPr id="172" name="Rectangle 171">
+              <a:extLst>
+                <a:ext uri="{FF2B5EF4-FFF2-40B4-BE49-F238E27FC236}">
+                  <a16:creationId xmlns:a16="http://schemas.microsoft.com/office/drawing/2014/main" id="{C8CC2D4E-E01D-8DF4-4548-B8B96D481F32}"/>
+                </a:ext>
+              </a:extLst>
+            </p:cNvPr>
+            <p:cNvSpPr>
+              <a:spLocks noChangeArrowheads="1"/>
+            </p:cNvSpPr>
+            <p:nvPr/>
+          </p:nvSpPr>
+          <p:spPr bwMode="auto">
+            <a:xfrm>
+              <a:off x="4626360" y="5951371"/>
+              <a:ext cx="142668" cy="153888"/>
+            </a:xfrm>
+            <a:prstGeom prst="rect">
+              <a:avLst/>
+            </a:prstGeom>
+            <a:noFill/>
+            <a:ln w="12700" algn="ctr">
+              <a:noFill/>
+              <a:miter lim="800000"/>
+              <a:headEnd/>
+              <a:tailEnd/>
+            </a:ln>
+          </p:spPr>
+          <p:txBody>
+            <a:bodyPr wrap="none" lIns="0" tIns="0" rIns="0" bIns="0" anchor="ctr">
+              <a:spAutoFit/>
+            </a:bodyPr>
+            <a:lstStyle/>
+            <a:p>
+              <a:pPr marL="0" marR="0" lvl="0" indent="0" defTabSz="914400" eaLnBrk="1" fontAlgn="base" latinLnBrk="0" hangingPunct="1">
+                <a:lnSpc>
+                  <a:spcPct val="100000"/>
+                </a:lnSpc>
+                <a:spcBef>
+                  <a:spcPct val="0"/>
+                </a:spcBef>
+                <a:spcAft>
+                  <a:spcPct val="0"/>
+                </a:spcAft>
+                <a:buClrTx/>
+                <a:buSzTx/>
+                <a:buFontTx/>
+                <a:buNone/>
+                <a:tabLst/>
+                <a:defRPr/>
+              </a:pPr>
+              <a:r>
+                <a:rPr lang="en-GB" sz="1000" kern="0" dirty="0">
+                  <a:solidFill>
+                    <a:srgbClr val="000000"/>
+                  </a:solidFill>
+                  <a:latin typeface="Tahoma" pitchFamily="34" charset="0"/>
+                  <a:ea typeface="ＭＳ Ｐゴシック" pitchFamily="34" charset="-128"/>
+                </a:rPr>
+                <a:t>4</a:t>
+              </a:r>
+              <a:r>
+                <a:rPr kumimoji="0" lang="en-GB" sz="1000" b="0" i="1" u="none" strike="noStrike" kern="0" cap="none" spc="0" normalizeH="0" baseline="0" noProof="0" dirty="0">
+                  <a:ln>
+                    <a:noFill/>
+                  </a:ln>
+                  <a:solidFill>
+                    <a:srgbClr val="000000"/>
+                  </a:solidFill>
+                  <a:effectLst/>
+                  <a:uLnTx/>
+                  <a:uFillTx/>
+                  <a:latin typeface="Tahoma" pitchFamily="34" charset="0"/>
+                  <a:ea typeface="ＭＳ Ｐゴシック" pitchFamily="34" charset="-128"/>
+                </a:rPr>
+                <a:t>n</a:t>
+              </a:r>
+            </a:p>
+          </p:txBody>
+        </p:sp>
+        <p:sp>
+          <p:nvSpPr>
+            <p:cNvPr id="173" name="Triangle 172">
+              <a:extLst>
+                <a:ext uri="{FF2B5EF4-FFF2-40B4-BE49-F238E27FC236}">
+                  <a16:creationId xmlns:a16="http://schemas.microsoft.com/office/drawing/2014/main" id="{5687903D-C697-5199-C7AD-6AF31453DAA3}"/>
+                </a:ext>
+              </a:extLst>
+            </p:cNvPr>
+            <p:cNvSpPr/>
+            <p:nvPr/>
+          </p:nvSpPr>
+          <p:spPr bwMode="auto">
+            <a:xfrm rot="10800000" flipV="1">
+              <a:off x="4346815" y="5991958"/>
+              <a:ext cx="88724" cy="81478"/>
+            </a:xfrm>
+            <a:prstGeom prst="triangle">
+              <a:avLst/>
+            </a:prstGeom>
+            <a:solidFill>
+              <a:srgbClr val="CC79A7"/>
+            </a:solidFill>
+            <a:ln w="12700" cap="flat" cmpd="sng" algn="ctr">
+              <a:solidFill>
+                <a:srgbClr val="323D43"/>
+              </a:solidFill>
+              <a:prstDash val="solid"/>
+              <a:round/>
+              <a:headEnd type="none" w="med" len="med"/>
+              <a:tailEnd type="none" w="med" len="med"/>
+            </a:ln>
+            <a:effectLst/>
+          </p:spPr>
+          <p:txBody>
+            <a:bodyPr vert="horz" wrap="none" lIns="0" tIns="45720" rIns="91440" bIns="45720" numCol="1" rtlCol="0" anchor="ctr" anchorCtr="0" compatLnSpc="1">
+              <a:prstTxWarp prst="textNoShape">
+                <a:avLst/>
+              </a:prstTxWarp>
+            </a:bodyPr>
+            <a:lstStyle/>
+            <a:p>
+              <a:pPr marL="342900" marR="0" lvl="0" indent="-342900" algn="ctr" defTabSz="914400" eaLnBrk="1" fontAlgn="base" latinLnBrk="0" hangingPunct="1">
+                <a:lnSpc>
+                  <a:spcPct val="100000"/>
+                </a:lnSpc>
+                <a:spcBef>
+                  <a:spcPct val="40000"/>
+                </a:spcBef>
+                <a:spcAft>
+                  <a:spcPct val="20000"/>
+                </a:spcAft>
+                <a:buClr>
+                  <a:srgbClr val="0D01FF"/>
+                </a:buClr>
+                <a:buSzTx/>
+                <a:buFont typeface="Wingdings" pitchFamily="2" charset="2"/>
+                <a:buChar char="§"/>
+                <a:tabLst/>
+                <a:defRPr/>
+              </a:pPr>
+              <a:endParaRPr kumimoji="0" lang="en-US" sz="1000" b="0" i="0" u="none" strike="noStrike" kern="0" cap="none" spc="0" normalizeH="0" baseline="0" noProof="0">
+                <a:ln>
+                  <a:noFill/>
+                </a:ln>
+                <a:solidFill>
+                  <a:srgbClr val="323D43"/>
+                </a:solidFill>
+                <a:effectLst/>
+                <a:uLnTx/>
+                <a:uFillTx/>
+                <a:latin typeface="Georgia" pitchFamily="18" charset="0"/>
+                <a:ea typeface="ＭＳ Ｐゴシック" pitchFamily="34" charset="-128"/>
+              </a:endParaRPr>
+            </a:p>
+          </p:txBody>
+        </p:sp>
+        <p:sp>
+          <p:nvSpPr>
+            <p:cNvPr id="174" name="Rectangle 173">
+              <a:extLst>
+                <a:ext uri="{FF2B5EF4-FFF2-40B4-BE49-F238E27FC236}">
+                  <a16:creationId xmlns:a16="http://schemas.microsoft.com/office/drawing/2014/main" id="{96DA8784-A44B-E155-F72F-E05E09F5E736}"/>
+                </a:ext>
+              </a:extLst>
+            </p:cNvPr>
+            <p:cNvSpPr/>
+            <p:nvPr/>
+          </p:nvSpPr>
+          <p:spPr>
+            <a:xfrm>
+              <a:off x="4483323" y="5988962"/>
+              <a:ext cx="80253" cy="85491"/>
+            </a:xfrm>
+            <a:prstGeom prst="rect">
+              <a:avLst/>
+            </a:prstGeom>
+            <a:solidFill>
+              <a:srgbClr val="CC79A7"/>
+            </a:solidFill>
+            <a:ln w="12700">
+              <a:solidFill>
+                <a:schemeClr val="tx1"/>
+              </a:solidFill>
+            </a:ln>
+          </p:spPr>
+          <p:style>
+            <a:lnRef idx="2">
+              <a:schemeClr val="accent1">
+                <a:shade val="15000"/>
+              </a:schemeClr>
+            </a:lnRef>
+            <a:fillRef idx="1">
+              <a:schemeClr val="accent1"/>
+            </a:fillRef>
+            <a:effectRef idx="0">
+              <a:schemeClr val="accent1"/>
+            </a:effectRef>
+            <a:fontRef idx="minor">
+              <a:schemeClr val="lt1"/>
+            </a:fontRef>
+          </p:style>
+          <p:txBody>
+            <a:bodyPr rtlCol="0" anchor="ctr"/>
+            <a:lstStyle/>
+            <a:p>
+              <a:pPr algn="ctr"/>
+              <a:endParaRPr lang="en-AU" sz="1000"/>
+            </a:p>
+          </p:txBody>
+        </p:sp>
+      </p:grpSp>
+      <p:grpSp>
+        <p:nvGrpSpPr>
+          <p:cNvPr id="203" name="Group 202">
+            <a:extLst>
+              <a:ext uri="{FF2B5EF4-FFF2-40B4-BE49-F238E27FC236}">
+                <a16:creationId xmlns:a16="http://schemas.microsoft.com/office/drawing/2014/main" id="{EF99E5EA-B796-B4A1-8E87-07D7834F5594}"/>
+              </a:ext>
+            </a:extLst>
+          </p:cNvPr>
+          <p:cNvGrpSpPr/>
+          <p:nvPr/>
+        </p:nvGrpSpPr>
+        <p:grpSpPr>
+          <a:xfrm>
+            <a:off x="5172849" y="5951371"/>
+            <a:ext cx="515187" cy="153888"/>
+            <a:chOff x="5172849" y="5951371"/>
+            <a:chExt cx="515187" cy="153888"/>
+          </a:xfrm>
+        </p:grpSpPr>
+        <p:sp>
+          <p:nvSpPr>
+            <p:cNvPr id="175" name="Rectangle 174">
+              <a:extLst>
+                <a:ext uri="{FF2B5EF4-FFF2-40B4-BE49-F238E27FC236}">
+                  <a16:creationId xmlns:a16="http://schemas.microsoft.com/office/drawing/2014/main" id="{D8C1459C-34B6-8EA3-E18A-A4CC9FD75B38}"/>
+                </a:ext>
+              </a:extLst>
+            </p:cNvPr>
+            <p:cNvSpPr>
+              <a:spLocks noChangeArrowheads="1"/>
+            </p:cNvSpPr>
+            <p:nvPr/>
+          </p:nvSpPr>
+          <p:spPr bwMode="auto">
+            <a:xfrm>
+              <a:off x="5452394" y="5951371"/>
+              <a:ext cx="235642" cy="153888"/>
+            </a:xfrm>
+            <a:prstGeom prst="rect">
+              <a:avLst/>
+            </a:prstGeom>
+            <a:noFill/>
+            <a:ln w="12700" algn="ctr">
+              <a:noFill/>
+              <a:miter lim="800000"/>
+              <a:headEnd/>
+              <a:tailEnd/>
+            </a:ln>
+          </p:spPr>
+          <p:txBody>
+            <a:bodyPr wrap="none" lIns="0" tIns="0" rIns="0" bIns="0" anchor="ctr">
+              <a:spAutoFit/>
+            </a:bodyPr>
+            <a:lstStyle/>
+            <a:p>
+              <a:pPr marL="0" marR="0" lvl="0" indent="0" defTabSz="914400" eaLnBrk="1" fontAlgn="base" latinLnBrk="0" hangingPunct="1">
+                <a:lnSpc>
+                  <a:spcPct val="100000"/>
+                </a:lnSpc>
+                <a:spcBef>
+                  <a:spcPct val="0"/>
+                </a:spcBef>
+                <a:spcAft>
+                  <a:spcPct val="0"/>
+                </a:spcAft>
+                <a:buClrTx/>
+                <a:buSzTx/>
+                <a:buFontTx/>
+                <a:buNone/>
+                <a:tabLst/>
+                <a:defRPr/>
+              </a:pPr>
+              <a:r>
+                <a:rPr lang="en-GB" sz="1000" kern="0" dirty="0">
+                  <a:solidFill>
+                    <a:srgbClr val="000000"/>
+                  </a:solidFill>
+                  <a:latin typeface="Tahoma" pitchFamily="34" charset="0"/>
+                  <a:ea typeface="ＭＳ Ｐゴシック" pitchFamily="34" charset="-128"/>
+                </a:rPr>
+                <a:t>6</a:t>
+              </a:r>
+              <a:r>
+                <a:rPr kumimoji="0" lang="en-GB" sz="1000" b="0" i="1" u="none" strike="noStrike" kern="0" cap="none" spc="0" normalizeH="0" baseline="0" noProof="0" dirty="0">
+                  <a:ln>
+                    <a:noFill/>
+                  </a:ln>
+                  <a:solidFill>
+                    <a:srgbClr val="000000"/>
+                  </a:solidFill>
+                  <a:effectLst/>
+                  <a:uLnTx/>
+                  <a:uFillTx/>
+                  <a:latin typeface="Tahoma" pitchFamily="34" charset="0"/>
+                  <a:ea typeface="ＭＳ Ｐゴシック" pitchFamily="34" charset="-128"/>
+                </a:rPr>
+                <a:t>n</a:t>
+              </a:r>
+              <a:r>
+                <a:rPr kumimoji="0" lang="en-GB" sz="1000" b="0" u="none" strike="noStrike" kern="0" cap="none" spc="0" normalizeH="0" baseline="0" noProof="0" dirty="0">
+                  <a:ln>
+                    <a:noFill/>
+                  </a:ln>
+                  <a:solidFill>
+                    <a:srgbClr val="000000"/>
+                  </a:solidFill>
+                  <a:effectLst/>
+                  <a:uLnTx/>
+                  <a:uFillTx/>
+                  <a:latin typeface="Tahoma" pitchFamily="34" charset="0"/>
+                  <a:ea typeface="ＭＳ Ｐゴシック" pitchFamily="34" charset="-128"/>
+                </a:rPr>
+                <a:t>+</a:t>
+              </a:r>
+            </a:p>
+          </p:txBody>
+        </p:sp>
+        <p:sp>
+          <p:nvSpPr>
+            <p:cNvPr id="176" name="Triangle 175">
+              <a:extLst>
+                <a:ext uri="{FF2B5EF4-FFF2-40B4-BE49-F238E27FC236}">
+                  <a16:creationId xmlns:a16="http://schemas.microsoft.com/office/drawing/2014/main" id="{FF37512F-17B1-662C-E4DE-466C7C01255E}"/>
+                </a:ext>
+              </a:extLst>
+            </p:cNvPr>
+            <p:cNvSpPr/>
+            <p:nvPr/>
+          </p:nvSpPr>
+          <p:spPr bwMode="auto">
+            <a:xfrm rot="10800000" flipV="1">
+              <a:off x="5172849" y="5991958"/>
+              <a:ext cx="88724" cy="81478"/>
+            </a:xfrm>
+            <a:prstGeom prst="triangle">
+              <a:avLst/>
+            </a:prstGeom>
+            <a:solidFill>
+              <a:srgbClr val="D55E00"/>
+            </a:solidFill>
+            <a:ln w="12700" cap="flat" cmpd="sng" algn="ctr">
+              <a:solidFill>
+                <a:srgbClr val="323D43"/>
+              </a:solidFill>
+              <a:prstDash val="solid"/>
+              <a:round/>
+              <a:headEnd type="none" w="med" len="med"/>
+              <a:tailEnd type="none" w="med" len="med"/>
+            </a:ln>
+            <a:effectLst/>
+          </p:spPr>
+          <p:txBody>
+            <a:bodyPr vert="horz" wrap="none" lIns="0" tIns="45720" rIns="91440" bIns="45720" numCol="1" rtlCol="0" anchor="ctr" anchorCtr="0" compatLnSpc="1">
+              <a:prstTxWarp prst="textNoShape">
+                <a:avLst/>
+              </a:prstTxWarp>
+            </a:bodyPr>
+            <a:lstStyle/>
+            <a:p>
+              <a:pPr marL="342900" marR="0" lvl="0" indent="-342900" algn="ctr" defTabSz="914400" eaLnBrk="1" fontAlgn="base" latinLnBrk="0" hangingPunct="1">
+                <a:lnSpc>
+                  <a:spcPct val="100000"/>
+                </a:lnSpc>
+                <a:spcBef>
+                  <a:spcPct val="40000"/>
+                </a:spcBef>
+                <a:spcAft>
+                  <a:spcPct val="20000"/>
+                </a:spcAft>
+                <a:buClr>
+                  <a:srgbClr val="0D01FF"/>
+                </a:buClr>
+                <a:buSzTx/>
+                <a:buFont typeface="Wingdings" pitchFamily="2" charset="2"/>
+                <a:buChar char="§"/>
+                <a:tabLst/>
+                <a:defRPr/>
+              </a:pPr>
+              <a:endParaRPr kumimoji="0" lang="en-US" sz="1000" b="0" i="0" u="none" strike="noStrike" kern="0" cap="none" spc="0" normalizeH="0" baseline="0" noProof="0">
+                <a:ln>
+                  <a:noFill/>
+                </a:ln>
+                <a:solidFill>
+                  <a:srgbClr val="323D43"/>
+                </a:solidFill>
+                <a:effectLst/>
+                <a:uLnTx/>
+                <a:uFillTx/>
+                <a:latin typeface="Georgia" pitchFamily="18" charset="0"/>
+                <a:ea typeface="ＭＳ Ｐゴシック" pitchFamily="34" charset="-128"/>
+              </a:endParaRPr>
+            </a:p>
+          </p:txBody>
+        </p:sp>
+        <p:sp>
+          <p:nvSpPr>
+            <p:cNvPr id="177" name="Rectangle 176">
+              <a:extLst>
+                <a:ext uri="{FF2B5EF4-FFF2-40B4-BE49-F238E27FC236}">
+                  <a16:creationId xmlns:a16="http://schemas.microsoft.com/office/drawing/2014/main" id="{A862712D-5C97-1BB9-8BFF-29906210428F}"/>
+                </a:ext>
+              </a:extLst>
+            </p:cNvPr>
+            <p:cNvSpPr/>
+            <p:nvPr/>
+          </p:nvSpPr>
+          <p:spPr>
+            <a:xfrm>
+              <a:off x="5309357" y="5988962"/>
+              <a:ext cx="80253" cy="85491"/>
+            </a:xfrm>
+            <a:prstGeom prst="rect">
+              <a:avLst/>
+            </a:prstGeom>
+            <a:solidFill>
+              <a:srgbClr val="D55E00"/>
+            </a:solidFill>
+            <a:ln w="12700">
+              <a:solidFill>
+                <a:schemeClr val="tx1"/>
+              </a:solidFill>
+            </a:ln>
+          </p:spPr>
+          <p:style>
+            <a:lnRef idx="2">
+              <a:schemeClr val="accent1">
+                <a:shade val="15000"/>
+              </a:schemeClr>
+            </a:lnRef>
+            <a:fillRef idx="1">
+              <a:schemeClr val="accent1"/>
+            </a:fillRef>
+            <a:effectRef idx="0">
+              <a:schemeClr val="accent1"/>
+            </a:effectRef>
+            <a:fontRef idx="minor">
+              <a:schemeClr val="lt1"/>
+            </a:fontRef>
+          </p:style>
+          <p:txBody>
+            <a:bodyPr rtlCol="0" anchor="ctr"/>
+            <a:lstStyle/>
+            <a:p>
+              <a:pPr algn="ctr"/>
+              <a:endParaRPr lang="en-AU" sz="1000"/>
+            </a:p>
+          </p:txBody>
+        </p:sp>
+      </p:grpSp>
     </p:spTree>
     <p:extLst>
       <p:ext uri="{BB962C8B-B14F-4D97-AF65-F5344CB8AC3E}">

</xml_diff>